<commit_message>
Update intro for ISC.
</commit_message>
<xml_diff>
--- a/intro.pptx
+++ b/intro.pptx
@@ -5,10 +5,10 @@
     <p:sldMasterId id="2147483935" r:id="rId4"/>
   </p:sldMasterIdLst>
   <p:notesMasterIdLst>
-    <p:notesMasterId r:id="rId14"/>
+    <p:notesMasterId r:id="rId13"/>
   </p:notesMasterIdLst>
   <p:handoutMasterIdLst>
-    <p:handoutMasterId r:id="rId15"/>
+    <p:handoutMasterId r:id="rId14"/>
   </p:handoutMasterIdLst>
   <p:sldIdLst>
     <p:sldId id="617" r:id="rId5"/>
@@ -17,9 +17,8 @@
     <p:sldId id="327" r:id="rId8"/>
     <p:sldId id="324" r:id="rId9"/>
     <p:sldId id="329" r:id="rId10"/>
-    <p:sldId id="310" r:id="rId11"/>
-    <p:sldId id="314" r:id="rId12"/>
-    <p:sldId id="616" r:id="rId13"/>
+    <p:sldId id="314" r:id="rId11"/>
+    <p:sldId id="616" r:id="rId12"/>
   </p:sldIdLst>
   <p:sldSz cx="12188825" cy="6858000"/>
   <p:notesSz cx="7010400" cy="9296400"/>
@@ -263,7 +262,7 @@
           <a:p>
             <a:fld id="{0B842F42-2CE9-4E35-95C1-410DC08A50B1}" type="datetimeFigureOut">
               <a:rPr lang="en-US" smtClean="0"/>
-              <a:t>5/21/2021</a:t>
+              <a:t>6/14/2021</a:t>
             </a:fld>
             <a:endParaRPr lang="en-US"/>
           </a:p>
@@ -428,7 +427,7 @@
           <a:p>
             <a:fld id="{6F282904-F315-4730-8D91-37D99E141A6F}" type="datetimeFigureOut">
               <a:rPr lang="en-US" smtClean="0"/>
-              <a:t>5/21/2021</a:t>
+              <a:t>6/14/2021</a:t>
             </a:fld>
             <a:endParaRPr lang="en-US"/>
           </a:p>
@@ -4123,13 +4122,27 @@
           <a:p>
             <a:r>
               <a:rPr lang="en-US" dirty="0"/>
-              <a:t>David E. Bernholdt, Anshu Dubey, Rinku Gupta, David Rogers</a:t>
+              <a:t>David E. Bernholdt, Anshu Dubey, Patricia A. Grubel, Rinku Gupta, David M. Rogers</a:t>
             </a:r>
           </a:p>
           <a:p>
             <a:r>
               <a:rPr lang="en-US" dirty="0"/>
-              <a:t>1:00-4:00pm MDT Thursday 25 March 2021</a:t>
+              <a:t>2:00pm-6:00pm CEST 24 June </a:t>
+            </a:r>
+            <a:r>
+              <a:rPr lang="en-US" u="sng" dirty="0"/>
+              <a:t>and</a:t>
+            </a:r>
+            <a:r>
+              <a:rPr lang="en-US" dirty="0"/>
+              <a:t> 25 June 2021</a:t>
+            </a:r>
+          </a:p>
+          <a:p>
+            <a:r>
+              <a:rPr lang="en-US" dirty="0"/>
+              <a:t>(8:00am-12:00pm EDT)</a:t>
             </a:r>
           </a:p>
           <a:p>
@@ -4151,8 +4164,8 @@
         </p:nvSpPr>
         <p:spPr>
           <a:xfrm>
-            <a:off x="3178175" y="4059333"/>
-            <a:ext cx="4584766" cy="1200329"/>
+            <a:off x="3177632" y="4156432"/>
+            <a:ext cx="4944219" cy="1569660"/>
           </a:xfrm>
           <a:prstGeom prst="rect">
             <a:avLst/>
@@ -4185,7 +4198,14 @@
               </a:rPr>
               <a:t>https://bssw-tutorial.github.io/</a:t>
             </a:r>
-            <a:endParaRPr lang="en-US" sz="2800" b="1" dirty="0"/>
+            <a:endParaRPr lang="en-US" sz="2400" b="1" dirty="0"/>
+          </a:p>
+          <a:p>
+            <a:r>
+              <a:rPr lang="en-US" sz="2400" dirty="0"/>
+              <a:t>and click the link for today’s tutorial</a:t>
+            </a:r>
+            <a:endParaRPr lang="en-US" sz="2800" dirty="0"/>
           </a:p>
         </p:txBody>
       </p:sp>
@@ -4615,6 +4635,17 @@
             </a:pPr>
             <a:r>
               <a:rPr lang="en-US" dirty="0"/>
+              <a:t>Patricia Grubel, LANL</a:t>
+            </a:r>
+          </a:p>
+          <a:p>
+            <a:pPr>
+              <a:spcBef>
+                <a:spcPts val="1000"/>
+              </a:spcBef>
+            </a:pPr>
+            <a:r>
+              <a:rPr lang="en-US" dirty="0"/>
               <a:t>Rinku Gupta, ANL</a:t>
             </a:r>
           </a:p>
@@ -4690,10 +4721,10 @@
       </p:sp>
       <p:grpSp>
         <p:nvGrpSpPr>
-          <p:cNvPr id="22" name="Group 21">
+          <p:cNvPr id="20" name="Group 19">
             <a:extLst>
               <a:ext uri="{FF2B5EF4-FFF2-40B4-BE49-F238E27FC236}">
-                <a16:creationId xmlns:a16="http://schemas.microsoft.com/office/drawing/2014/main" id="{DB814C57-53AD-4E0B-9AF7-9B98B92A4C68}"/>
+                <a16:creationId xmlns:a16="http://schemas.microsoft.com/office/drawing/2014/main" id="{BF2033CB-35D0-459F-8C42-B56E36DA8EDB}"/>
               </a:ext>
             </a:extLst>
           </p:cNvPr>
@@ -4702,18 +4733,18 @@
         </p:nvGrpSpPr>
         <p:grpSpPr>
           <a:xfrm>
-            <a:off x="5234821" y="1325880"/>
-            <a:ext cx="997822" cy="1556198"/>
-            <a:chOff x="5234821" y="1346049"/>
-            <a:chExt cx="997822" cy="1556198"/>
+            <a:off x="7828318" y="1313616"/>
+            <a:ext cx="1009507" cy="1851663"/>
+            <a:chOff x="8066531" y="1374891"/>
+            <a:chExt cx="1009507" cy="1851663"/>
           </a:xfrm>
         </p:grpSpPr>
         <p:pic>
           <p:nvPicPr>
-            <p:cNvPr id="16" name="Picture 15">
+            <p:cNvPr id="25" name="Picture 24">
               <a:extLst>
                 <a:ext uri="{FF2B5EF4-FFF2-40B4-BE49-F238E27FC236}">
-                  <a16:creationId xmlns:a16="http://schemas.microsoft.com/office/drawing/2014/main" id="{614FA307-4CB6-4F32-B5E0-7E81172D4A36}"/>
+                  <a16:creationId xmlns:a16="http://schemas.microsoft.com/office/drawing/2014/main" id="{B0478DAB-6BBF-4BD8-8EE3-073A551F537C}"/>
                 </a:ext>
               </a:extLst>
             </p:cNvPr>
@@ -4723,7 +4754,222 @@
             <p:nvPr/>
           </p:nvPicPr>
           <p:blipFill rotWithShape="1">
-            <a:blip r:embed="rId3"/>
+            <a:blip r:embed="rId3" cstate="print">
+              <a:extLst>
+                <a:ext uri="{28A0092B-C50C-407E-A947-70E740481C1C}">
+                  <a14:useLocalDpi xmlns:a14="http://schemas.microsoft.com/office/drawing/2010/main" val="0"/>
+                </a:ext>
+              </a:extLst>
+            </a:blip>
+            <a:srcRect l="4859" r="10127"/>
+            <a:stretch/>
+          </p:blipFill>
+          <p:spPr>
+            <a:xfrm>
+              <a:off x="8088482" y="1374891"/>
+              <a:ext cx="965606" cy="1207008"/>
+            </a:xfrm>
+            <a:prstGeom prst="rect">
+              <a:avLst/>
+            </a:prstGeom>
+          </p:spPr>
+        </p:pic>
+        <p:sp>
+          <p:nvSpPr>
+            <p:cNvPr id="28" name="TextBox 27">
+              <a:extLst>
+                <a:ext uri="{FF2B5EF4-FFF2-40B4-BE49-F238E27FC236}">
+                  <a16:creationId xmlns:a16="http://schemas.microsoft.com/office/drawing/2014/main" id="{D52C04AD-63F9-40C3-B199-0C00D8DC9666}"/>
+                </a:ext>
+              </a:extLst>
+            </p:cNvPr>
+            <p:cNvSpPr txBox="1"/>
+            <p:nvPr/>
+          </p:nvSpPr>
+          <p:spPr>
+            <a:xfrm>
+              <a:off x="8066531" y="2543290"/>
+              <a:ext cx="1009507" cy="683264"/>
+            </a:xfrm>
+            <a:prstGeom prst="rect">
+              <a:avLst/>
+            </a:prstGeom>
+            <a:noFill/>
+          </p:spPr>
+          <p:txBody>
+            <a:bodyPr wrap="none" lIns="118872" tIns="91440" rIns="118872" bIns="91440" rtlCol="0" anchor="ctr" anchorCtr="0">
+              <a:spAutoFit/>
+            </a:bodyPr>
+            <a:lstStyle/>
+            <a:p>
+              <a:pPr algn="l">
+                <a:lnSpc>
+                  <a:spcPct val="90000"/>
+                </a:lnSpc>
+              </a:pPr>
+              <a:r>
+                <a:rPr lang="en-US" dirty="0"/>
+                <a:t>Patricia</a:t>
+              </a:r>
+            </a:p>
+            <a:p>
+              <a:pPr algn="l">
+                <a:lnSpc>
+                  <a:spcPct val="90000"/>
+                </a:lnSpc>
+              </a:pPr>
+              <a:r>
+                <a:rPr lang="en-US" i="1" dirty="0"/>
+                <a:t>she/her</a:t>
+              </a:r>
+            </a:p>
+          </p:txBody>
+        </p:sp>
+      </p:grpSp>
+      <p:grpSp>
+        <p:nvGrpSpPr>
+          <p:cNvPr id="29" name="Group 28">
+            <a:extLst>
+              <a:ext uri="{FF2B5EF4-FFF2-40B4-BE49-F238E27FC236}">
+                <a16:creationId xmlns:a16="http://schemas.microsoft.com/office/drawing/2014/main" id="{AEA9B660-4676-44D8-A2B3-DB4056FB58AF}"/>
+              </a:ext>
+            </a:extLst>
+          </p:cNvPr>
+          <p:cNvGrpSpPr/>
+          <p:nvPr/>
+        </p:nvGrpSpPr>
+        <p:grpSpPr>
+          <a:xfrm>
+            <a:off x="9279242" y="1313616"/>
+            <a:ext cx="1009507" cy="1851663"/>
+            <a:chOff x="9969639" y="348151"/>
+            <a:chExt cx="1009507" cy="1851663"/>
+          </a:xfrm>
+        </p:grpSpPr>
+        <p:pic>
+          <p:nvPicPr>
+            <p:cNvPr id="30" name="Picture 29">
+              <a:extLst>
+                <a:ext uri="{FF2B5EF4-FFF2-40B4-BE49-F238E27FC236}">
+                  <a16:creationId xmlns:a16="http://schemas.microsoft.com/office/drawing/2014/main" id="{F75C7EBE-5CAD-4934-BD6F-F088C111E39E}"/>
+                </a:ext>
+              </a:extLst>
+            </p:cNvPr>
+            <p:cNvPicPr>
+              <a:picLocks noChangeAspect="1"/>
+            </p:cNvPicPr>
+            <p:nvPr/>
+          </p:nvPicPr>
+          <p:blipFill>
+            <a:blip r:embed="rId4" cstate="print">
+              <a:extLst>
+                <a:ext uri="{28A0092B-C50C-407E-A947-70E740481C1C}">
+                  <a14:useLocalDpi xmlns:a14="http://schemas.microsoft.com/office/drawing/2010/main" val="0"/>
+                </a:ext>
+              </a:extLst>
+            </a:blip>
+            <a:stretch>
+              <a:fillRect/>
+            </a:stretch>
+          </p:blipFill>
+          <p:spPr>
+            <a:xfrm>
+              <a:off x="10007683" y="348151"/>
+              <a:ext cx="933420" cy="1207008"/>
+            </a:xfrm>
+            <a:prstGeom prst="rect">
+              <a:avLst/>
+            </a:prstGeom>
+          </p:spPr>
+        </p:pic>
+        <p:sp>
+          <p:nvSpPr>
+            <p:cNvPr id="31" name="TextBox 30">
+              <a:extLst>
+                <a:ext uri="{FF2B5EF4-FFF2-40B4-BE49-F238E27FC236}">
+                  <a16:creationId xmlns:a16="http://schemas.microsoft.com/office/drawing/2014/main" id="{2EE8A150-86D2-4EE0-9C2A-5FCD3E0CD887}"/>
+                </a:ext>
+              </a:extLst>
+            </p:cNvPr>
+            <p:cNvSpPr txBox="1"/>
+            <p:nvPr/>
+          </p:nvSpPr>
+          <p:spPr>
+            <a:xfrm>
+              <a:off x="9969639" y="1516550"/>
+              <a:ext cx="1009507" cy="683264"/>
+            </a:xfrm>
+            <a:prstGeom prst="rect">
+              <a:avLst/>
+            </a:prstGeom>
+            <a:noFill/>
+          </p:spPr>
+          <p:txBody>
+            <a:bodyPr wrap="none" lIns="118872" tIns="91440" rIns="118872" bIns="91440" rtlCol="0" anchor="ctr" anchorCtr="0">
+              <a:spAutoFit/>
+            </a:bodyPr>
+            <a:lstStyle/>
+            <a:p>
+              <a:pPr algn="ctr">
+                <a:lnSpc>
+                  <a:spcPct val="90000"/>
+                </a:lnSpc>
+              </a:pPr>
+              <a:r>
+                <a:rPr lang="en-US" dirty="0"/>
+                <a:t>Rinku</a:t>
+              </a:r>
+            </a:p>
+            <a:p>
+              <a:pPr algn="ctr">
+                <a:lnSpc>
+                  <a:spcPct val="90000"/>
+                </a:lnSpc>
+              </a:pPr>
+              <a:r>
+                <a:rPr lang="en-US" i="1" dirty="0"/>
+                <a:t>she/her</a:t>
+              </a:r>
+            </a:p>
+          </p:txBody>
+        </p:sp>
+      </p:grpSp>
+      <p:grpSp>
+        <p:nvGrpSpPr>
+          <p:cNvPr id="32" name="Group 31">
+            <a:extLst>
+              <a:ext uri="{FF2B5EF4-FFF2-40B4-BE49-F238E27FC236}">
+                <a16:creationId xmlns:a16="http://schemas.microsoft.com/office/drawing/2014/main" id="{21DEFD5F-ACBD-496E-948B-AEBCCACF7D33}"/>
+              </a:ext>
+            </a:extLst>
+          </p:cNvPr>
+          <p:cNvGrpSpPr/>
+          <p:nvPr/>
+        </p:nvGrpSpPr>
+        <p:grpSpPr>
+          <a:xfrm>
+            <a:off x="4993555" y="1313616"/>
+            <a:ext cx="997822" cy="1805497"/>
+            <a:chOff x="5234821" y="1346049"/>
+            <a:chExt cx="997822" cy="1805497"/>
+          </a:xfrm>
+        </p:grpSpPr>
+        <p:pic>
+          <p:nvPicPr>
+            <p:cNvPr id="33" name="Picture 32">
+              <a:extLst>
+                <a:ext uri="{FF2B5EF4-FFF2-40B4-BE49-F238E27FC236}">
+                  <a16:creationId xmlns:a16="http://schemas.microsoft.com/office/drawing/2014/main" id="{90F865BF-0338-49FD-8A89-FB49A5DFF6E2}"/>
+                </a:ext>
+              </a:extLst>
+            </p:cNvPr>
+            <p:cNvPicPr>
+              <a:picLocks noChangeAspect="1"/>
+            </p:cNvPicPr>
+            <p:nvPr/>
+          </p:nvPicPr>
+          <p:blipFill rotWithShape="1">
+            <a:blip r:embed="rId5"/>
             <a:srcRect l="13222" t="5312" r="18595" b="32928"/>
             <a:stretch/>
           </p:blipFill>
@@ -4739,10 +4985,10 @@
         </p:pic>
         <p:sp>
           <p:nvSpPr>
-            <p:cNvPr id="18" name="TextBox 17">
+            <p:cNvPr id="34" name="TextBox 33">
               <a:extLst>
                 <a:ext uri="{FF2B5EF4-FFF2-40B4-BE49-F238E27FC236}">
-                  <a16:creationId xmlns:a16="http://schemas.microsoft.com/office/drawing/2014/main" id="{58B330FD-90AE-4946-AA4B-CA68C57F1A81}"/>
+                  <a16:creationId xmlns:a16="http://schemas.microsoft.com/office/drawing/2014/main" id="{E07100F6-F060-4B79-A7E4-0B0BAB7C1A8C}"/>
                 </a:ext>
               </a:extLst>
             </p:cNvPr>
@@ -4752,7 +4998,7 @@
           <p:spPr>
             <a:xfrm>
               <a:off x="5237443" y="2560615"/>
-              <a:ext cx="992579" cy="341632"/>
+              <a:ext cx="992579" cy="590931"/>
             </a:xfrm>
             <a:prstGeom prst="rect">
               <a:avLst/>
@@ -4775,15 +5021,26 @@
                 <a:t>David B</a:t>
               </a:r>
             </a:p>
+            <a:p>
+              <a:pPr algn="ctr">
+                <a:lnSpc>
+                  <a:spcPct val="90000"/>
+                </a:lnSpc>
+              </a:pPr>
+              <a:r>
+                <a:rPr lang="en-US" i="1" dirty="0"/>
+                <a:t>he/him</a:t>
+              </a:r>
+            </a:p>
           </p:txBody>
         </p:sp>
       </p:grpSp>
       <p:grpSp>
         <p:nvGrpSpPr>
-          <p:cNvPr id="24" name="Group 23">
+          <p:cNvPr id="35" name="Group 34">
             <a:extLst>
               <a:ext uri="{FF2B5EF4-FFF2-40B4-BE49-F238E27FC236}">
-                <a16:creationId xmlns:a16="http://schemas.microsoft.com/office/drawing/2014/main" id="{3B3429F4-37A2-4810-BF4C-7EB27D0BF91B}"/>
+                <a16:creationId xmlns:a16="http://schemas.microsoft.com/office/drawing/2014/main" id="{13A1D959-C750-4D05-84FF-09B31270817E}"/>
               </a:ext>
             </a:extLst>
           </p:cNvPr>
@@ -4792,115 +5049,18 @@
         </p:nvGrpSpPr>
         <p:grpSpPr>
           <a:xfrm>
-            <a:off x="8527566" y="1325880"/>
-            <a:ext cx="933420" cy="1552894"/>
-            <a:chOff x="9318911" y="1346049"/>
-            <a:chExt cx="933420" cy="1552894"/>
+            <a:off x="10730166" y="1313616"/>
+            <a:ext cx="1005403" cy="1805497"/>
+            <a:chOff x="10526802" y="1346049"/>
+            <a:chExt cx="1005403" cy="1805497"/>
           </a:xfrm>
         </p:grpSpPr>
         <p:pic>
           <p:nvPicPr>
-            <p:cNvPr id="9" name="Picture 8">
+            <p:cNvPr id="36" name="Picture 35" descr="A person wearing glasses&#10;&#10;Description automatically generated with medium confidence">
               <a:extLst>
                 <a:ext uri="{FF2B5EF4-FFF2-40B4-BE49-F238E27FC236}">
-                  <a16:creationId xmlns:a16="http://schemas.microsoft.com/office/drawing/2014/main" id="{7463C1FF-43D1-4204-8AF2-F3359F77027A}"/>
-                </a:ext>
-              </a:extLst>
-            </p:cNvPr>
-            <p:cNvPicPr>
-              <a:picLocks noChangeAspect="1"/>
-            </p:cNvPicPr>
-            <p:nvPr/>
-          </p:nvPicPr>
-          <p:blipFill>
-            <a:blip r:embed="rId4" cstate="print">
-              <a:extLst>
-                <a:ext uri="{28A0092B-C50C-407E-A947-70E740481C1C}">
-                  <a14:useLocalDpi xmlns:a14="http://schemas.microsoft.com/office/drawing/2010/main" val="0"/>
-                </a:ext>
-              </a:extLst>
-            </a:blip>
-            <a:stretch>
-              <a:fillRect/>
-            </a:stretch>
-          </p:blipFill>
-          <p:spPr>
-            <a:xfrm>
-              <a:off x="9318911" y="1346049"/>
-              <a:ext cx="933420" cy="1207008"/>
-            </a:xfrm>
-            <a:prstGeom prst="rect">
-              <a:avLst/>
-            </a:prstGeom>
-          </p:spPr>
-        </p:pic>
-        <p:sp>
-          <p:nvSpPr>
-            <p:cNvPr id="17" name="TextBox 16">
-              <a:extLst>
-                <a:ext uri="{FF2B5EF4-FFF2-40B4-BE49-F238E27FC236}">
-                  <a16:creationId xmlns:a16="http://schemas.microsoft.com/office/drawing/2014/main" id="{6C3C051D-F26A-4D18-AACB-DFE6CD97E60E}"/>
-                </a:ext>
-              </a:extLst>
-            </p:cNvPr>
-            <p:cNvSpPr txBox="1"/>
-            <p:nvPr/>
-          </p:nvSpPr>
-          <p:spPr>
-            <a:xfrm>
-              <a:off x="9370636" y="2560615"/>
-              <a:ext cx="829971" cy="338328"/>
-            </a:xfrm>
-            <a:prstGeom prst="rect">
-              <a:avLst/>
-            </a:prstGeom>
-            <a:noFill/>
-          </p:spPr>
-          <p:txBody>
-            <a:bodyPr wrap="none" lIns="118872" tIns="91440" rIns="118872" bIns="91440" rtlCol="0" anchor="ctr" anchorCtr="0">
-              <a:spAutoFit/>
-            </a:bodyPr>
-            <a:lstStyle/>
-            <a:p>
-              <a:pPr algn="l">
-                <a:lnSpc>
-                  <a:spcPct val="90000"/>
-                </a:lnSpc>
-              </a:pPr>
-              <a:r>
-                <a:rPr lang="en-US" dirty="0"/>
-                <a:t>Rinku</a:t>
-              </a:r>
-            </a:p>
-          </p:txBody>
-        </p:sp>
-      </p:grpSp>
-      <p:grpSp>
-        <p:nvGrpSpPr>
-          <p:cNvPr id="27" name="Group 26">
-            <a:extLst>
-              <a:ext uri="{FF2B5EF4-FFF2-40B4-BE49-F238E27FC236}">
-                <a16:creationId xmlns:a16="http://schemas.microsoft.com/office/drawing/2014/main" id="{0206D099-F6C8-40B0-A718-5BEA056C794F}"/>
-              </a:ext>
-            </a:extLst>
-          </p:cNvPr>
-          <p:cNvGrpSpPr/>
-          <p:nvPr/>
-        </p:nvGrpSpPr>
-        <p:grpSpPr>
-          <a:xfrm>
-            <a:off x="10149312" y="1325880"/>
-            <a:ext cx="1005404" cy="1556198"/>
-            <a:chOff x="10526802" y="1346049"/>
-            <a:chExt cx="1005404" cy="1556198"/>
-          </a:xfrm>
-        </p:grpSpPr>
-        <p:pic>
-          <p:nvPicPr>
-            <p:cNvPr id="21" name="Picture 20" descr="A person wearing glasses&#10;&#10;Description automatically generated with medium confidence">
-              <a:extLst>
-                <a:ext uri="{FF2B5EF4-FFF2-40B4-BE49-F238E27FC236}">
-                  <a16:creationId xmlns:a16="http://schemas.microsoft.com/office/drawing/2014/main" id="{FF5835E1-11BE-4F4A-AE3C-1E6B5084788B}"/>
+                  <a16:creationId xmlns:a16="http://schemas.microsoft.com/office/drawing/2014/main" id="{D39CBF16-EB8F-4491-8167-87BF1EE019C5}"/>
                 </a:ext>
               </a:extLst>
             </p:cNvPr>
@@ -4910,7 +5070,7 @@
             <p:nvPr/>
           </p:nvPicPr>
           <p:blipFill rotWithShape="1">
-            <a:blip r:embed="rId5">
+            <a:blip r:embed="rId6">
               <a:extLst>
                 <a:ext uri="{28A0092B-C50C-407E-A947-70E740481C1C}">
                   <a14:useLocalDpi xmlns:a14="http://schemas.microsoft.com/office/drawing/2010/main" val="0"/>
@@ -4932,10 +5092,10 @@
         </p:pic>
         <p:sp>
           <p:nvSpPr>
-            <p:cNvPr id="26" name="TextBox 25">
+            <p:cNvPr id="37" name="TextBox 36">
               <a:extLst>
                 <a:ext uri="{FF2B5EF4-FFF2-40B4-BE49-F238E27FC236}">
-                  <a16:creationId xmlns:a16="http://schemas.microsoft.com/office/drawing/2014/main" id="{9B2CE446-B129-4D50-8F08-38FBD85C39A0}"/>
+                  <a16:creationId xmlns:a16="http://schemas.microsoft.com/office/drawing/2014/main" id="{1DF5BE6C-6814-4D3A-8220-FC68E9558569}"/>
                 </a:ext>
               </a:extLst>
             </p:cNvPr>
@@ -4945,7 +5105,7 @@
           <p:spPr>
             <a:xfrm>
               <a:off x="10526802" y="2560615"/>
-              <a:ext cx="1005404" cy="341632"/>
+              <a:ext cx="1005403" cy="590931"/>
             </a:xfrm>
             <a:prstGeom prst="rect">
               <a:avLst/>
@@ -4968,15 +5128,26 @@
                 <a:t>David R</a:t>
               </a:r>
             </a:p>
+            <a:p>
+              <a:pPr algn="ctr">
+                <a:lnSpc>
+                  <a:spcPct val="90000"/>
+                </a:lnSpc>
+              </a:pPr>
+              <a:r>
+                <a:rPr lang="en-US" i="1" dirty="0"/>
+                <a:t>he/him</a:t>
+              </a:r>
+            </a:p>
           </p:txBody>
         </p:sp>
       </p:grpSp>
       <p:grpSp>
         <p:nvGrpSpPr>
-          <p:cNvPr id="23" name="Group 22">
+          <p:cNvPr id="38" name="Group 37">
             <a:extLst>
               <a:ext uri="{FF2B5EF4-FFF2-40B4-BE49-F238E27FC236}">
-                <a16:creationId xmlns:a16="http://schemas.microsoft.com/office/drawing/2014/main" id="{79D789EF-0EE4-4729-BB67-6FAFB89A9C86}"/>
+                <a16:creationId xmlns:a16="http://schemas.microsoft.com/office/drawing/2014/main" id="{96A37841-302F-439F-AD4A-BC6CBFC45875}"/>
               </a:ext>
             </a:extLst>
           </p:cNvPr>
@@ -4985,18 +5156,18 @@
         </p:nvGrpSpPr>
         <p:grpSpPr>
           <a:xfrm>
-            <a:off x="6920968" y="1325880"/>
-            <a:ext cx="918273" cy="1556198"/>
-            <a:chOff x="6632063" y="1346049"/>
-            <a:chExt cx="918273" cy="1556198"/>
+            <a:off x="6432794" y="1313616"/>
+            <a:ext cx="954107" cy="1805497"/>
+            <a:chOff x="6614147" y="1346049"/>
+            <a:chExt cx="954107" cy="1805497"/>
           </a:xfrm>
         </p:grpSpPr>
         <p:sp>
           <p:nvSpPr>
-            <p:cNvPr id="19" name="TextBox 18">
+            <p:cNvPr id="39" name="TextBox 38">
               <a:extLst>
                 <a:ext uri="{FF2B5EF4-FFF2-40B4-BE49-F238E27FC236}">
-                  <a16:creationId xmlns:a16="http://schemas.microsoft.com/office/drawing/2014/main" id="{55FEC4F2-AB39-4BC0-9A24-61C93B772F11}"/>
+                  <a16:creationId xmlns:a16="http://schemas.microsoft.com/office/drawing/2014/main" id="{91F59643-0E31-44F1-933A-708480356A41}"/>
                 </a:ext>
               </a:extLst>
             </p:cNvPr>
@@ -5005,8 +5176,8 @@
           </p:nvSpPr>
           <p:spPr>
             <a:xfrm>
-              <a:off x="6671854" y="2560615"/>
-              <a:ext cx="838691" cy="341632"/>
+              <a:off x="6614147" y="2560615"/>
+              <a:ext cx="954107" cy="590931"/>
             </a:xfrm>
             <a:prstGeom prst="rect">
               <a:avLst/>
@@ -5029,14 +5200,25 @@
                 <a:t>Anshu</a:t>
               </a:r>
             </a:p>
+            <a:p>
+              <a:pPr algn="ctr">
+                <a:lnSpc>
+                  <a:spcPct val="90000"/>
+                </a:lnSpc>
+              </a:pPr>
+              <a:r>
+                <a:rPr lang="en-US" i="1" dirty="0"/>
+                <a:t>she/her</a:t>
+              </a:r>
+            </a:p>
           </p:txBody>
         </p:sp>
         <p:pic>
           <p:nvPicPr>
-            <p:cNvPr id="8" name="Picture 7" descr="A person smiling for the camera&#10;&#10;Description automatically generated with low confidence">
+            <p:cNvPr id="40" name="Picture 39" descr="A person smiling for the camera&#10;&#10;Description automatically generated with low confidence">
               <a:extLst>
                 <a:ext uri="{FF2B5EF4-FFF2-40B4-BE49-F238E27FC236}">
-                  <a16:creationId xmlns:a16="http://schemas.microsoft.com/office/drawing/2014/main" id="{A9EF7D28-7532-4C2B-8BFB-66E033F0B493}"/>
+                  <a16:creationId xmlns:a16="http://schemas.microsoft.com/office/drawing/2014/main" id="{2C075EF2-F4FE-439A-833F-BF0C5FE074B6}"/>
                 </a:ext>
               </a:extLst>
             </p:cNvPr>
@@ -5046,7 +5228,7 @@
             <p:nvPr/>
           </p:nvPicPr>
           <p:blipFill>
-            <a:blip r:embed="rId6" cstate="print">
+            <a:blip r:embed="rId7" cstate="print">
               <a:extLst>
                 <a:ext uri="{28A0092B-C50C-407E-A947-70E740481C1C}">
                   <a14:useLocalDpi xmlns:a14="http://schemas.microsoft.com/office/drawing/2010/main" val="0"/>
@@ -9666,979 +9848,6 @@
       </p:grpSpPr>
       <p:sp>
         <p:nvSpPr>
-          <p:cNvPr id="3" name="Title 2">
-            <a:extLst>
-              <a:ext uri="{FF2B5EF4-FFF2-40B4-BE49-F238E27FC236}">
-                <a16:creationId xmlns:a16="http://schemas.microsoft.com/office/drawing/2014/main" id="{08EC2E83-5B91-447D-A363-53E4E7247F0E}"/>
-              </a:ext>
-            </a:extLst>
-          </p:cNvPr>
-          <p:cNvSpPr>
-            <a:spLocks noGrp="1"/>
-          </p:cNvSpPr>
-          <p:nvPr>
-            <p:ph type="title"/>
-          </p:nvPr>
-        </p:nvSpPr>
-        <p:spPr/>
-        <p:txBody>
-          <a:bodyPr/>
-          <a:lstStyle/>
-          <a:p>
-            <a:r>
-              <a:rPr lang="en-US" dirty="0"/>
-              <a:t>Tutorial Objectives</a:t>
-            </a:r>
-          </a:p>
-        </p:txBody>
-      </p:sp>
-      <p:sp>
-        <p:nvSpPr>
-          <p:cNvPr id="4" name="Content Placeholder 3">
-            <a:extLst>
-              <a:ext uri="{FF2B5EF4-FFF2-40B4-BE49-F238E27FC236}">
-                <a16:creationId xmlns:a16="http://schemas.microsoft.com/office/drawing/2014/main" id="{55CDB2E1-5AD6-4BAC-8479-FC105DBCEBB2}"/>
-              </a:ext>
-            </a:extLst>
-          </p:cNvPr>
-          <p:cNvSpPr>
-            <a:spLocks noGrp="1"/>
-          </p:cNvSpPr>
-          <p:nvPr>
-            <p:ph idx="1"/>
-          </p:nvPr>
-        </p:nvSpPr>
-        <p:spPr>
-          <a:xfrm>
-            <a:off x="365760" y="911509"/>
-            <a:ext cx="11369809" cy="4047778"/>
-          </a:xfrm>
-        </p:spPr>
-        <p:txBody>
-          <a:bodyPr/>
-          <a:lstStyle/>
-          <a:p>
-            <a:pPr marL="0" indent="0">
-              <a:buNone/>
-            </a:pPr>
-            <a:r>
-              <a:rPr lang="en-US" sz="2400" b="1" dirty="0"/>
-              <a:t>Overview of best practices in software engineering explicitly tailored for CSE </a:t>
-            </a:r>
-          </a:p>
-          <a:p>
-            <a:r>
-              <a:rPr lang="en-US" sz="2400" b="1" dirty="0"/>
-              <a:t>Why: </a:t>
-            </a:r>
-            <a:r>
-              <a:rPr lang="en-US" sz="2400" dirty="0"/>
-              <a:t>Increase CSE software quality, sustainability, productivity </a:t>
-            </a:r>
-          </a:p>
-          <a:p>
-            <a:pPr lvl="1">
-              <a:spcBef>
-                <a:spcPts val="200"/>
-              </a:spcBef>
-            </a:pPr>
-            <a:r>
-              <a:rPr lang="en-US" sz="2000" dirty="0"/>
-              <a:t>Better CSE software &gt; better CSE research &gt; broader CSE impact</a:t>
-            </a:r>
-          </a:p>
-          <a:p>
-            <a:r>
-              <a:rPr lang="en-US" sz="2400" b="1" dirty="0"/>
-              <a:t>Who: </a:t>
-            </a:r>
-            <a:r>
-              <a:rPr lang="en-US" sz="2400" dirty="0"/>
-              <a:t>Practices relevant for projects of all sizes</a:t>
-            </a:r>
-          </a:p>
-          <a:p>
-            <a:pPr lvl="1">
-              <a:spcBef>
-                <a:spcPts val="200"/>
-              </a:spcBef>
-            </a:pPr>
-            <a:r>
-              <a:rPr lang="en-US" sz="2000" b="1" dirty="0"/>
-              <a:t>emphasis on small teams</a:t>
-            </a:r>
-            <a:r>
-              <a:rPr lang="en-US" sz="2000" dirty="0"/>
-              <a:t>, e.g., a faculty member and </a:t>
-            </a:r>
-            <a:br>
-              <a:rPr lang="en-US" sz="2000" dirty="0"/>
-            </a:br>
-            <a:r>
-              <a:rPr lang="en-US" sz="2000" dirty="0"/>
-              <a:t>collaborating students  </a:t>
-            </a:r>
-          </a:p>
-          <a:p>
-            <a:r>
-              <a:rPr lang="en-US" sz="2400" b="1" dirty="0"/>
-              <a:t>Approach: </a:t>
-            </a:r>
-          </a:p>
-          <a:p>
-            <a:pPr lvl="1">
-              <a:spcBef>
-                <a:spcPts val="200"/>
-              </a:spcBef>
-            </a:pPr>
-            <a:r>
-              <a:rPr lang="en-US" sz="2000" b="1" dirty="0"/>
-              <a:t>Useful</a:t>
-            </a:r>
-            <a:r>
-              <a:rPr lang="en-US" sz="2000" dirty="0"/>
-              <a:t> information, examples, exercises, pointers to other resources</a:t>
-            </a:r>
-          </a:p>
-          <a:p>
-            <a:pPr lvl="1">
-              <a:spcBef>
-                <a:spcPts val="400"/>
-              </a:spcBef>
-            </a:pPr>
-            <a:r>
-              <a:rPr lang="en-US" sz="2000" b="1" dirty="0"/>
-              <a:t>Not to prescribe any particular practices </a:t>
-            </a:r>
-            <a:r>
-              <a:rPr lang="en-US" sz="2000" dirty="0"/>
-              <a:t>as “must use”</a:t>
-            </a:r>
-          </a:p>
-          <a:p>
-            <a:pPr lvl="2">
-              <a:spcBef>
-                <a:spcPts val="0"/>
-              </a:spcBef>
-            </a:pPr>
-            <a:r>
-              <a:rPr lang="en-US" sz="1800" dirty="0"/>
-              <a:t>Be informative about practices that have worked for some projects </a:t>
-            </a:r>
-          </a:p>
-          <a:p>
-            <a:pPr lvl="1">
-              <a:spcBef>
-                <a:spcPts val="400"/>
-              </a:spcBef>
-            </a:pPr>
-            <a:r>
-              <a:rPr lang="en-US" sz="2000" dirty="0"/>
-              <a:t>Recommend a series of small, </a:t>
-            </a:r>
-            <a:r>
-              <a:rPr lang="en-US" sz="2000" b="1" dirty="0"/>
-              <a:t>incremental improvements</a:t>
-            </a:r>
-          </a:p>
-          <a:p>
-            <a:pPr lvl="2">
-              <a:spcBef>
-                <a:spcPts val="0"/>
-              </a:spcBef>
-            </a:pPr>
-            <a:r>
-              <a:rPr lang="en-US" dirty="0"/>
-              <a:t>Emphasize adoption of practices that help productivity rather than put unsustainable burden </a:t>
-            </a:r>
-            <a:endParaRPr lang="en-US" b="1" dirty="0"/>
-          </a:p>
-          <a:p>
-            <a:pPr lvl="1">
-              <a:spcBef>
-                <a:spcPts val="400"/>
-              </a:spcBef>
-            </a:pPr>
-            <a:r>
-              <a:rPr lang="en-US" sz="2000" b="1" dirty="0"/>
-              <a:t>Customize as needed </a:t>
-            </a:r>
-            <a:r>
-              <a:rPr lang="en-US" sz="2000" dirty="0"/>
-              <a:t>for each project</a:t>
-            </a:r>
-          </a:p>
-          <a:p>
-            <a:r>
-              <a:rPr lang="en-US" dirty="0"/>
-              <a:t>Remember: your code will live longer than you expect.  </a:t>
-            </a:r>
-            <a:r>
-              <a:rPr lang="en-US" i="1" dirty="0"/>
-              <a:t>Prepare for it!</a:t>
-            </a:r>
-          </a:p>
-        </p:txBody>
-      </p:sp>
-      <p:grpSp>
-        <p:nvGrpSpPr>
-          <p:cNvPr id="5" name="Group 4">
-            <a:extLst>
-              <a:ext uri="{FF2B5EF4-FFF2-40B4-BE49-F238E27FC236}">
-                <a16:creationId xmlns:a16="http://schemas.microsoft.com/office/drawing/2014/main" id="{ED2C5026-F293-4875-A66A-F6C46B01146A}"/>
-              </a:ext>
-            </a:extLst>
-          </p:cNvPr>
-          <p:cNvGrpSpPr/>
-          <p:nvPr/>
-        </p:nvGrpSpPr>
-        <p:grpSpPr>
-          <a:xfrm>
-            <a:off x="8659808" y="2275103"/>
-            <a:ext cx="3345103" cy="1527135"/>
-            <a:chOff x="1221440" y="2819400"/>
-            <a:chExt cx="5136248" cy="2800725"/>
-          </a:xfrm>
-        </p:grpSpPr>
-        <p:cxnSp>
-          <p:nvCxnSpPr>
-            <p:cNvPr id="6" name="Straight Arrow Connector 5">
-              <a:extLst>
-                <a:ext uri="{FF2B5EF4-FFF2-40B4-BE49-F238E27FC236}">
-                  <a16:creationId xmlns:a16="http://schemas.microsoft.com/office/drawing/2014/main" id="{625DBA50-3A53-419B-9667-FA12BD4888EB}"/>
-                </a:ext>
-              </a:extLst>
-            </p:cNvPr>
-            <p:cNvCxnSpPr/>
-            <p:nvPr/>
-          </p:nvCxnSpPr>
-          <p:spPr>
-            <a:xfrm flipV="1">
-              <a:off x="1828800" y="2819400"/>
-              <a:ext cx="0" cy="2133600"/>
-            </a:xfrm>
-            <a:prstGeom prst="straightConnector1">
-              <a:avLst/>
-            </a:prstGeom>
-            <a:ln>
-              <a:tailEnd type="triangle"/>
-            </a:ln>
-          </p:spPr>
-          <p:style>
-            <a:lnRef idx="2">
-              <a:schemeClr val="dk1"/>
-            </a:lnRef>
-            <a:fillRef idx="0">
-              <a:schemeClr val="dk1"/>
-            </a:fillRef>
-            <a:effectRef idx="1">
-              <a:schemeClr val="dk1"/>
-            </a:effectRef>
-            <a:fontRef idx="minor">
-              <a:schemeClr val="tx1"/>
-            </a:fontRef>
-          </p:style>
-        </p:cxnSp>
-        <p:cxnSp>
-          <p:nvCxnSpPr>
-            <p:cNvPr id="7" name="Straight Arrow Connector 6">
-              <a:extLst>
-                <a:ext uri="{FF2B5EF4-FFF2-40B4-BE49-F238E27FC236}">
-                  <a16:creationId xmlns:a16="http://schemas.microsoft.com/office/drawing/2014/main" id="{8C82ED0C-2AD2-4C1D-8797-026D4CC8151E}"/>
-                </a:ext>
-              </a:extLst>
-            </p:cNvPr>
-            <p:cNvCxnSpPr/>
-            <p:nvPr/>
-          </p:nvCxnSpPr>
-          <p:spPr>
-            <a:xfrm>
-              <a:off x="1828800" y="4953000"/>
-              <a:ext cx="4267200" cy="0"/>
-            </a:xfrm>
-            <a:prstGeom prst="straightConnector1">
-              <a:avLst/>
-            </a:prstGeom>
-            <a:ln>
-              <a:tailEnd type="triangle"/>
-            </a:ln>
-          </p:spPr>
-          <p:style>
-            <a:lnRef idx="2">
-              <a:schemeClr val="dk1"/>
-            </a:lnRef>
-            <a:fillRef idx="0">
-              <a:schemeClr val="dk1"/>
-            </a:fillRef>
-            <a:effectRef idx="1">
-              <a:schemeClr val="dk1"/>
-            </a:effectRef>
-            <a:fontRef idx="minor">
-              <a:schemeClr val="tx1"/>
-            </a:fontRef>
-          </p:style>
-        </p:cxnSp>
-        <p:sp>
-          <p:nvSpPr>
-            <p:cNvPr id="8" name="TextBox 7">
-              <a:extLst>
-                <a:ext uri="{FF2B5EF4-FFF2-40B4-BE49-F238E27FC236}">
-                  <a16:creationId xmlns:a16="http://schemas.microsoft.com/office/drawing/2014/main" id="{F8BCC66B-95A7-4DB5-B0EC-DA978ECB1DBB}"/>
-                </a:ext>
-              </a:extLst>
-            </p:cNvPr>
-            <p:cNvSpPr txBox="1"/>
-            <p:nvPr/>
-          </p:nvSpPr>
-          <p:spPr>
-            <a:xfrm rot="16200000">
-              <a:off x="923849" y="3766860"/>
-              <a:ext cx="1067759" cy="472577"/>
-            </a:xfrm>
-            <a:prstGeom prst="rect">
-              <a:avLst/>
-            </a:prstGeom>
-            <a:noFill/>
-          </p:spPr>
-          <p:txBody>
-            <a:bodyPr wrap="none" rtlCol="0">
-              <a:spAutoFit/>
-            </a:bodyPr>
-            <a:lstStyle/>
-            <a:p>
-              <a:pPr marL="0" marR="0" lvl="0" indent="0" algn="l" defTabSz="914400" rtl="0" eaLnBrk="1" fontAlgn="base" latinLnBrk="0" hangingPunct="1">
-                <a:lnSpc>
-                  <a:spcPct val="100000"/>
-                </a:lnSpc>
-                <a:spcBef>
-                  <a:spcPct val="0"/>
-                </a:spcBef>
-                <a:spcAft>
-                  <a:spcPct val="0"/>
-                </a:spcAft>
-                <a:buClrTx/>
-                <a:buSzTx/>
-                <a:buFontTx/>
-                <a:buNone/>
-                <a:tabLst/>
-                <a:defRPr/>
-              </a:pPr>
-              <a:r>
-                <a:rPr kumimoji="0" lang="en-US" sz="1400" b="1" i="0" u="none" strike="noStrike" kern="1200" cap="none" spc="0" normalizeH="0" baseline="0" noProof="0" dirty="0">
-                  <a:ln>
-                    <a:noFill/>
-                  </a:ln>
-                  <a:solidFill>
-                    <a:prstClr val="black"/>
-                  </a:solidFill>
-                  <a:effectLst/>
-                  <a:uLnTx/>
-                  <a:uFillTx/>
-                  <a:latin typeface="Arial" charset="0"/>
-                  <a:ea typeface="+mn-ea"/>
-                  <a:cs typeface="Arial" charset="0"/>
-                </a:rPr>
-                <a:t>Cost</a:t>
-              </a:r>
-            </a:p>
-          </p:txBody>
-        </p:sp>
-        <p:sp>
-          <p:nvSpPr>
-            <p:cNvPr id="9" name="TextBox 8">
-              <a:extLst>
-                <a:ext uri="{FF2B5EF4-FFF2-40B4-BE49-F238E27FC236}">
-                  <a16:creationId xmlns:a16="http://schemas.microsoft.com/office/drawing/2014/main" id="{A2E370F4-0D29-4D47-A2EF-C0D66464F884}"/>
-                </a:ext>
-              </a:extLst>
-            </p:cNvPr>
-            <p:cNvSpPr txBox="1"/>
-            <p:nvPr/>
-          </p:nvSpPr>
-          <p:spPr>
-            <a:xfrm>
-              <a:off x="3228867" y="5053524"/>
-              <a:ext cx="1477294" cy="564455"/>
-            </a:xfrm>
-            <a:prstGeom prst="rect">
-              <a:avLst/>
-            </a:prstGeom>
-            <a:noFill/>
-          </p:spPr>
-          <p:txBody>
-            <a:bodyPr wrap="none" rtlCol="0">
-              <a:spAutoFit/>
-            </a:bodyPr>
-            <a:lstStyle/>
-            <a:p>
-              <a:pPr marL="0" marR="0" lvl="0" indent="0" algn="l" defTabSz="914400" rtl="0" eaLnBrk="1" fontAlgn="base" latinLnBrk="0" hangingPunct="1">
-                <a:lnSpc>
-                  <a:spcPct val="100000"/>
-                </a:lnSpc>
-                <a:spcBef>
-                  <a:spcPct val="0"/>
-                </a:spcBef>
-                <a:spcAft>
-                  <a:spcPct val="0"/>
-                </a:spcAft>
-                <a:buClrTx/>
-                <a:buSzTx/>
-                <a:buFontTx/>
-                <a:buNone/>
-                <a:tabLst/>
-                <a:defRPr/>
-              </a:pPr>
-              <a:r>
-                <a:rPr kumimoji="0" lang="en-US" sz="1400" b="1" i="0" u="none" strike="noStrike" kern="1200" cap="none" spc="0" normalizeH="0" baseline="0" noProof="0" dirty="0">
-                  <a:ln>
-                    <a:noFill/>
-                  </a:ln>
-                  <a:solidFill>
-                    <a:prstClr val="black"/>
-                  </a:solidFill>
-                  <a:effectLst/>
-                  <a:uLnTx/>
-                  <a:uFillTx/>
-                  <a:latin typeface="Arial" charset="0"/>
-                  <a:ea typeface="+mn-ea"/>
-                  <a:cs typeface="Arial" charset="0"/>
-                </a:rPr>
-                <a:t>Progress</a:t>
-              </a:r>
-            </a:p>
-          </p:txBody>
-        </p:sp>
-        <p:cxnSp>
-          <p:nvCxnSpPr>
-            <p:cNvPr id="10" name="Straight Connector 9">
-              <a:extLst>
-                <a:ext uri="{FF2B5EF4-FFF2-40B4-BE49-F238E27FC236}">
-                  <a16:creationId xmlns:a16="http://schemas.microsoft.com/office/drawing/2014/main" id="{59306A7D-D579-466C-8866-4AFB4F7B65DD}"/>
-                </a:ext>
-              </a:extLst>
-            </p:cNvPr>
-            <p:cNvCxnSpPr/>
-            <p:nvPr/>
-          </p:nvCxnSpPr>
-          <p:spPr>
-            <a:xfrm>
-              <a:off x="5715000" y="4816152"/>
-              <a:ext cx="0" cy="273696"/>
-            </a:xfrm>
-            <a:prstGeom prst="line">
-              <a:avLst/>
-            </a:prstGeom>
-            <a:ln>
-              <a:solidFill>
-                <a:schemeClr val="tx1"/>
-              </a:solidFill>
-            </a:ln>
-          </p:spPr>
-          <p:style>
-            <a:lnRef idx="2">
-              <a:schemeClr val="accent1"/>
-            </a:lnRef>
-            <a:fillRef idx="0">
-              <a:schemeClr val="accent1"/>
-            </a:fillRef>
-            <a:effectRef idx="1">
-              <a:schemeClr val="accent1"/>
-            </a:effectRef>
-            <a:fontRef idx="minor">
-              <a:schemeClr val="tx1"/>
-            </a:fontRef>
-          </p:style>
-        </p:cxnSp>
-        <p:sp>
-          <p:nvSpPr>
-            <p:cNvPr id="11" name="TextBox 10">
-              <a:extLst>
-                <a:ext uri="{FF2B5EF4-FFF2-40B4-BE49-F238E27FC236}">
-                  <a16:creationId xmlns:a16="http://schemas.microsoft.com/office/drawing/2014/main" id="{3D470693-7E1E-4171-B85B-B76EC6E00269}"/>
-                </a:ext>
-              </a:extLst>
-            </p:cNvPr>
-            <p:cNvSpPr txBox="1"/>
-            <p:nvPr/>
-          </p:nvSpPr>
-          <p:spPr>
-            <a:xfrm>
-              <a:off x="1513456" y="5042031"/>
-              <a:ext cx="864421" cy="564455"/>
-            </a:xfrm>
-            <a:prstGeom prst="rect">
-              <a:avLst/>
-            </a:prstGeom>
-            <a:noFill/>
-          </p:spPr>
-          <p:txBody>
-            <a:bodyPr wrap="none" rtlCol="0">
-              <a:spAutoFit/>
-            </a:bodyPr>
-            <a:lstStyle/>
-            <a:p>
-              <a:pPr marL="0" marR="0" lvl="0" indent="0" algn="l" defTabSz="914400" rtl="0" eaLnBrk="1" fontAlgn="base" latinLnBrk="0" hangingPunct="1">
-                <a:lnSpc>
-                  <a:spcPct val="100000"/>
-                </a:lnSpc>
-                <a:spcBef>
-                  <a:spcPct val="0"/>
-                </a:spcBef>
-                <a:spcAft>
-                  <a:spcPct val="0"/>
-                </a:spcAft>
-                <a:buClrTx/>
-                <a:buSzTx/>
-                <a:buFontTx/>
-                <a:buNone/>
-                <a:tabLst/>
-                <a:defRPr/>
-              </a:pPr>
-              <a:r>
-                <a:rPr kumimoji="0" lang="en-US" sz="1400" b="0" i="1" u="none" strike="noStrike" kern="1200" cap="none" spc="0" normalizeH="0" baseline="0" noProof="0" dirty="0">
-                  <a:ln>
-                    <a:noFill/>
-                  </a:ln>
-                  <a:solidFill>
-                    <a:prstClr val="black"/>
-                  </a:solidFill>
-                  <a:effectLst/>
-                  <a:uLnTx/>
-                  <a:uFillTx/>
-                  <a:latin typeface="Arial" charset="0"/>
-                  <a:ea typeface="+mn-ea"/>
-                  <a:cs typeface="Arial" charset="0"/>
-                </a:rPr>
-                <a:t>Start</a:t>
-              </a:r>
-            </a:p>
-          </p:txBody>
-        </p:sp>
-        <p:sp>
-          <p:nvSpPr>
-            <p:cNvPr id="12" name="TextBox 11">
-              <a:extLst>
-                <a:ext uri="{FF2B5EF4-FFF2-40B4-BE49-F238E27FC236}">
-                  <a16:creationId xmlns:a16="http://schemas.microsoft.com/office/drawing/2014/main" id="{3992A356-2838-4BF3-A6FF-DB1DE251E1B9}"/>
-                </a:ext>
-              </a:extLst>
-            </p:cNvPr>
-            <p:cNvSpPr txBox="1"/>
-            <p:nvPr/>
-          </p:nvSpPr>
-          <p:spPr>
-            <a:xfrm>
-              <a:off x="5340664" y="5055670"/>
-              <a:ext cx="1017024" cy="564455"/>
-            </a:xfrm>
-            <a:prstGeom prst="rect">
-              <a:avLst/>
-            </a:prstGeom>
-            <a:noFill/>
-          </p:spPr>
-          <p:txBody>
-            <a:bodyPr wrap="none" rtlCol="0">
-              <a:spAutoFit/>
-            </a:bodyPr>
-            <a:lstStyle/>
-            <a:p>
-              <a:pPr marL="0" marR="0" lvl="0" indent="0" algn="l" defTabSz="914400" rtl="0" eaLnBrk="1" fontAlgn="base" latinLnBrk="0" hangingPunct="1">
-                <a:lnSpc>
-                  <a:spcPct val="100000"/>
-                </a:lnSpc>
-                <a:spcBef>
-                  <a:spcPct val="0"/>
-                </a:spcBef>
-                <a:spcAft>
-                  <a:spcPct val="0"/>
-                </a:spcAft>
-                <a:buClrTx/>
-                <a:buSzTx/>
-                <a:buFontTx/>
-                <a:buNone/>
-                <a:tabLst/>
-                <a:defRPr/>
-              </a:pPr>
-              <a:r>
-                <a:rPr kumimoji="0" lang="en-US" sz="1400" b="0" i="1" u="none" strike="noStrike" kern="1200" cap="none" spc="0" normalizeH="0" baseline="0" noProof="0" dirty="0">
-                  <a:ln>
-                    <a:noFill/>
-                  </a:ln>
-                  <a:solidFill>
-                    <a:prstClr val="black"/>
-                  </a:solidFill>
-                  <a:effectLst/>
-                  <a:uLnTx/>
-                  <a:uFillTx/>
-                  <a:latin typeface="Arial" charset="0"/>
-                  <a:ea typeface="+mn-ea"/>
-                  <a:cs typeface="Arial" charset="0"/>
-                </a:rPr>
-                <a:t>Finish</a:t>
-              </a:r>
-            </a:p>
-          </p:txBody>
-        </p:sp>
-        <p:cxnSp>
-          <p:nvCxnSpPr>
-            <p:cNvPr id="13" name="Straight Connector 12">
-              <a:extLst>
-                <a:ext uri="{FF2B5EF4-FFF2-40B4-BE49-F238E27FC236}">
-                  <a16:creationId xmlns:a16="http://schemas.microsoft.com/office/drawing/2014/main" id="{10A9891B-AEE2-444A-AB4D-E3BCE77155D5}"/>
-                </a:ext>
-              </a:extLst>
-            </p:cNvPr>
-            <p:cNvCxnSpPr/>
-            <p:nvPr/>
-          </p:nvCxnSpPr>
-          <p:spPr>
-            <a:xfrm flipV="1">
-              <a:off x="1843033" y="2947405"/>
-              <a:ext cx="3891330" cy="2005595"/>
-            </a:xfrm>
-            <a:prstGeom prst="line">
-              <a:avLst/>
-            </a:prstGeom>
-            <a:ln>
-              <a:solidFill>
-                <a:srgbClr val="FF0000"/>
-              </a:solidFill>
-            </a:ln>
-          </p:spPr>
-          <p:style>
-            <a:lnRef idx="2">
-              <a:schemeClr val="accent1"/>
-            </a:lnRef>
-            <a:fillRef idx="0">
-              <a:schemeClr val="accent1"/>
-            </a:fillRef>
-            <a:effectRef idx="1">
-              <a:schemeClr val="accent1"/>
-            </a:effectRef>
-            <a:fontRef idx="minor">
-              <a:schemeClr val="tx1"/>
-            </a:fontRef>
-          </p:style>
-        </p:cxnSp>
-        <p:cxnSp>
-          <p:nvCxnSpPr>
-            <p:cNvPr id="14" name="Straight Connector 13">
-              <a:extLst>
-                <a:ext uri="{FF2B5EF4-FFF2-40B4-BE49-F238E27FC236}">
-                  <a16:creationId xmlns:a16="http://schemas.microsoft.com/office/drawing/2014/main" id="{047613D8-797E-417B-B8E3-697385BA8138}"/>
-                </a:ext>
-              </a:extLst>
-            </p:cNvPr>
-            <p:cNvCxnSpPr/>
-            <p:nvPr/>
-          </p:nvCxnSpPr>
-          <p:spPr>
-            <a:xfrm flipV="1">
-              <a:off x="1843033" y="4336335"/>
-              <a:ext cx="629455" cy="616665"/>
-            </a:xfrm>
-            <a:prstGeom prst="line">
-              <a:avLst/>
-            </a:prstGeom>
-            <a:ln>
-              <a:solidFill>
-                <a:srgbClr val="00B050"/>
-              </a:solidFill>
-            </a:ln>
-          </p:spPr>
-          <p:style>
-            <a:lnRef idx="2">
-              <a:schemeClr val="accent1"/>
-            </a:lnRef>
-            <a:fillRef idx="0">
-              <a:schemeClr val="accent1"/>
-            </a:fillRef>
-            <a:effectRef idx="1">
-              <a:schemeClr val="accent1"/>
-            </a:effectRef>
-            <a:fontRef idx="minor">
-              <a:schemeClr val="tx1"/>
-            </a:fontRef>
-          </p:style>
-        </p:cxnSp>
-        <p:cxnSp>
-          <p:nvCxnSpPr>
-            <p:cNvPr id="15" name="Straight Connector 14">
-              <a:extLst>
-                <a:ext uri="{FF2B5EF4-FFF2-40B4-BE49-F238E27FC236}">
-                  <a16:creationId xmlns:a16="http://schemas.microsoft.com/office/drawing/2014/main" id="{89318A58-E5F5-4B59-A0D5-5475E1E0E299}"/>
-                </a:ext>
-              </a:extLst>
-            </p:cNvPr>
-            <p:cNvCxnSpPr/>
-            <p:nvPr/>
-          </p:nvCxnSpPr>
-          <p:spPr>
-            <a:xfrm flipV="1">
-              <a:off x="2472489" y="3826882"/>
-              <a:ext cx="3235005" cy="509453"/>
-            </a:xfrm>
-            <a:prstGeom prst="line">
-              <a:avLst/>
-            </a:prstGeom>
-            <a:ln>
-              <a:solidFill>
-                <a:srgbClr val="00B050"/>
-              </a:solidFill>
-            </a:ln>
-          </p:spPr>
-          <p:style>
-            <a:lnRef idx="2">
-              <a:schemeClr val="accent1"/>
-            </a:lnRef>
-            <a:fillRef idx="0">
-              <a:schemeClr val="accent1"/>
-            </a:fillRef>
-            <a:effectRef idx="1">
-              <a:schemeClr val="accent1"/>
-            </a:effectRef>
-            <a:fontRef idx="minor">
-              <a:schemeClr val="tx1"/>
-            </a:fontRef>
-          </p:style>
-        </p:cxnSp>
-        <p:grpSp>
-          <p:nvGrpSpPr>
-            <p:cNvPr id="16" name="Group 15">
-              <a:extLst>
-                <a:ext uri="{FF2B5EF4-FFF2-40B4-BE49-F238E27FC236}">
-                  <a16:creationId xmlns:a16="http://schemas.microsoft.com/office/drawing/2014/main" id="{C52B53E9-BD65-46EF-98C1-CC306F93C3CB}"/>
-                </a:ext>
-              </a:extLst>
-            </p:cNvPr>
-            <p:cNvGrpSpPr/>
-            <p:nvPr/>
-          </p:nvGrpSpPr>
-          <p:grpSpPr>
-            <a:xfrm>
-              <a:off x="2057400" y="2947405"/>
-              <a:ext cx="2048669" cy="801054"/>
-              <a:chOff x="6663843" y="2438400"/>
-              <a:chExt cx="2048669" cy="801054"/>
-            </a:xfrm>
-          </p:grpSpPr>
-          <p:sp>
-            <p:nvSpPr>
-              <p:cNvPr id="17" name="TextBox 16">
-                <a:extLst>
-                  <a:ext uri="{FF2B5EF4-FFF2-40B4-BE49-F238E27FC236}">
-                    <a16:creationId xmlns:a16="http://schemas.microsoft.com/office/drawing/2014/main" id="{65F0C855-233F-4C29-B994-CDB75371A55D}"/>
-                  </a:ext>
-                </a:extLst>
-              </p:cNvPr>
-              <p:cNvSpPr txBox="1"/>
-              <p:nvPr/>
-            </p:nvSpPr>
-            <p:spPr>
-              <a:xfrm>
-                <a:off x="7120197" y="2438400"/>
-                <a:ext cx="1592315" cy="801054"/>
-              </a:xfrm>
-              <a:prstGeom prst="rect">
-                <a:avLst/>
-              </a:prstGeom>
-              <a:noFill/>
-            </p:spPr>
-            <p:txBody>
-              <a:bodyPr wrap="none" rtlCol="0">
-                <a:spAutoFit/>
-              </a:bodyPr>
-              <a:lstStyle/>
-              <a:p>
-                <a:pPr marL="0" marR="0" lvl="0" indent="0" algn="l" defTabSz="914400" rtl="0" eaLnBrk="1" fontAlgn="base" latinLnBrk="0" hangingPunct="1">
-                  <a:lnSpc>
-                    <a:spcPct val="100000"/>
-                  </a:lnSpc>
-                  <a:spcBef>
-                    <a:spcPct val="0"/>
-                  </a:spcBef>
-                  <a:spcAft>
-                    <a:spcPct val="0"/>
-                  </a:spcAft>
-                  <a:buClrTx/>
-                  <a:buSzTx/>
-                  <a:buFontTx/>
-                  <a:buNone/>
-                  <a:tabLst/>
-                  <a:defRPr/>
-                </a:pPr>
-                <a:r>
-                  <a:rPr kumimoji="0" lang="en-US" sz="1400" b="0" i="0" u="none" strike="noStrike" kern="1200" cap="none" spc="0" normalizeH="0" baseline="0" noProof="0" dirty="0">
-                    <a:ln>
-                      <a:noFill/>
-                    </a:ln>
-                    <a:solidFill>
-                      <a:prstClr val="black"/>
-                    </a:solidFill>
-                    <a:effectLst/>
-                    <a:uLnTx/>
-                    <a:uFillTx/>
-                    <a:latin typeface="Arial" charset="0"/>
-                    <a:ea typeface="+mn-ea"/>
-                    <a:cs typeface="Arial" charset="0"/>
-                  </a:rPr>
-                  <a:t>Old Process</a:t>
-                </a:r>
-              </a:p>
-              <a:p>
-                <a:pPr marL="0" marR="0" lvl="0" indent="0" algn="l" defTabSz="914400" rtl="0" eaLnBrk="1" fontAlgn="base" latinLnBrk="0" hangingPunct="1">
-                  <a:lnSpc>
-                    <a:spcPct val="100000"/>
-                  </a:lnSpc>
-                  <a:spcBef>
-                    <a:spcPct val="0"/>
-                  </a:spcBef>
-                  <a:spcAft>
-                    <a:spcPct val="0"/>
-                  </a:spcAft>
-                  <a:buClrTx/>
-                  <a:buSzTx/>
-                  <a:buFontTx/>
-                  <a:buNone/>
-                  <a:tabLst/>
-                  <a:defRPr/>
-                </a:pPr>
-                <a:r>
-                  <a:rPr kumimoji="0" lang="en-US" sz="1400" b="0" i="0" u="none" strike="noStrike" kern="1200" cap="none" spc="0" normalizeH="0" baseline="0" noProof="0" dirty="0">
-                    <a:ln>
-                      <a:noFill/>
-                    </a:ln>
-                    <a:solidFill>
-                      <a:prstClr val="black"/>
-                    </a:solidFill>
-                    <a:effectLst/>
-                    <a:uLnTx/>
-                    <a:uFillTx/>
-                    <a:latin typeface="Arial" charset="0"/>
-                    <a:ea typeface="+mn-ea"/>
-                    <a:cs typeface="Arial" charset="0"/>
-                  </a:rPr>
-                  <a:t>New Process</a:t>
-                </a:r>
-              </a:p>
-            </p:txBody>
-          </p:sp>
-          <p:cxnSp>
-            <p:nvCxnSpPr>
-              <p:cNvPr id="18" name="Straight Connector 17">
-                <a:extLst>
-                  <a:ext uri="{FF2B5EF4-FFF2-40B4-BE49-F238E27FC236}">
-                    <a16:creationId xmlns:a16="http://schemas.microsoft.com/office/drawing/2014/main" id="{1DF19475-7C9A-4B1C-9D15-B586E5B96000}"/>
-                  </a:ext>
-                </a:extLst>
-              </p:cNvPr>
-              <p:cNvCxnSpPr/>
-              <p:nvPr/>
-            </p:nvCxnSpPr>
-            <p:spPr>
-              <a:xfrm>
-                <a:off x="6663843" y="2590800"/>
-                <a:ext cx="433761" cy="0"/>
-              </a:xfrm>
-              <a:prstGeom prst="line">
-                <a:avLst/>
-              </a:prstGeom>
-              <a:ln>
-                <a:solidFill>
-                  <a:srgbClr val="FF0000"/>
-                </a:solidFill>
-              </a:ln>
-            </p:spPr>
-            <p:style>
-              <a:lnRef idx="2">
-                <a:schemeClr val="accent1"/>
-              </a:lnRef>
-              <a:fillRef idx="0">
-                <a:schemeClr val="accent1"/>
-              </a:fillRef>
-              <a:effectRef idx="1">
-                <a:schemeClr val="accent1"/>
-              </a:effectRef>
-              <a:fontRef idx="minor">
-                <a:schemeClr val="tx1"/>
-              </a:fontRef>
-            </p:style>
-          </p:cxnSp>
-          <p:cxnSp>
-            <p:nvCxnSpPr>
-              <p:cNvPr id="19" name="Straight Connector 18">
-                <a:extLst>
-                  <a:ext uri="{FF2B5EF4-FFF2-40B4-BE49-F238E27FC236}">
-                    <a16:creationId xmlns:a16="http://schemas.microsoft.com/office/drawing/2014/main" id="{955B4A1B-4C28-4961-8E6F-28CAD9EE3806}"/>
-                  </a:ext>
-                </a:extLst>
-              </p:cNvPr>
-              <p:cNvCxnSpPr/>
-              <p:nvPr/>
-            </p:nvCxnSpPr>
-            <p:spPr>
-              <a:xfrm>
-                <a:off x="6663843" y="2878138"/>
-                <a:ext cx="445057" cy="0"/>
-              </a:xfrm>
-              <a:prstGeom prst="line">
-                <a:avLst/>
-              </a:prstGeom>
-              <a:ln>
-                <a:solidFill>
-                  <a:srgbClr val="00B050"/>
-                </a:solidFill>
-              </a:ln>
-            </p:spPr>
-            <p:style>
-              <a:lnRef idx="2">
-                <a:schemeClr val="accent1"/>
-              </a:lnRef>
-              <a:fillRef idx="0">
-                <a:schemeClr val="accent1"/>
-              </a:fillRef>
-              <a:effectRef idx="1">
-                <a:schemeClr val="accent1"/>
-              </a:effectRef>
-              <a:fontRef idx="minor">
-                <a:schemeClr val="tx1"/>
-              </a:fontRef>
-            </p:style>
-          </p:cxnSp>
-        </p:grpSp>
-      </p:grpSp>
-    </p:spTree>
-    <p:extLst>
-      <p:ext uri="{BB962C8B-B14F-4D97-AF65-F5344CB8AC3E}">
-        <p14:creationId xmlns:p14="http://schemas.microsoft.com/office/powerpoint/2010/main" val="761674233"/>
-      </p:ext>
-    </p:extLst>
-  </p:cSld>
-  <p:clrMapOvr>
-    <a:masterClrMapping/>
-  </p:clrMapOvr>
-</p:sld>
-</file>
-
-<file path=ppt/slides/slide8.xml><?xml version="1.0" encoding="utf-8"?>
-<p:sld xmlns:a="http://schemas.openxmlformats.org/drawingml/2006/main" xmlns:r="http://schemas.openxmlformats.org/officeDocument/2006/relationships" xmlns:p="http://schemas.openxmlformats.org/presentationml/2006/main">
-  <p:cSld>
-    <p:spTree>
-      <p:nvGrpSpPr>
-        <p:cNvPr id="1" name=""/>
-        <p:cNvGrpSpPr/>
-        <p:nvPr/>
-      </p:nvGrpSpPr>
-      <p:grpSpPr>
-        <a:xfrm>
-          <a:off x="0" y="0"/>
-          <a:ext cx="0" cy="0"/>
-          <a:chOff x="0" y="0"/>
-          <a:chExt cx="0" cy="0"/>
-        </a:xfrm>
-      </p:grpSpPr>
-      <p:sp>
-        <p:nvSpPr>
           <p:cNvPr id="2" name="Title 1">
             <a:extLst>
               <a:ext uri="{FF2B5EF4-FFF2-40B4-BE49-F238E27FC236}">
@@ -10719,15 +9928,7 @@
             </a:pPr>
             <a:r>
               <a:rPr lang="en-US" dirty="0"/>
-              <a:t>Because of the limited time for this tutorial, the exercises will be </a:t>
-            </a:r>
-            <a:r>
-              <a:rPr lang="en-US" i="1" dirty="0"/>
-              <a:t>“homework”,</a:t>
-            </a:r>
-            <a:r>
-              <a:rPr lang="en-US" dirty="0"/>
-              <a:t> but we’ll be happy to give you feedback on your work</a:t>
+              <a:t>We have time in the agenda for the hands-on activities, but feel free to continue working on them outside of the tutorial.  We’ll give feedback on pull requests and issues filed (or email us, see next slide).</a:t>
             </a:r>
           </a:p>
           <a:p>
@@ -10738,12 +9939,8 @@
               <a:buNone/>
             </a:pPr>
             <a:r>
-              <a:rPr lang="en-US" b="1"/>
-              <a:t>Instructions </a:t>
-            </a:r>
-            <a:r>
               <a:rPr lang="en-US" b="1" dirty="0"/>
-              <a:t>on the tutorial web site: </a:t>
+              <a:t>Instructions on the tutorial web site: </a:t>
             </a:r>
             <a:r>
               <a:rPr lang="en-US" sz="2400" b="1" dirty="0">
@@ -10751,7 +9948,14 @@
               </a:rPr>
               <a:t>https://bssw-tutorial.github.io/</a:t>
             </a:r>
-            <a:endParaRPr lang="en-US" b="1" dirty="0"/>
+            <a:br>
+              <a:rPr lang="en-US" sz="2400" b="1" dirty="0"/>
+            </a:br>
+            <a:r>
+              <a:rPr lang="en-US" sz="2400" dirty="0"/>
+              <a:t>and click the link for today’s tutorial</a:t>
+            </a:r>
+            <a:endParaRPr lang="en-US" sz="2800" dirty="0"/>
           </a:p>
         </p:txBody>
       </p:sp>
@@ -10797,7 +10001,7 @@
 </p:sld>
 </file>
 
-<file path=ppt/slides/slide9.xml><?xml version="1.0" encoding="utf-8"?>
+<file path=ppt/slides/slide8.xml><?xml version="1.0" encoding="utf-8"?>
 <p:sld xmlns:a="http://schemas.openxmlformats.org/drawingml/2006/main" xmlns:r="http://schemas.openxmlformats.org/officeDocument/2006/relationships" xmlns:p="http://schemas.openxmlformats.org/presentationml/2006/main">
   <p:cSld>
     <p:spTree>
@@ -11919,12 +11123,9 @@
 </file>
 
 <file path=customXml/item1.xml><?xml version="1.0" encoding="utf-8"?>
-<?mso-contentType ?>
-<FormTemplates xmlns="http://schemas.microsoft.com/sharepoint/v3/contenttype/forms">
-  <Display>DocumentLibraryForm</Display>
-  <Edit>DocumentLibraryForm</Edit>
-  <New>DocumentLibraryForm</New>
-</FormTemplates>
+<p:properties xmlns:p="http://schemas.microsoft.com/office/2006/metadata/properties" xmlns:xsi="http://www.w3.org/2001/XMLSchema-instance" xmlns:pc="http://schemas.microsoft.com/office/infopath/2007/PartnerControls">
+  <documentManagement/>
+</p:properties>
 </file>
 
 <file path=customXml/item2.xml><?xml version="1.0" encoding="utf-8"?>
@@ -11977,15 +11178,25 @@
 </file>
 
 <file path=customXml/item3.xml><?xml version="1.0" encoding="utf-8"?>
-<p:properties xmlns:p="http://schemas.microsoft.com/office/2006/metadata/properties" xmlns:xsi="http://www.w3.org/2001/XMLSchema-instance" xmlns:pc="http://schemas.microsoft.com/office/infopath/2007/PartnerControls">
-  <documentManagement/>
-</p:properties>
+<?mso-contentType ?>
+<FormTemplates xmlns="http://schemas.microsoft.com/sharepoint/v3/contenttype/forms">
+  <Display>DocumentLibraryForm</Display>
+  <Edit>DocumentLibraryForm</Edit>
+  <New>DocumentLibraryForm</New>
+</FormTemplates>
 </file>
 
 <file path=customXml/itemProps1.xml><?xml version="1.0" encoding="utf-8"?>
-<ds:datastoreItem xmlns:ds="http://schemas.openxmlformats.org/officeDocument/2006/customXml" ds:itemID="{19E20559-B232-4371-8690-E3D8007EDB82}">
+<ds:datastoreItem xmlns:ds="http://schemas.openxmlformats.org/officeDocument/2006/customXml" ds:itemID="{A50EC660-24D0-43A0-AE5E-E274115E726B}">
   <ds:schemaRefs>
-    <ds:schemaRef ds:uri="http://schemas.microsoft.com/sharepoint/v3/contenttype/forms"/>
+    <ds:schemaRef ds:uri="http://purl.org/dc/elements/1.1/"/>
+    <ds:schemaRef ds:uri="http://schemas.microsoft.com/office/2006/metadata/properties"/>
+    <ds:schemaRef ds:uri="http://purl.org/dc/terms/"/>
+    <ds:schemaRef ds:uri="http://schemas.openxmlformats.org/package/2006/metadata/core-properties"/>
+    <ds:schemaRef ds:uri="http://schemas.microsoft.com/office/2006/documentManagement/types"/>
+    <ds:schemaRef ds:uri="http://www.w3.org/XML/1998/namespace"/>
+    <ds:schemaRef ds:uri="http://purl.org/dc/dcmitype/"/>
+    <ds:schemaRef ds:uri="http://schemas.microsoft.com/office/infopath/2007/PartnerControls"/>
   </ds:schemaRefs>
 </ds:datastoreItem>
 </file>
@@ -12006,16 +11217,9 @@
 </file>
 
 <file path=customXml/itemProps3.xml><?xml version="1.0" encoding="utf-8"?>
-<ds:datastoreItem xmlns:ds="http://schemas.openxmlformats.org/officeDocument/2006/customXml" ds:itemID="{A50EC660-24D0-43A0-AE5E-E274115E726B}">
+<ds:datastoreItem xmlns:ds="http://schemas.openxmlformats.org/officeDocument/2006/customXml" ds:itemID="{19E20559-B232-4371-8690-E3D8007EDB82}">
   <ds:schemaRefs>
-    <ds:schemaRef ds:uri="http://purl.org/dc/elements/1.1/"/>
-    <ds:schemaRef ds:uri="http://schemas.microsoft.com/office/2006/metadata/properties"/>
-    <ds:schemaRef ds:uri="http://purl.org/dc/terms/"/>
-    <ds:schemaRef ds:uri="http://schemas.openxmlformats.org/package/2006/metadata/core-properties"/>
-    <ds:schemaRef ds:uri="http://schemas.microsoft.com/office/2006/documentManagement/types"/>
-    <ds:schemaRef ds:uri="http://www.w3.org/XML/1998/namespace"/>
-    <ds:schemaRef ds:uri="http://purl.org/dc/dcmitype/"/>
-    <ds:schemaRef ds:uri="http://schemas.microsoft.com/office/infopath/2007/PartnerControls"/>
+    <ds:schemaRef ds:uri="http://schemas.microsoft.com/sharepoint/v3/contenttype/forms"/>
   </ds:schemaRefs>
 </ds:datastoreItem>
 </file>
</xml_diff>

<commit_message>
Added inclusive naming slide
</commit_message>
<xml_diff>
--- a/intro.pptx
+++ b/intro.pptx
@@ -5,10 +5,10 @@
     <p:sldMasterId id="2147483935" r:id="rId4"/>
   </p:sldMasterIdLst>
   <p:notesMasterIdLst>
-    <p:notesMasterId r:id="rId13"/>
+    <p:notesMasterId r:id="rId14"/>
   </p:notesMasterIdLst>
   <p:handoutMasterIdLst>
-    <p:handoutMasterId r:id="rId14"/>
+    <p:handoutMasterId r:id="rId15"/>
   </p:handoutMasterIdLst>
   <p:sldIdLst>
     <p:sldId id="617" r:id="rId5"/>
@@ -19,6 +19,7 @@
     <p:sldId id="329" r:id="rId10"/>
     <p:sldId id="314" r:id="rId11"/>
     <p:sldId id="616" r:id="rId12"/>
+    <p:sldId id="619" r:id="rId13"/>
   </p:sldIdLst>
   <p:sldSz cx="12188825" cy="6858000"/>
   <p:notesSz cx="7010400" cy="9296400"/>
@@ -262,7 +263,7 @@
           <a:p>
             <a:fld id="{0B842F42-2CE9-4E35-95C1-410DC08A50B1}" type="datetimeFigureOut">
               <a:rPr lang="en-US" smtClean="0"/>
-              <a:t>9/2/2021</a:t>
+              <a:t>9/24/2021</a:t>
             </a:fld>
             <a:endParaRPr lang="en-US"/>
           </a:p>
@@ -427,7 +428,7 @@
           <a:p>
             <a:fld id="{6F282904-F315-4730-8D91-37D99E141A6F}" type="datetimeFigureOut">
               <a:rPr lang="en-US" smtClean="0"/>
-              <a:t>9/2/2021</a:t>
+              <a:t>9/24/2021</a:t>
             </a:fld>
             <a:endParaRPr lang="en-US"/>
           </a:p>
@@ -10163,6 +10164,174 @@
 </p:sld>
 </file>
 
+<file path=ppt/slides/slide9.xml><?xml version="1.0" encoding="utf-8"?>
+<p:sld xmlns:a="http://schemas.openxmlformats.org/drawingml/2006/main" xmlns:r="http://schemas.openxmlformats.org/officeDocument/2006/relationships" xmlns:p="http://schemas.openxmlformats.org/presentationml/2006/main">
+  <p:cSld>
+    <p:spTree>
+      <p:nvGrpSpPr>
+        <p:cNvPr id="1" name=""/>
+        <p:cNvGrpSpPr/>
+        <p:nvPr/>
+      </p:nvGrpSpPr>
+      <p:grpSpPr>
+        <a:xfrm>
+          <a:off x="0" y="0"/>
+          <a:ext cx="0" cy="0"/>
+          <a:chOff x="0" y="0"/>
+          <a:chExt cx="0" cy="0"/>
+        </a:xfrm>
+      </p:grpSpPr>
+      <p:sp>
+        <p:nvSpPr>
+          <p:cNvPr id="2" name="Title 1">
+            <a:extLst>
+              <a:ext uri="{FF2B5EF4-FFF2-40B4-BE49-F238E27FC236}">
+                <a16:creationId xmlns:a16="http://schemas.microsoft.com/office/drawing/2014/main" id="{92FBE35E-77C5-46DD-9F5D-290B55BEC8BD}"/>
+              </a:ext>
+            </a:extLst>
+          </p:cNvPr>
+          <p:cNvSpPr>
+            <a:spLocks noGrp="1"/>
+          </p:cNvSpPr>
+          <p:nvPr>
+            <p:ph type="title"/>
+          </p:nvPr>
+        </p:nvSpPr>
+        <p:spPr/>
+        <p:txBody>
+          <a:bodyPr/>
+          <a:lstStyle/>
+          <a:p>
+            <a:r>
+              <a:rPr lang="en-US" dirty="0"/>
+              <a:t>The Importance of Naming</a:t>
+            </a:r>
+          </a:p>
+        </p:txBody>
+      </p:sp>
+      <p:sp>
+        <p:nvSpPr>
+          <p:cNvPr id="3" name="Content Placeholder 2">
+            <a:extLst>
+              <a:ext uri="{FF2B5EF4-FFF2-40B4-BE49-F238E27FC236}">
+                <a16:creationId xmlns:a16="http://schemas.microsoft.com/office/drawing/2014/main" id="{0570DD6F-C774-41C2-BFA4-30EE69373698}"/>
+              </a:ext>
+            </a:extLst>
+          </p:cNvPr>
+          <p:cNvSpPr>
+            <a:spLocks noGrp="1"/>
+          </p:cNvSpPr>
+          <p:nvPr>
+            <p:ph idx="1"/>
+          </p:nvPr>
+        </p:nvSpPr>
+        <p:spPr>
+          <a:xfrm>
+            <a:off x="365760" y="1231518"/>
+            <a:ext cx="11369809" cy="4047778"/>
+          </a:xfrm>
+        </p:spPr>
+        <p:txBody>
+          <a:bodyPr/>
+          <a:lstStyle/>
+          <a:p>
+            <a:r>
+              <a:rPr lang="en-US" dirty="0"/>
+              <a:t>Computing is rife with terminology that many consider harmful and exclusionary</a:t>
+            </a:r>
+          </a:p>
+          <a:p>
+            <a:pPr lvl="1"/>
+            <a:r>
+              <a:rPr lang="en-US" dirty="0"/>
+              <a:t>Examples include: whitelist/blacklist, master/slave, and master (standalone)</a:t>
+            </a:r>
+          </a:p>
+          <a:p>
+            <a:r>
+              <a:rPr lang="en-US" dirty="0"/>
+              <a:t>We support efforts to </a:t>
+            </a:r>
+            <a:r>
+              <a:rPr lang="en-US"/>
+              <a:t>replace such </a:t>
+            </a:r>
+            <a:r>
+              <a:rPr lang="en-US" dirty="0"/>
+              <a:t>language with more inclusive language</a:t>
+            </a:r>
+          </a:p>
+          <a:p>
+            <a:r>
+              <a:rPr lang="en-US" dirty="0"/>
+              <a:t>In this tutorial, we strive to use inclusive language</a:t>
+            </a:r>
+          </a:p>
+          <a:p>
+            <a:pPr lvl="1"/>
+            <a:r>
+              <a:rPr lang="en-US" dirty="0"/>
+              <a:t>Example: we use “main” for the default git branch, even where outside sources we reference may use “master”</a:t>
+            </a:r>
+          </a:p>
+          <a:p>
+            <a:r>
+              <a:rPr lang="en-US" dirty="0"/>
+              <a:t>If you note anything in our materials that you consider harmful or exclusionary, please bring it to our attention so we can change it</a:t>
+            </a:r>
+          </a:p>
+          <a:p>
+            <a:r>
+              <a:rPr lang="en-US" dirty="0"/>
+              <a:t>Additional information:</a:t>
+            </a:r>
+          </a:p>
+          <a:p>
+            <a:pPr lvl="1"/>
+            <a:r>
+              <a:rPr lang="en-US" dirty="0"/>
+              <a:t>The </a:t>
+            </a:r>
+            <a:r>
+              <a:rPr lang="en-US" dirty="0">
+                <a:hlinkClick r:id="rId2"/>
+              </a:rPr>
+              <a:t>Inclusive Naming Initiative</a:t>
+            </a:r>
+            <a:endParaRPr lang="en-US" dirty="0"/>
+          </a:p>
+          <a:p>
+            <a:pPr lvl="1"/>
+            <a:r>
+              <a:rPr lang="en-US" dirty="0"/>
+              <a:t>The BSSw.io </a:t>
+            </a:r>
+            <a:r>
+              <a:rPr lang="en-US" dirty="0">
+                <a:hlinkClick r:id="rId3"/>
+              </a:rPr>
+              <a:t>resource on inclusive naming</a:t>
+            </a:r>
+            <a:r>
+              <a:rPr lang="en-US" dirty="0"/>
+              <a:t> provides some additional context and links</a:t>
+            </a:r>
+          </a:p>
+        </p:txBody>
+      </p:sp>
+    </p:spTree>
+    <p:extLst>
+      <p:ext uri="{BB962C8B-B14F-4D97-AF65-F5344CB8AC3E}">
+        <p14:creationId xmlns:p14="http://schemas.microsoft.com/office/powerpoint/2010/main" val="3064435251"/>
+      </p:ext>
+    </p:extLst>
+  </p:cSld>
+  <p:clrMapOvr>
+    <a:masterClrMapping/>
+  </p:clrMapOvr>
+</p:sld>
+</file>
+
 <file path=ppt/theme/theme1.xml><?xml version="1.0" encoding="utf-8"?>
 <a:theme xmlns:a="http://schemas.openxmlformats.org/drawingml/2006/main" name="Presentations (Wide Screen)">
   <a:themeElements>
@@ -11076,21 +11245,6 @@
 </file>
 
 <file path=customXml/item1.xml><?xml version="1.0" encoding="utf-8"?>
-<p:properties xmlns:p="http://schemas.microsoft.com/office/2006/metadata/properties" xmlns:xsi="http://www.w3.org/2001/XMLSchema-instance" xmlns:pc="http://schemas.microsoft.com/office/infopath/2007/PartnerControls">
-  <documentManagement/>
-</p:properties>
-</file>
-
-<file path=customXml/item2.xml><?xml version="1.0" encoding="utf-8"?>
-<?mso-contentType ?>
-<FormTemplates xmlns="http://schemas.microsoft.com/sharepoint/v3/contenttype/forms">
-  <Display>DocumentLibraryForm</Display>
-  <Edit>DocumentLibraryForm</Edit>
-  <New>DocumentLibraryForm</New>
-</FormTemplates>
-</file>
-
-<file path=customXml/item3.xml><?xml version="1.0" encoding="utf-8"?>
 <ct:contentTypeSchema xmlns:ct="http://schemas.microsoft.com/office/2006/metadata/contentType" xmlns:ma="http://schemas.microsoft.com/office/2006/metadata/properties/metaAttributes" ct:_="" ma:_="" ma:contentTypeName="Document" ma:contentTypeID="0x010100565464437F680748A68B85EB6594EA7D" ma:contentTypeVersion="0" ma:contentTypeDescription="Create a new document." ma:contentTypeScope="" ma:versionID="fe3f4dd58d5914c51cfc6deaa8ad845c">
   <xsd:schema xmlns:xsd="http://www.w3.org/2001/XMLSchema" xmlns:p="http://schemas.microsoft.com/office/2006/metadata/properties" targetNamespace="http://schemas.microsoft.com/office/2006/metadata/properties" ma:root="true" ma:fieldsID="4aeb20c0e3442673af7ee10786458764">
     <xsd:element name="properties">
@@ -11139,17 +11293,32 @@
 </ct:contentTypeSchema>
 </file>
 
+<file path=customXml/item2.xml><?xml version="1.0" encoding="utf-8"?>
+<?mso-contentType ?>
+<FormTemplates xmlns="http://schemas.microsoft.com/sharepoint/v3/contenttype/forms">
+  <Display>DocumentLibraryForm</Display>
+  <Edit>DocumentLibraryForm</Edit>
+  <New>DocumentLibraryForm</New>
+</FormTemplates>
+</file>
+
+<file path=customXml/item3.xml><?xml version="1.0" encoding="utf-8"?>
+<p:properties xmlns:p="http://schemas.microsoft.com/office/2006/metadata/properties" xmlns:xsi="http://www.w3.org/2001/XMLSchema-instance" xmlns:pc="http://schemas.microsoft.com/office/infopath/2007/PartnerControls">
+  <documentManagement/>
+</p:properties>
+</file>
+
 <file path=customXml/itemProps1.xml><?xml version="1.0" encoding="utf-8"?>
-<ds:datastoreItem xmlns:ds="http://schemas.openxmlformats.org/officeDocument/2006/customXml" ds:itemID="{A50EC660-24D0-43A0-AE5E-E274115E726B}">
+<ds:datastoreItem xmlns:ds="http://schemas.openxmlformats.org/officeDocument/2006/customXml" ds:itemID="{E8DB7DEB-074E-4EE8-9B6E-FD277323109C}">
   <ds:schemaRefs>
+    <ds:schemaRef ds:uri="http://schemas.microsoft.com/office/2006/metadata/contentType"/>
+    <ds:schemaRef ds:uri="http://schemas.microsoft.com/office/2006/metadata/properties/metaAttributes"/>
+    <ds:schemaRef ds:uri="http://www.w3.org/2001/XMLSchema"/>
+    <ds:schemaRef ds:uri="http://schemas.microsoft.com/office/2006/metadata/properties"/>
+    <ds:schemaRef ds:uri="http://schemas.openxmlformats.org/package/2006/metadata/core-properties"/>
     <ds:schemaRef ds:uri="http://purl.org/dc/elements/1.1/"/>
-    <ds:schemaRef ds:uri="http://schemas.microsoft.com/office/2006/metadata/properties"/>
     <ds:schemaRef ds:uri="http://purl.org/dc/terms/"/>
-    <ds:schemaRef ds:uri="http://schemas.openxmlformats.org/package/2006/metadata/core-properties"/>
-    <ds:schemaRef ds:uri="http://schemas.microsoft.com/office/2006/documentManagement/types"/>
-    <ds:schemaRef ds:uri="http://www.w3.org/XML/1998/namespace"/>
-    <ds:schemaRef ds:uri="http://purl.org/dc/dcmitype/"/>
-    <ds:schemaRef ds:uri="http://schemas.microsoft.com/office/infopath/2007/PartnerControls"/>
+    <ds:schemaRef ds:uri="http://schemas.microsoft.com/office/internal/2005/internalDocumentation"/>
   </ds:schemaRefs>
 </ds:datastoreItem>
 </file>
@@ -11163,16 +11332,16 @@
 </file>
 
 <file path=customXml/itemProps3.xml><?xml version="1.0" encoding="utf-8"?>
-<ds:datastoreItem xmlns:ds="http://schemas.openxmlformats.org/officeDocument/2006/customXml" ds:itemID="{E8DB7DEB-074E-4EE8-9B6E-FD277323109C}">
+<ds:datastoreItem xmlns:ds="http://schemas.openxmlformats.org/officeDocument/2006/customXml" ds:itemID="{A50EC660-24D0-43A0-AE5E-E274115E726B}">
   <ds:schemaRefs>
-    <ds:schemaRef ds:uri="http://schemas.microsoft.com/office/2006/metadata/contentType"/>
-    <ds:schemaRef ds:uri="http://schemas.microsoft.com/office/2006/metadata/properties/metaAttributes"/>
-    <ds:schemaRef ds:uri="http://www.w3.org/2001/XMLSchema"/>
+    <ds:schemaRef ds:uri="http://purl.org/dc/elements/1.1/"/>
     <ds:schemaRef ds:uri="http://schemas.microsoft.com/office/2006/metadata/properties"/>
+    <ds:schemaRef ds:uri="http://purl.org/dc/terms/"/>
     <ds:schemaRef ds:uri="http://schemas.openxmlformats.org/package/2006/metadata/core-properties"/>
-    <ds:schemaRef ds:uri="http://purl.org/dc/elements/1.1/"/>
-    <ds:schemaRef ds:uri="http://purl.org/dc/terms/"/>
-    <ds:schemaRef ds:uri="http://schemas.microsoft.com/office/internal/2005/internalDocumentation"/>
+    <ds:schemaRef ds:uri="http://schemas.microsoft.com/office/2006/documentManagement/types"/>
+    <ds:schemaRef ds:uri="http://www.w3.org/XML/1998/namespace"/>
+    <ds:schemaRef ds:uri="http://purl.org/dc/dcmitype/"/>
+    <ds:schemaRef ds:uri="http://schemas.microsoft.com/office/infopath/2007/PartnerControls"/>
   </ds:schemaRefs>
 </ds:datastoreItem>
 </file>
</xml_diff>

<commit_message>
Further tweaks for SC21
</commit_message>
<xml_diff>
--- a/intro.pptx
+++ b/intro.pptx
@@ -5,10 +5,10 @@
     <p:sldMasterId id="2147483935" r:id="rId4"/>
   </p:sldMasterIdLst>
   <p:notesMasterIdLst>
-    <p:notesMasterId r:id="rId14"/>
+    <p:notesMasterId r:id="rId15"/>
   </p:notesMasterIdLst>
   <p:handoutMasterIdLst>
-    <p:handoutMasterId r:id="rId15"/>
+    <p:handoutMasterId r:id="rId16"/>
   </p:handoutMasterIdLst>
   <p:sldIdLst>
     <p:sldId id="617" r:id="rId5"/>
@@ -17,9 +17,10 @@
     <p:sldId id="327" r:id="rId8"/>
     <p:sldId id="324" r:id="rId9"/>
     <p:sldId id="329" r:id="rId10"/>
-    <p:sldId id="314" r:id="rId11"/>
-    <p:sldId id="616" r:id="rId12"/>
-    <p:sldId id="619" r:id="rId13"/>
+    <p:sldId id="619" r:id="rId11"/>
+    <p:sldId id="620" r:id="rId12"/>
+    <p:sldId id="314" r:id="rId13"/>
+    <p:sldId id="616" r:id="rId14"/>
   </p:sldIdLst>
   <p:sldSz cx="12188825" cy="6858000"/>
   <p:notesSz cx="7010400" cy="9296400"/>
@@ -263,7 +264,7 @@
           <a:p>
             <a:fld id="{0B842F42-2CE9-4E35-95C1-410DC08A50B1}" type="datetimeFigureOut">
               <a:rPr lang="en-US" smtClean="0"/>
-              <a:t>10/8/2021</a:t>
+              <a:t>10/10/2021</a:t>
             </a:fld>
             <a:endParaRPr lang="en-US"/>
           </a:p>
@@ -428,7 +429,7 @@
           <a:p>
             <a:fld id="{6F282904-F315-4730-8D91-37D99E141A6F}" type="datetimeFigureOut">
               <a:rPr lang="en-US" smtClean="0"/>
-              <a:t>10/8/2021</a:t>
+              <a:t>10/10/2021</a:t>
             </a:fld>
             <a:endParaRPr lang="en-US"/>
           </a:p>
@@ -4209,6 +4210,228 @@
 </p:sld>
 </file>
 
+<file path=ppt/slides/slide10.xml><?xml version="1.0" encoding="utf-8"?>
+<p:sld xmlns:a="http://schemas.openxmlformats.org/drawingml/2006/main" xmlns:r="http://schemas.openxmlformats.org/officeDocument/2006/relationships" xmlns:p="http://schemas.openxmlformats.org/presentationml/2006/main">
+  <p:cSld>
+    <p:spTree>
+      <p:nvGrpSpPr>
+        <p:cNvPr id="1" name=""/>
+        <p:cNvGrpSpPr/>
+        <p:nvPr/>
+      </p:nvGrpSpPr>
+      <p:grpSpPr>
+        <a:xfrm>
+          <a:off x="0" y="0"/>
+          <a:ext cx="0" cy="0"/>
+          <a:chOff x="0" y="0"/>
+          <a:chExt cx="0" cy="0"/>
+        </a:xfrm>
+      </p:grpSpPr>
+      <p:sp>
+        <p:nvSpPr>
+          <p:cNvPr id="2" name="Title 1">
+            <a:extLst>
+              <a:ext uri="{FF2B5EF4-FFF2-40B4-BE49-F238E27FC236}">
+                <a16:creationId xmlns:a16="http://schemas.microsoft.com/office/drawing/2014/main" id="{88D7CFF0-36AC-4BF3-96D2-C6F302144850}"/>
+              </a:ext>
+            </a:extLst>
+          </p:cNvPr>
+          <p:cNvSpPr>
+            <a:spLocks noGrp="1"/>
+          </p:cNvSpPr>
+          <p:nvPr>
+            <p:ph type="title"/>
+          </p:nvPr>
+        </p:nvSpPr>
+        <p:spPr/>
+        <p:txBody>
+          <a:bodyPr/>
+          <a:lstStyle/>
+          <a:p>
+            <a:r>
+              <a:rPr lang="en-US" dirty="0"/>
+              <a:t>We Want to Interact with You!</a:t>
+            </a:r>
+          </a:p>
+        </p:txBody>
+      </p:sp>
+      <p:sp>
+        <p:nvSpPr>
+          <p:cNvPr id="3" name="Content Placeholder 2">
+            <a:extLst>
+              <a:ext uri="{FF2B5EF4-FFF2-40B4-BE49-F238E27FC236}">
+                <a16:creationId xmlns:a16="http://schemas.microsoft.com/office/drawing/2014/main" id="{AEFD04A9-5547-4AC6-89F3-E6EEC039A00D}"/>
+              </a:ext>
+            </a:extLst>
+          </p:cNvPr>
+          <p:cNvSpPr>
+            <a:spLocks noGrp="1"/>
+          </p:cNvSpPr>
+          <p:nvPr>
+            <p:ph idx="1"/>
+          </p:nvPr>
+        </p:nvSpPr>
+        <p:spPr>
+          <a:xfrm>
+            <a:off x="365760" y="919230"/>
+            <a:ext cx="11369809" cy="4047778"/>
+          </a:xfrm>
+        </p:spPr>
+        <p:txBody>
+          <a:bodyPr/>
+          <a:lstStyle/>
+          <a:p>
+            <a:pPr>
+              <a:spcBef>
+                <a:spcPts val="1800"/>
+              </a:spcBef>
+            </a:pPr>
+            <a:r>
+              <a:rPr lang="en-US" dirty="0"/>
+              <a:t>We find these tutorials most interesting and informative (for everyone) if you ask questions and share experiences!</a:t>
+            </a:r>
+          </a:p>
+          <a:p>
+            <a:pPr lvl="1">
+              <a:spcBef>
+                <a:spcPts val="400"/>
+              </a:spcBef>
+            </a:pPr>
+            <a:r>
+              <a:rPr lang="en-US" dirty="0"/>
+              <a:t>We learn too!</a:t>
+            </a:r>
+          </a:p>
+          <a:p>
+            <a:pPr>
+              <a:spcBef>
+                <a:spcPts val="1200"/>
+              </a:spcBef>
+            </a:pPr>
+            <a:r>
+              <a:rPr lang="en-US" dirty="0"/>
+              <a:t>Please use Zoom chat to ask questions at any time</a:t>
+            </a:r>
+          </a:p>
+          <a:p>
+            <a:pPr>
+              <a:spcBef>
+                <a:spcPts val="1200"/>
+              </a:spcBef>
+            </a:pPr>
+            <a:r>
+              <a:rPr lang="en-US" dirty="0"/>
+              <a:t>We will hang around in Zoom during breaks and lunch for </a:t>
+            </a:r>
+            <a:r>
+              <a:rPr lang="en-US" u="sng" dirty="0"/>
+              <a:t>live</a:t>
+            </a:r>
+            <a:r>
+              <a:rPr lang="en-US" dirty="0"/>
+              <a:t> Q&amp;A/discussions with anyone interested</a:t>
+            </a:r>
+          </a:p>
+          <a:p>
+            <a:pPr lvl="1">
+              <a:spcBef>
+                <a:spcPts val="400"/>
+              </a:spcBef>
+            </a:pPr>
+            <a:r>
+              <a:rPr lang="en-US" dirty="0"/>
+              <a:t>Also during the hands-on session</a:t>
+            </a:r>
+          </a:p>
+          <a:p>
+            <a:pPr>
+              <a:spcBef>
+                <a:spcPts val="1200"/>
+              </a:spcBef>
+            </a:pPr>
+            <a:r>
+              <a:rPr lang="en-US" dirty="0"/>
+              <a:t>If you work on the hands-on activities, we’ll be glad to provide feedback</a:t>
+            </a:r>
+          </a:p>
+          <a:p>
+            <a:pPr lvl="1">
+              <a:spcBef>
+                <a:spcPts val="400"/>
+              </a:spcBef>
+            </a:pPr>
+            <a:r>
+              <a:rPr lang="en-US" dirty="0"/>
+              <a:t>Submit a pull request and we’ll take a look</a:t>
+            </a:r>
+          </a:p>
+          <a:p>
+            <a:pPr>
+              <a:spcBef>
+                <a:spcPts val="1200"/>
+              </a:spcBef>
+            </a:pPr>
+            <a:r>
+              <a:rPr lang="en-US" dirty="0"/>
+              <a:t>After the tutorial email us at </a:t>
+            </a:r>
+            <a:r>
+              <a:rPr lang="en-US" dirty="0">
+                <a:hlinkClick r:id="rId2"/>
+              </a:rPr>
+              <a:t>bssw-tutorial@lists.mcs.anl.gov</a:t>
+            </a:r>
+            <a:endParaRPr lang="en-US" dirty="0"/>
+          </a:p>
+          <a:p>
+            <a:pPr lvl="1">
+              <a:spcBef>
+                <a:spcPts val="400"/>
+              </a:spcBef>
+            </a:pPr>
+            <a:r>
+              <a:rPr lang="en-US" dirty="0"/>
+              <a:t>With questions or feedback</a:t>
+            </a:r>
+          </a:p>
+          <a:p>
+            <a:pPr lvl="1"/>
+            <a:r>
+              <a:rPr lang="en-US" dirty="0"/>
+              <a:t>The list moderator will allow your messages to be posted</a:t>
+            </a:r>
+          </a:p>
+          <a:p>
+            <a:r>
+              <a:rPr lang="en-US" dirty="0"/>
+              <a:t>Refer to </a:t>
+            </a:r>
+            <a:r>
+              <a:rPr lang="en-US" dirty="0">
+                <a:hlinkClick r:id="rId3"/>
+              </a:rPr>
+              <a:t>bssw-tutorial.github.io</a:t>
+            </a:r>
+            <a:r>
+              <a:rPr lang="en-US" dirty="0"/>
+              <a:t> page for all tutorial materials</a:t>
+            </a:r>
+          </a:p>
+        </p:txBody>
+      </p:sp>
+    </p:spTree>
+    <p:extLst>
+      <p:ext uri="{BB962C8B-B14F-4D97-AF65-F5344CB8AC3E}">
+        <p14:creationId xmlns:p14="http://schemas.microsoft.com/office/powerpoint/2010/main" val="3695382487"/>
+      </p:ext>
+    </p:extLst>
+  </p:cSld>
+  <p:clrMapOvr>
+    <a:masterClrMapping/>
+  </p:clrMapOvr>
+</p:sld>
+</file>
+
 <file path=ppt/slides/slide2.xml><?xml version="1.0" encoding="utf-8"?>
 <p:sld xmlns:a="http://schemas.openxmlformats.org/drawingml/2006/main" xmlns:r="http://schemas.openxmlformats.org/officeDocument/2006/relationships" xmlns:p="http://schemas.openxmlformats.org/presentationml/2006/main">
   <p:cSld>
@@ -4307,17 +4530,11 @@
               <a:rPr lang="en-US" sz="1600" dirty="0">
                 <a:hlinkClick r:id="rId2"/>
               </a:rPr>
-              <a:t>Creative</a:t>
-            </a:r>
-            <a:r>
-              <a:rPr lang="en-US" sz="1600" dirty="0">
-                <a:hlinkClick r:id="rId3"/>
-              </a:rPr>
-              <a:t> Commons Attribution 4.0 International License</a:t>
+              <a:t>Creative Commons Attribution 4.0 International License </a:t>
             </a:r>
             <a:r>
               <a:rPr lang="en-US" sz="1600" dirty="0"/>
-              <a:t> (CC BY 4.0).</a:t>
+              <a:t>(CC BY 4.0).</a:t>
             </a:r>
           </a:p>
           <a:p>
@@ -4332,7 +4549,7 @@
             </a:r>
             <a:r>
               <a:rPr lang="en-US" sz="1600" b="1" dirty="0">
-                <a:hlinkClick r:id="rId4"/>
+                <a:hlinkClick r:id="rId3"/>
               </a:rPr>
               <a:t>10.6084/m9.figshare.16556628</a:t>
             </a:r>
@@ -4473,7 +4690,7 @@
           <p:nvPr/>
         </p:nvPicPr>
         <p:blipFill>
-          <a:blip r:embed="rId5">
+          <a:blip r:embed="rId4">
             <a:extLst>
               <a:ext uri="{28A0092B-C50C-407E-A947-70E740481C1C}">
                 <a14:useLocalDpi xmlns:a14="http://schemas.microsoft.com/office/drawing/2010/main" val="0"/>
@@ -5250,14 +5467,19 @@
             <p:ph type="title"/>
           </p:nvPr>
         </p:nvSpPr>
-        <p:spPr/>
+        <p:spPr>
+          <a:xfrm>
+            <a:off x="365759" y="411480"/>
+            <a:ext cx="11439459" cy="914400"/>
+          </a:xfrm>
+        </p:spPr>
         <p:txBody>
           <a:bodyPr/>
           <a:lstStyle/>
           <a:p>
             <a:r>
               <a:rPr lang="en-US" dirty="0"/>
-              <a:t>The IDEAS-ECP team works with the ECP community to improve developer productivity and software sustainability as key aspects of increasing overall scientific productivity</a:t>
+              <a:t>The IDEAS-ECP team works with the ECP community, and beyond, to improve developer productivity and software sustainability as key aspects of increasing overall scientific productivity</a:t>
             </a:r>
           </a:p>
         </p:txBody>
@@ -9805,6 +10027,352 @@
           <p:cNvPr id="2" name="Title 1">
             <a:extLst>
               <a:ext uri="{FF2B5EF4-FFF2-40B4-BE49-F238E27FC236}">
+                <a16:creationId xmlns:a16="http://schemas.microsoft.com/office/drawing/2014/main" id="{92FBE35E-77C5-46DD-9F5D-290B55BEC8BD}"/>
+              </a:ext>
+            </a:extLst>
+          </p:cNvPr>
+          <p:cNvSpPr>
+            <a:spLocks noGrp="1"/>
+          </p:cNvSpPr>
+          <p:nvPr>
+            <p:ph type="title"/>
+          </p:nvPr>
+        </p:nvSpPr>
+        <p:spPr/>
+        <p:txBody>
+          <a:bodyPr/>
+          <a:lstStyle/>
+          <a:p>
+            <a:r>
+              <a:rPr lang="en-US" dirty="0"/>
+              <a:t>The Importance of Naming</a:t>
+            </a:r>
+          </a:p>
+        </p:txBody>
+      </p:sp>
+      <p:sp>
+        <p:nvSpPr>
+          <p:cNvPr id="3" name="Content Placeholder 2">
+            <a:extLst>
+              <a:ext uri="{FF2B5EF4-FFF2-40B4-BE49-F238E27FC236}">
+                <a16:creationId xmlns:a16="http://schemas.microsoft.com/office/drawing/2014/main" id="{0570DD6F-C774-41C2-BFA4-30EE69373698}"/>
+              </a:ext>
+            </a:extLst>
+          </p:cNvPr>
+          <p:cNvSpPr>
+            <a:spLocks noGrp="1"/>
+          </p:cNvSpPr>
+          <p:nvPr>
+            <p:ph idx="1"/>
+          </p:nvPr>
+        </p:nvSpPr>
+        <p:spPr>
+          <a:xfrm>
+            <a:off x="365760" y="1231518"/>
+            <a:ext cx="11369809" cy="4047778"/>
+          </a:xfrm>
+        </p:spPr>
+        <p:txBody>
+          <a:bodyPr/>
+          <a:lstStyle/>
+          <a:p>
+            <a:r>
+              <a:rPr lang="en-US" dirty="0"/>
+              <a:t>Computing is rife with terminology that many consider harmful and exclusionary</a:t>
+            </a:r>
+          </a:p>
+          <a:p>
+            <a:pPr lvl="1"/>
+            <a:r>
+              <a:rPr lang="en-US" dirty="0"/>
+              <a:t>Examples include: whitelist/blacklist, master/slave, and master (standalone)</a:t>
+            </a:r>
+          </a:p>
+          <a:p>
+            <a:r>
+              <a:rPr lang="en-US" dirty="0"/>
+              <a:t>We support efforts to replace such language with more inclusive language</a:t>
+            </a:r>
+          </a:p>
+          <a:p>
+            <a:r>
+              <a:rPr lang="en-US" dirty="0"/>
+              <a:t>In this tutorial, we strive to use inclusive language</a:t>
+            </a:r>
+          </a:p>
+          <a:p>
+            <a:pPr lvl="1"/>
+            <a:r>
+              <a:rPr lang="en-US" dirty="0"/>
+              <a:t>Example: we use “main” for the default git branch, even where outside sources we reference may use “master”</a:t>
+            </a:r>
+          </a:p>
+          <a:p>
+            <a:r>
+              <a:rPr lang="en-US" dirty="0"/>
+              <a:t>We welcome suggestions for further improvements in our tutorial</a:t>
+            </a:r>
+          </a:p>
+          <a:p>
+            <a:r>
+              <a:rPr lang="en-US" dirty="0"/>
+              <a:t>Additional information:</a:t>
+            </a:r>
+          </a:p>
+          <a:p>
+            <a:pPr lvl="1"/>
+            <a:r>
+              <a:rPr lang="en-US" dirty="0"/>
+              <a:t>The </a:t>
+            </a:r>
+            <a:r>
+              <a:rPr lang="en-US" dirty="0">
+                <a:hlinkClick r:id="rId2"/>
+              </a:rPr>
+              <a:t>Inclusive Naming Initiative</a:t>
+            </a:r>
+            <a:endParaRPr lang="en-US" dirty="0"/>
+          </a:p>
+          <a:p>
+            <a:pPr lvl="1"/>
+            <a:r>
+              <a:rPr lang="en-US" dirty="0"/>
+              <a:t>The BSSw.io </a:t>
+            </a:r>
+            <a:r>
+              <a:rPr lang="en-US" dirty="0">
+                <a:hlinkClick r:id="rId3"/>
+              </a:rPr>
+              <a:t>resource on inclusive naming</a:t>
+            </a:r>
+            <a:r>
+              <a:rPr lang="en-US" dirty="0"/>
+              <a:t> provides some additional context and links</a:t>
+            </a:r>
+          </a:p>
+        </p:txBody>
+      </p:sp>
+    </p:spTree>
+    <p:extLst>
+      <p:ext uri="{BB962C8B-B14F-4D97-AF65-F5344CB8AC3E}">
+        <p14:creationId xmlns:p14="http://schemas.microsoft.com/office/powerpoint/2010/main" val="3064435251"/>
+      </p:ext>
+    </p:extLst>
+  </p:cSld>
+  <p:clrMapOvr>
+    <a:masterClrMapping/>
+  </p:clrMapOvr>
+</p:sld>
+</file>
+
+<file path=ppt/slides/slide8.xml><?xml version="1.0" encoding="utf-8"?>
+<p:sld xmlns:a="http://schemas.openxmlformats.org/drawingml/2006/main" xmlns:r="http://schemas.openxmlformats.org/officeDocument/2006/relationships" xmlns:p="http://schemas.openxmlformats.org/presentationml/2006/main">
+  <p:cSld>
+    <p:spTree>
+      <p:nvGrpSpPr>
+        <p:cNvPr id="1" name=""/>
+        <p:cNvGrpSpPr/>
+        <p:nvPr/>
+      </p:nvGrpSpPr>
+      <p:grpSpPr>
+        <a:xfrm>
+          <a:off x="0" y="0"/>
+          <a:ext cx="0" cy="0"/>
+          <a:chOff x="0" y="0"/>
+          <a:chExt cx="0" cy="0"/>
+        </a:xfrm>
+      </p:grpSpPr>
+      <p:sp>
+        <p:nvSpPr>
+          <p:cNvPr id="2" name="Title 1">
+            <a:extLst>
+              <a:ext uri="{FF2B5EF4-FFF2-40B4-BE49-F238E27FC236}">
+                <a16:creationId xmlns:a16="http://schemas.microsoft.com/office/drawing/2014/main" id="{290A2901-48B8-469D-BFD7-34B28CA8F61C}"/>
+              </a:ext>
+            </a:extLst>
+          </p:cNvPr>
+          <p:cNvSpPr>
+            <a:spLocks noGrp="1"/>
+          </p:cNvSpPr>
+          <p:nvPr>
+            <p:ph type="title"/>
+          </p:nvPr>
+        </p:nvSpPr>
+        <p:spPr/>
+        <p:txBody>
+          <a:bodyPr/>
+          <a:lstStyle/>
+          <a:p>
+            <a:r>
+              <a:rPr lang="en-US" dirty="0" err="1"/>
+              <a:t>BSSw</a:t>
+            </a:r>
+            <a:r>
+              <a:rPr lang="en-US" dirty="0"/>
+              <a:t> Tutorial Web Site</a:t>
+            </a:r>
+          </a:p>
+        </p:txBody>
+      </p:sp>
+      <p:sp>
+        <p:nvSpPr>
+          <p:cNvPr id="3" name="Content Placeholder 2">
+            <a:extLst>
+              <a:ext uri="{FF2B5EF4-FFF2-40B4-BE49-F238E27FC236}">
+                <a16:creationId xmlns:a16="http://schemas.microsoft.com/office/drawing/2014/main" id="{1C6E25F3-5A8B-478E-83F2-ED0BCAF1B015}"/>
+              </a:ext>
+            </a:extLst>
+          </p:cNvPr>
+          <p:cNvSpPr>
+            <a:spLocks noGrp="1"/>
+          </p:cNvSpPr>
+          <p:nvPr>
+            <p:ph idx="1"/>
+          </p:nvPr>
+        </p:nvSpPr>
+        <p:spPr>
+          <a:xfrm>
+            <a:off x="365760" y="1737360"/>
+            <a:ext cx="7453937" cy="4047778"/>
+          </a:xfrm>
+        </p:spPr>
+        <p:txBody>
+          <a:bodyPr/>
+          <a:lstStyle/>
+          <a:p>
+            <a:r>
+              <a:rPr lang="en-US" sz="2400" b="1" dirty="0">
+                <a:hlinkClick r:id="rId2"/>
+              </a:rPr>
+              <a:t>https://bssw-tutorial.github.io/</a:t>
+            </a:r>
+            <a:r>
+              <a:rPr lang="en-US" sz="2400" b="1" dirty="0"/>
+              <a:t> </a:t>
+            </a:r>
+            <a:r>
+              <a:rPr lang="en-US" sz="2400" dirty="0"/>
+              <a:t>is the one URL you need to find all of the resources for this tutorial</a:t>
+            </a:r>
+          </a:p>
+          <a:p>
+            <a:r>
+              <a:rPr lang="en-US" dirty="0"/>
+              <a:t>Each tutorial event has its own page</a:t>
+            </a:r>
+          </a:p>
+          <a:p>
+            <a:pPr lvl="1"/>
+            <a:r>
+              <a:rPr lang="en-US" dirty="0"/>
+              <a:t>We will backfill tutorials before 2021 as time permits</a:t>
+            </a:r>
+          </a:p>
+          <a:p>
+            <a:r>
+              <a:rPr lang="en-US" dirty="0"/>
+              <a:t>Each tutorial page is considered archival</a:t>
+            </a:r>
+          </a:p>
+          <a:p>
+            <a:pPr lvl="1"/>
+            <a:r>
+              <a:rPr lang="en-US" dirty="0"/>
+              <a:t>All of the materials used in that tutorial (or links to them)</a:t>
+            </a:r>
+          </a:p>
+          <a:p>
+            <a:pPr lvl="1"/>
+            <a:r>
+              <a:rPr lang="en-US" dirty="0"/>
+              <a:t>Materials may be updated if we find mistakes</a:t>
+            </a:r>
+          </a:p>
+        </p:txBody>
+      </p:sp>
+      <p:pic>
+        <p:nvPicPr>
+          <p:cNvPr id="6" name="Picture 5" descr="Graphical user interface, text&#10;&#10;Description automatically generated">
+            <a:extLst>
+              <a:ext uri="{FF2B5EF4-FFF2-40B4-BE49-F238E27FC236}">
+                <a16:creationId xmlns:a16="http://schemas.microsoft.com/office/drawing/2014/main" id="{B36C999D-A67A-4A27-A8A2-05E0A7E3AD25}"/>
+              </a:ext>
+            </a:extLst>
+          </p:cNvPr>
+          <p:cNvPicPr>
+            <a:picLocks noChangeAspect="1"/>
+          </p:cNvPicPr>
+          <p:nvPr/>
+        </p:nvPicPr>
+        <p:blipFill>
+          <a:blip r:embed="rId3" cstate="print">
+            <a:extLst>
+              <a:ext uri="{28A0092B-C50C-407E-A947-70E740481C1C}">
+                <a14:useLocalDpi xmlns:a14="http://schemas.microsoft.com/office/drawing/2010/main" val="0"/>
+              </a:ext>
+            </a:extLst>
+          </a:blip>
+          <a:stretch>
+            <a:fillRect/>
+          </a:stretch>
+        </p:blipFill>
+        <p:spPr>
+          <a:xfrm>
+            <a:off x="7819697" y="455350"/>
+            <a:ext cx="4089597" cy="5345008"/>
+          </a:xfrm>
+          <a:prstGeom prst="rect">
+            <a:avLst/>
+          </a:prstGeom>
+          <a:ln>
+            <a:solidFill>
+              <a:schemeClr val="tx1"/>
+            </a:solidFill>
+          </a:ln>
+          <a:effectLst>
+            <a:outerShdw blurRad="50800" dist="38100" dir="2700000" algn="tl" rotWithShape="0">
+              <a:prstClr val="black">
+                <a:alpha val="40000"/>
+              </a:prstClr>
+            </a:outerShdw>
+          </a:effectLst>
+        </p:spPr>
+      </p:pic>
+    </p:spTree>
+    <p:extLst>
+      <p:ext uri="{BB962C8B-B14F-4D97-AF65-F5344CB8AC3E}">
+        <p14:creationId xmlns:p14="http://schemas.microsoft.com/office/powerpoint/2010/main" val="1366987390"/>
+      </p:ext>
+    </p:extLst>
+  </p:cSld>
+  <p:clrMapOvr>
+    <a:masterClrMapping/>
+  </p:clrMapOvr>
+</p:sld>
+</file>
+
+<file path=ppt/slides/slide9.xml><?xml version="1.0" encoding="utf-8"?>
+<p:sld xmlns:a="http://schemas.openxmlformats.org/drawingml/2006/main" xmlns:r="http://schemas.openxmlformats.org/officeDocument/2006/relationships" xmlns:p="http://schemas.openxmlformats.org/presentationml/2006/main">
+  <p:cSld>
+    <p:spTree>
+      <p:nvGrpSpPr>
+        <p:cNvPr id="1" name=""/>
+        <p:cNvGrpSpPr/>
+        <p:nvPr/>
+      </p:nvGrpSpPr>
+      <p:grpSpPr>
+        <a:xfrm>
+          <a:off x="0" y="0"/>
+          <a:ext cx="0" cy="0"/>
+          <a:chOff x="0" y="0"/>
+          <a:chExt cx="0" cy="0"/>
+        </a:xfrm>
+      </p:grpSpPr>
+      <p:sp>
+        <p:nvSpPr>
+          <p:cNvPr id="2" name="Title 1">
+            <a:extLst>
+              <a:ext uri="{FF2B5EF4-FFF2-40B4-BE49-F238E27FC236}">
                 <a16:creationId xmlns:a16="http://schemas.microsoft.com/office/drawing/2014/main" id="{965012BA-8349-4F63-995A-190570787086}"/>
               </a:ext>
             </a:extLst>
@@ -9865,30 +10433,52 @@
           <a:p>
             <a:pPr>
               <a:spcBef>
-                <a:spcPts val="800"/>
+                <a:spcPts val="400"/>
               </a:spcBef>
             </a:pPr>
             <a:r>
               <a:rPr lang="en-US" sz="2000" dirty="0"/>
-              <a:t>You don’t need to understand the math/physics to do the exercises, or find them useful</a:t>
+              <a:t>You don’t need to understand the math/physics to do the exercises, or to find them useful</a:t>
             </a:r>
           </a:p>
           <a:p>
             <a:pPr marL="0" indent="0">
               <a:spcBef>
-                <a:spcPts val="3600"/>
+                <a:spcPts val="2400"/>
               </a:spcBef>
               <a:buNone/>
             </a:pPr>
             <a:r>
               <a:rPr lang="en-US" dirty="0"/>
-              <a:t>We have some time in the agenda for the hands-on activities, but feel free to continue to work on them outside of the tutorial.  We’ll give feedback on pull requests and issues filed (or email us, see next slide).</a:t>
+              <a:t>We have some time in the agenda for the hands-on activities</a:t>
+            </a:r>
+          </a:p>
+          <a:p>
+            <a:pPr>
+              <a:spcBef>
+                <a:spcPts val="400"/>
+              </a:spcBef>
+            </a:pPr>
+            <a:r>
+              <a:rPr lang="en-US" sz="2000" dirty="0"/>
+              <a:t>But feel free to start early (i.e. during breaks) and continue after the tutorial</a:t>
+            </a:r>
+          </a:p>
+          <a:p>
+            <a:pPr>
+              <a:spcBef>
+                <a:spcPts val="400"/>
+              </a:spcBef>
+            </a:pPr>
+            <a:r>
+              <a:rPr lang="en-US" sz="2000" dirty="0"/>
+              <a:t>We’ll give feedback on pull requests and issues filed (or email us, see next slide).</a:t>
             </a:r>
           </a:p>
           <a:p>
             <a:pPr marL="0" indent="0">
               <a:spcBef>
-                <a:spcPts val="3600"/>
+                <a:spcPts val="2400"/>
               </a:spcBef>
               <a:buNone/>
             </a:pPr>
@@ -9946,372 +10536,6 @@
     <p:extLst>
       <p:ext uri="{BB962C8B-B14F-4D97-AF65-F5344CB8AC3E}">
         <p14:creationId xmlns:p14="http://schemas.microsoft.com/office/powerpoint/2010/main" val="2187668164"/>
-      </p:ext>
-    </p:extLst>
-  </p:cSld>
-  <p:clrMapOvr>
-    <a:masterClrMapping/>
-  </p:clrMapOvr>
-</p:sld>
-</file>
-
-<file path=ppt/slides/slide8.xml><?xml version="1.0" encoding="utf-8"?>
-<p:sld xmlns:a="http://schemas.openxmlformats.org/drawingml/2006/main" xmlns:r="http://schemas.openxmlformats.org/officeDocument/2006/relationships" xmlns:p="http://schemas.openxmlformats.org/presentationml/2006/main">
-  <p:cSld>
-    <p:spTree>
-      <p:nvGrpSpPr>
-        <p:cNvPr id="1" name=""/>
-        <p:cNvGrpSpPr/>
-        <p:nvPr/>
-      </p:nvGrpSpPr>
-      <p:grpSpPr>
-        <a:xfrm>
-          <a:off x="0" y="0"/>
-          <a:ext cx="0" cy="0"/>
-          <a:chOff x="0" y="0"/>
-          <a:chExt cx="0" cy="0"/>
-        </a:xfrm>
-      </p:grpSpPr>
-      <p:sp>
-        <p:nvSpPr>
-          <p:cNvPr id="2" name="Title 1">
-            <a:extLst>
-              <a:ext uri="{FF2B5EF4-FFF2-40B4-BE49-F238E27FC236}">
-                <a16:creationId xmlns:a16="http://schemas.microsoft.com/office/drawing/2014/main" id="{88D7CFF0-36AC-4BF3-96D2-C6F302144850}"/>
-              </a:ext>
-            </a:extLst>
-          </p:cNvPr>
-          <p:cNvSpPr>
-            <a:spLocks noGrp="1"/>
-          </p:cNvSpPr>
-          <p:nvPr>
-            <p:ph type="title"/>
-          </p:nvPr>
-        </p:nvSpPr>
-        <p:spPr/>
-        <p:txBody>
-          <a:bodyPr/>
-          <a:lstStyle/>
-          <a:p>
-            <a:r>
-              <a:rPr lang="en-US" dirty="0"/>
-              <a:t>We Want to Interact with You!</a:t>
-            </a:r>
-          </a:p>
-        </p:txBody>
-      </p:sp>
-      <p:sp>
-        <p:nvSpPr>
-          <p:cNvPr id="3" name="Content Placeholder 2">
-            <a:extLst>
-              <a:ext uri="{FF2B5EF4-FFF2-40B4-BE49-F238E27FC236}">
-                <a16:creationId xmlns:a16="http://schemas.microsoft.com/office/drawing/2014/main" id="{AEFD04A9-5547-4AC6-89F3-E6EEC039A00D}"/>
-              </a:ext>
-            </a:extLst>
-          </p:cNvPr>
-          <p:cNvSpPr>
-            <a:spLocks noGrp="1"/>
-          </p:cNvSpPr>
-          <p:nvPr>
-            <p:ph idx="1"/>
-          </p:nvPr>
-        </p:nvSpPr>
-        <p:spPr>
-          <a:xfrm>
-            <a:off x="365760" y="1228229"/>
-            <a:ext cx="11369809" cy="4047778"/>
-          </a:xfrm>
-        </p:spPr>
-        <p:txBody>
-          <a:bodyPr/>
-          <a:lstStyle/>
-          <a:p>
-            <a:pPr>
-              <a:spcBef>
-                <a:spcPts val="1800"/>
-              </a:spcBef>
-            </a:pPr>
-            <a:r>
-              <a:rPr lang="en-US" dirty="0"/>
-              <a:t>We find these tutorials most interesting and informative (for everyone) if you ask questions and share experiences!</a:t>
-            </a:r>
-          </a:p>
-          <a:p>
-            <a:pPr lvl="1">
-              <a:spcBef>
-                <a:spcPts val="400"/>
-              </a:spcBef>
-            </a:pPr>
-            <a:r>
-              <a:rPr lang="en-US" dirty="0"/>
-              <a:t>We learn too!</a:t>
-            </a:r>
-          </a:p>
-          <a:p>
-            <a:pPr>
-              <a:spcBef>
-                <a:spcPts val="1800"/>
-              </a:spcBef>
-            </a:pPr>
-            <a:r>
-              <a:rPr lang="en-US" dirty="0"/>
-              <a:t>Please use Zoom chat to ask questions at any time</a:t>
-            </a:r>
-          </a:p>
-          <a:p>
-            <a:pPr>
-              <a:spcBef>
-                <a:spcPts val="1800"/>
-              </a:spcBef>
-            </a:pPr>
-            <a:r>
-              <a:rPr lang="en-US" dirty="0"/>
-              <a:t>We will hang around in Zoom during breaks and lunch for </a:t>
-            </a:r>
-            <a:r>
-              <a:rPr lang="en-US" u="sng" dirty="0"/>
-              <a:t>live</a:t>
-            </a:r>
-            <a:r>
-              <a:rPr lang="en-US" dirty="0"/>
-              <a:t> Q&amp;A/discussions with anyone interested</a:t>
-            </a:r>
-          </a:p>
-          <a:p>
-            <a:pPr lvl="1">
-              <a:spcBef>
-                <a:spcPts val="400"/>
-              </a:spcBef>
-            </a:pPr>
-            <a:r>
-              <a:rPr lang="en-US" dirty="0"/>
-              <a:t>Also during the hands-on session</a:t>
-            </a:r>
-          </a:p>
-          <a:p>
-            <a:pPr>
-              <a:spcBef>
-                <a:spcPts val="1800"/>
-              </a:spcBef>
-            </a:pPr>
-            <a:r>
-              <a:rPr lang="en-US" dirty="0"/>
-              <a:t>If you work on the hands-on activities, we’ll be glad to provide feedback</a:t>
-            </a:r>
-          </a:p>
-          <a:p>
-            <a:pPr lvl="1">
-              <a:spcBef>
-                <a:spcPts val="400"/>
-              </a:spcBef>
-            </a:pPr>
-            <a:r>
-              <a:rPr lang="en-US" dirty="0"/>
-              <a:t>Submit a pull request and we’ll take a look</a:t>
-            </a:r>
-          </a:p>
-          <a:p>
-            <a:pPr>
-              <a:spcBef>
-                <a:spcPts val="1800"/>
-              </a:spcBef>
-            </a:pPr>
-            <a:r>
-              <a:rPr lang="en-US" dirty="0"/>
-              <a:t>After the tutorial email us at </a:t>
-            </a:r>
-            <a:r>
-              <a:rPr lang="en-US" dirty="0">
-                <a:hlinkClick r:id="rId2"/>
-              </a:rPr>
-              <a:t>bssw-tutorial@lists.mcs.anl.gov</a:t>
-            </a:r>
-            <a:endParaRPr lang="en-US" dirty="0"/>
-          </a:p>
-          <a:p>
-            <a:pPr lvl="1">
-              <a:spcBef>
-                <a:spcPts val="400"/>
-              </a:spcBef>
-            </a:pPr>
-            <a:r>
-              <a:rPr lang="en-US" dirty="0"/>
-              <a:t>With questions or feedback</a:t>
-            </a:r>
-          </a:p>
-          <a:p>
-            <a:pPr lvl="1"/>
-            <a:r>
-              <a:rPr lang="en-US" dirty="0"/>
-              <a:t>The list moderator will allow your messages to be posted</a:t>
-            </a:r>
-          </a:p>
-        </p:txBody>
-      </p:sp>
-    </p:spTree>
-    <p:extLst>
-      <p:ext uri="{BB962C8B-B14F-4D97-AF65-F5344CB8AC3E}">
-        <p14:creationId xmlns:p14="http://schemas.microsoft.com/office/powerpoint/2010/main" val="3695382487"/>
-      </p:ext>
-    </p:extLst>
-  </p:cSld>
-  <p:clrMapOvr>
-    <a:masterClrMapping/>
-  </p:clrMapOvr>
-</p:sld>
-</file>
-
-<file path=ppt/slides/slide9.xml><?xml version="1.0" encoding="utf-8"?>
-<p:sld xmlns:a="http://schemas.openxmlformats.org/drawingml/2006/main" xmlns:r="http://schemas.openxmlformats.org/officeDocument/2006/relationships" xmlns:p="http://schemas.openxmlformats.org/presentationml/2006/main">
-  <p:cSld>
-    <p:spTree>
-      <p:nvGrpSpPr>
-        <p:cNvPr id="1" name=""/>
-        <p:cNvGrpSpPr/>
-        <p:nvPr/>
-      </p:nvGrpSpPr>
-      <p:grpSpPr>
-        <a:xfrm>
-          <a:off x="0" y="0"/>
-          <a:ext cx="0" cy="0"/>
-          <a:chOff x="0" y="0"/>
-          <a:chExt cx="0" cy="0"/>
-        </a:xfrm>
-      </p:grpSpPr>
-      <p:sp>
-        <p:nvSpPr>
-          <p:cNvPr id="2" name="Title 1">
-            <a:extLst>
-              <a:ext uri="{FF2B5EF4-FFF2-40B4-BE49-F238E27FC236}">
-                <a16:creationId xmlns:a16="http://schemas.microsoft.com/office/drawing/2014/main" id="{92FBE35E-77C5-46DD-9F5D-290B55BEC8BD}"/>
-              </a:ext>
-            </a:extLst>
-          </p:cNvPr>
-          <p:cNvSpPr>
-            <a:spLocks noGrp="1"/>
-          </p:cNvSpPr>
-          <p:nvPr>
-            <p:ph type="title"/>
-          </p:nvPr>
-        </p:nvSpPr>
-        <p:spPr/>
-        <p:txBody>
-          <a:bodyPr/>
-          <a:lstStyle/>
-          <a:p>
-            <a:r>
-              <a:rPr lang="en-US" dirty="0"/>
-              <a:t>The Importance of Naming</a:t>
-            </a:r>
-          </a:p>
-        </p:txBody>
-      </p:sp>
-      <p:sp>
-        <p:nvSpPr>
-          <p:cNvPr id="3" name="Content Placeholder 2">
-            <a:extLst>
-              <a:ext uri="{FF2B5EF4-FFF2-40B4-BE49-F238E27FC236}">
-                <a16:creationId xmlns:a16="http://schemas.microsoft.com/office/drawing/2014/main" id="{0570DD6F-C774-41C2-BFA4-30EE69373698}"/>
-              </a:ext>
-            </a:extLst>
-          </p:cNvPr>
-          <p:cNvSpPr>
-            <a:spLocks noGrp="1"/>
-          </p:cNvSpPr>
-          <p:nvPr>
-            <p:ph idx="1"/>
-          </p:nvPr>
-        </p:nvSpPr>
-        <p:spPr>
-          <a:xfrm>
-            <a:off x="365760" y="1231518"/>
-            <a:ext cx="11369809" cy="4047778"/>
-          </a:xfrm>
-        </p:spPr>
-        <p:txBody>
-          <a:bodyPr/>
-          <a:lstStyle/>
-          <a:p>
-            <a:r>
-              <a:rPr lang="en-US" dirty="0"/>
-              <a:t>Computing is rife with terminology that many consider harmful and exclusionary</a:t>
-            </a:r>
-          </a:p>
-          <a:p>
-            <a:pPr lvl="1"/>
-            <a:r>
-              <a:rPr lang="en-US" dirty="0"/>
-              <a:t>Examples include: whitelist/blacklist, master/slave, and master (standalone)</a:t>
-            </a:r>
-          </a:p>
-          <a:p>
-            <a:r>
-              <a:rPr lang="en-US" dirty="0"/>
-              <a:t>We support efforts to replace such language with more inclusive language</a:t>
-            </a:r>
-          </a:p>
-          <a:p>
-            <a:r>
-              <a:rPr lang="en-US" dirty="0"/>
-              <a:t>In this tutorial, we strive to use inclusive language</a:t>
-            </a:r>
-          </a:p>
-          <a:p>
-            <a:pPr lvl="1"/>
-            <a:r>
-              <a:rPr lang="en-US" dirty="0"/>
-              <a:t>Example: we use “main” for the default git branch, even where outside sources we reference may use “master”</a:t>
-            </a:r>
-          </a:p>
-          <a:p>
-            <a:r>
-              <a:rPr lang="en-US" dirty="0"/>
-              <a:t>We welcome suggestions for further improvements in our tutorial</a:t>
-            </a:r>
-          </a:p>
-          <a:p>
-            <a:r>
-              <a:rPr lang="en-US" dirty="0"/>
-              <a:t>Additional information:</a:t>
-            </a:r>
-          </a:p>
-          <a:p>
-            <a:pPr lvl="1"/>
-            <a:r>
-              <a:rPr lang="en-US" dirty="0"/>
-              <a:t>The </a:t>
-            </a:r>
-            <a:r>
-              <a:rPr lang="en-US" dirty="0">
-                <a:hlinkClick r:id="rId2"/>
-              </a:rPr>
-              <a:t>Inclusive Naming Initiative</a:t>
-            </a:r>
-            <a:endParaRPr lang="en-US" dirty="0"/>
-          </a:p>
-          <a:p>
-            <a:pPr lvl="1"/>
-            <a:r>
-              <a:rPr lang="en-US" dirty="0"/>
-              <a:t>The BSSw.io </a:t>
-            </a:r>
-            <a:r>
-              <a:rPr lang="en-US" dirty="0">
-                <a:hlinkClick r:id="rId3"/>
-              </a:rPr>
-              <a:t>resource on inclusive naming</a:t>
-            </a:r>
-            <a:r>
-              <a:rPr lang="en-US" dirty="0"/>
-              <a:t> provides some additional context and links</a:t>
-            </a:r>
-          </a:p>
-        </p:txBody>
-      </p:sp>
-    </p:spTree>
-    <p:extLst>
-      <p:ext uri="{BB962C8B-B14F-4D97-AF65-F5344CB8AC3E}">
-        <p14:creationId xmlns:p14="http://schemas.microsoft.com/office/powerpoint/2010/main" val="3064435251"/>
       </p:ext>
     </p:extLst>
   </p:cSld>

</xml_diff>

<commit_message>
Improvements prior to recording
</commit_message>
<xml_diff>
--- a/intro.pptx
+++ b/intro.pptx
@@ -5,10 +5,10 @@
     <p:sldMasterId id="2147483935" r:id="rId4"/>
   </p:sldMasterIdLst>
   <p:notesMasterIdLst>
-    <p:notesMasterId r:id="rId15"/>
+    <p:notesMasterId r:id="rId16"/>
   </p:notesMasterIdLst>
   <p:handoutMasterIdLst>
-    <p:handoutMasterId r:id="rId16"/>
+    <p:handoutMasterId r:id="rId17"/>
   </p:handoutMasterIdLst>
   <p:sldIdLst>
     <p:sldId id="617" r:id="rId5"/>
@@ -20,7 +20,8 @@
     <p:sldId id="619" r:id="rId11"/>
     <p:sldId id="620" r:id="rId12"/>
     <p:sldId id="314" r:id="rId13"/>
-    <p:sldId id="616" r:id="rId14"/>
+    <p:sldId id="622" r:id="rId14"/>
+    <p:sldId id="616" r:id="rId15"/>
   </p:sldIdLst>
   <p:sldSz cx="12188825" cy="6858000"/>
   <p:notesSz cx="7010400" cy="9296400"/>
@@ -264,7 +265,7 @@
           <a:p>
             <a:fld id="{0B842F42-2CE9-4E35-95C1-410DC08A50B1}" type="datetimeFigureOut">
               <a:rPr lang="en-US" smtClean="0"/>
-              <a:t>10/10/2021</a:t>
+              <a:t>10/11/2021</a:t>
             </a:fld>
             <a:endParaRPr lang="en-US"/>
           </a:p>
@@ -429,7 +430,7 @@
           <a:p>
             <a:fld id="{6F282904-F315-4730-8D91-37D99E141A6F}" type="datetimeFigureOut">
               <a:rPr lang="en-US" smtClean="0"/>
-              <a:t>10/10/2021</a:t>
+              <a:t>10/11/2021</a:t>
             </a:fld>
             <a:endParaRPr lang="en-US"/>
           </a:p>
@@ -4211,6 +4212,157 @@
 </file>
 
 <file path=ppt/slides/slide10.xml><?xml version="1.0" encoding="utf-8"?>
+<p:sld xmlns:a="http://schemas.openxmlformats.org/drawingml/2006/main" xmlns:r="http://schemas.openxmlformats.org/officeDocument/2006/relationships" xmlns:p="http://schemas.openxmlformats.org/presentationml/2006/main">
+  <p:cSld>
+    <p:spTree>
+      <p:nvGrpSpPr>
+        <p:cNvPr id="1" name=""/>
+        <p:cNvGrpSpPr/>
+        <p:nvPr/>
+      </p:nvGrpSpPr>
+      <p:grpSpPr>
+        <a:xfrm>
+          <a:off x="0" y="0"/>
+          <a:ext cx="0" cy="0"/>
+          <a:chOff x="0" y="0"/>
+          <a:chExt cx="0" cy="0"/>
+        </a:xfrm>
+      </p:grpSpPr>
+      <p:sp>
+        <p:nvSpPr>
+          <p:cNvPr id="2" name="Title 1">
+            <a:extLst>
+              <a:ext uri="{FF2B5EF4-FFF2-40B4-BE49-F238E27FC236}">
+                <a16:creationId xmlns:a16="http://schemas.microsoft.com/office/drawing/2014/main" id="{7E57752C-4E2B-4E58-8726-8BAC8610FAC7}"/>
+              </a:ext>
+            </a:extLst>
+          </p:cNvPr>
+          <p:cNvSpPr>
+            <a:spLocks noGrp="1"/>
+          </p:cNvSpPr>
+          <p:nvPr>
+            <p:ph type="title"/>
+          </p:nvPr>
+        </p:nvSpPr>
+        <p:spPr/>
+        <p:txBody>
+          <a:bodyPr/>
+          <a:lstStyle/>
+          <a:p>
+            <a:r>
+              <a:rPr lang="en-US" dirty="0"/>
+              <a:t>Explaining Slide 2</a:t>
+            </a:r>
+          </a:p>
+        </p:txBody>
+      </p:sp>
+      <p:sp>
+        <p:nvSpPr>
+          <p:cNvPr id="3" name="Content Placeholder 2">
+            <a:extLst>
+              <a:ext uri="{FF2B5EF4-FFF2-40B4-BE49-F238E27FC236}">
+                <a16:creationId xmlns:a16="http://schemas.microsoft.com/office/drawing/2014/main" id="{9A010E9D-1983-429B-A89D-EBF4829E152F}"/>
+              </a:ext>
+            </a:extLst>
+          </p:cNvPr>
+          <p:cNvSpPr>
+            <a:spLocks noGrp="1"/>
+          </p:cNvSpPr>
+          <p:nvPr>
+            <p:ph idx="1"/>
+          </p:nvPr>
+        </p:nvSpPr>
+        <p:spPr>
+          <a:xfrm>
+            <a:off x="365760" y="1049985"/>
+            <a:ext cx="11369809" cy="4047778"/>
+          </a:xfrm>
+        </p:spPr>
+        <p:txBody>
+          <a:bodyPr/>
+          <a:lstStyle/>
+          <a:p>
+            <a:r>
+              <a:rPr lang="en-US" dirty="0"/>
+              <a:t>Slide 2 in all of our presentations contains the license, citation, and acknowledgements for the tutorial</a:t>
+            </a:r>
+          </a:p>
+          <a:p>
+            <a:r>
+              <a:rPr lang="en-US" dirty="0"/>
+              <a:t>(Software) best practice to make your license and preferred citation(s) easily finable</a:t>
+            </a:r>
+          </a:p>
+          <a:p>
+            <a:r>
+              <a:rPr lang="en-US" dirty="0"/>
+              <a:t>Sponsor acknowledgements rarely hurt!</a:t>
+            </a:r>
+          </a:p>
+        </p:txBody>
+      </p:sp>
+      <p:pic>
+        <p:nvPicPr>
+          <p:cNvPr id="5" name="Picture 4" descr="Text, letter&#10;&#10;Description automatically generated">
+            <a:extLst>
+              <a:ext uri="{FF2B5EF4-FFF2-40B4-BE49-F238E27FC236}">
+                <a16:creationId xmlns:a16="http://schemas.microsoft.com/office/drawing/2014/main" id="{22D90CE1-3CF5-4211-AEA5-0280F6866EDC}"/>
+              </a:ext>
+            </a:extLst>
+          </p:cNvPr>
+          <p:cNvPicPr>
+            <a:picLocks noChangeAspect="1"/>
+          </p:cNvPicPr>
+          <p:nvPr/>
+        </p:nvPicPr>
+        <p:blipFill>
+          <a:blip r:embed="rId2" cstate="print">
+            <a:extLst>
+              <a:ext uri="{28A0092B-C50C-407E-A947-70E740481C1C}">
+                <a14:useLocalDpi xmlns:a14="http://schemas.microsoft.com/office/drawing/2010/main" val="0"/>
+              </a:ext>
+            </a:extLst>
+          </a:blip>
+          <a:stretch>
+            <a:fillRect/>
+          </a:stretch>
+        </p:blipFill>
+        <p:spPr>
+          <a:xfrm>
+            <a:off x="3599267" y="3166700"/>
+            <a:ext cx="4990290" cy="2807038"/>
+          </a:xfrm>
+          <a:prstGeom prst="rect">
+            <a:avLst/>
+          </a:prstGeom>
+          <a:ln>
+            <a:solidFill>
+              <a:schemeClr val="tx1"/>
+            </a:solidFill>
+          </a:ln>
+          <a:effectLst>
+            <a:outerShdw blurRad="50800" dist="38100" dir="2700000" algn="tl" rotWithShape="0">
+              <a:prstClr val="black">
+                <a:alpha val="40000"/>
+              </a:prstClr>
+            </a:outerShdw>
+          </a:effectLst>
+        </p:spPr>
+      </p:pic>
+    </p:spTree>
+    <p:extLst>
+      <p:ext uri="{BB962C8B-B14F-4D97-AF65-F5344CB8AC3E}">
+        <p14:creationId xmlns:p14="http://schemas.microsoft.com/office/powerpoint/2010/main" val="2504672246"/>
+      </p:ext>
+    </p:extLst>
+  </p:cSld>
+  <p:clrMapOvr>
+    <a:masterClrMapping/>
+  </p:clrMapOvr>
+</p:sld>
+</file>
+
+<file path=ppt/slides/slide11.xml><?xml version="1.0" encoding="utf-8"?>
 <p:sld xmlns:a="http://schemas.openxmlformats.org/drawingml/2006/main" xmlns:r="http://schemas.openxmlformats.org/officeDocument/2006/relationships" xmlns:p="http://schemas.openxmlformats.org/presentationml/2006/main">
   <p:cSld>
     <p:spTree>
@@ -11458,21 +11610,6 @@
 </file>
 
 <file path=customXml/item1.xml><?xml version="1.0" encoding="utf-8"?>
-<p:properties xmlns:p="http://schemas.microsoft.com/office/2006/metadata/properties" xmlns:xsi="http://www.w3.org/2001/XMLSchema-instance" xmlns:pc="http://schemas.microsoft.com/office/infopath/2007/PartnerControls">
-  <documentManagement/>
-</p:properties>
-</file>
-
-<file path=customXml/item2.xml><?xml version="1.0" encoding="utf-8"?>
-<?mso-contentType ?>
-<FormTemplates xmlns="http://schemas.microsoft.com/sharepoint/v3/contenttype/forms">
-  <Display>DocumentLibraryForm</Display>
-  <Edit>DocumentLibraryForm</Edit>
-  <New>DocumentLibraryForm</New>
-</FormTemplates>
-</file>
-
-<file path=customXml/item3.xml><?xml version="1.0" encoding="utf-8"?>
 <ct:contentTypeSchema xmlns:ct="http://schemas.microsoft.com/office/2006/metadata/contentType" xmlns:ma="http://schemas.microsoft.com/office/2006/metadata/properties/metaAttributes" ct:_="" ma:_="" ma:contentTypeName="Document" ma:contentTypeID="0x010100565464437F680748A68B85EB6594EA7D" ma:contentTypeVersion="0" ma:contentTypeDescription="Create a new document." ma:contentTypeScope="" ma:versionID="fe3f4dd58d5914c51cfc6deaa8ad845c">
   <xsd:schema xmlns:xsd="http://www.w3.org/2001/XMLSchema" xmlns:p="http://schemas.microsoft.com/office/2006/metadata/properties" targetNamespace="http://schemas.microsoft.com/office/2006/metadata/properties" ma:root="true" ma:fieldsID="4aeb20c0e3442673af7ee10786458764">
     <xsd:element name="properties">
@@ -11521,17 +11658,32 @@
 </ct:contentTypeSchema>
 </file>
 
+<file path=customXml/item2.xml><?xml version="1.0" encoding="utf-8"?>
+<?mso-contentType ?>
+<FormTemplates xmlns="http://schemas.microsoft.com/sharepoint/v3/contenttype/forms">
+  <Display>DocumentLibraryForm</Display>
+  <Edit>DocumentLibraryForm</Edit>
+  <New>DocumentLibraryForm</New>
+</FormTemplates>
+</file>
+
+<file path=customXml/item3.xml><?xml version="1.0" encoding="utf-8"?>
+<p:properties xmlns:p="http://schemas.microsoft.com/office/2006/metadata/properties" xmlns:xsi="http://www.w3.org/2001/XMLSchema-instance" xmlns:pc="http://schemas.microsoft.com/office/infopath/2007/PartnerControls">
+  <documentManagement/>
+</p:properties>
+</file>
+
 <file path=customXml/itemProps1.xml><?xml version="1.0" encoding="utf-8"?>
-<ds:datastoreItem xmlns:ds="http://schemas.openxmlformats.org/officeDocument/2006/customXml" ds:itemID="{A50EC660-24D0-43A0-AE5E-E274115E726B}">
+<ds:datastoreItem xmlns:ds="http://schemas.openxmlformats.org/officeDocument/2006/customXml" ds:itemID="{E8DB7DEB-074E-4EE8-9B6E-FD277323109C}">
   <ds:schemaRefs>
+    <ds:schemaRef ds:uri="http://schemas.microsoft.com/office/2006/metadata/contentType"/>
+    <ds:schemaRef ds:uri="http://schemas.microsoft.com/office/2006/metadata/properties/metaAttributes"/>
+    <ds:schemaRef ds:uri="http://www.w3.org/2001/XMLSchema"/>
+    <ds:schemaRef ds:uri="http://schemas.microsoft.com/office/2006/metadata/properties"/>
+    <ds:schemaRef ds:uri="http://schemas.openxmlformats.org/package/2006/metadata/core-properties"/>
     <ds:schemaRef ds:uri="http://purl.org/dc/elements/1.1/"/>
-    <ds:schemaRef ds:uri="http://schemas.microsoft.com/office/2006/metadata/properties"/>
     <ds:schemaRef ds:uri="http://purl.org/dc/terms/"/>
-    <ds:schemaRef ds:uri="http://schemas.openxmlformats.org/package/2006/metadata/core-properties"/>
-    <ds:schemaRef ds:uri="http://schemas.microsoft.com/office/2006/documentManagement/types"/>
-    <ds:schemaRef ds:uri="http://www.w3.org/XML/1998/namespace"/>
-    <ds:schemaRef ds:uri="http://purl.org/dc/dcmitype/"/>
-    <ds:schemaRef ds:uri="http://schemas.microsoft.com/office/infopath/2007/PartnerControls"/>
+    <ds:schemaRef ds:uri="http://schemas.microsoft.com/office/internal/2005/internalDocumentation"/>
   </ds:schemaRefs>
 </ds:datastoreItem>
 </file>
@@ -11545,16 +11697,16 @@
 </file>
 
 <file path=customXml/itemProps3.xml><?xml version="1.0" encoding="utf-8"?>
-<ds:datastoreItem xmlns:ds="http://schemas.openxmlformats.org/officeDocument/2006/customXml" ds:itemID="{E8DB7DEB-074E-4EE8-9B6E-FD277323109C}">
+<ds:datastoreItem xmlns:ds="http://schemas.openxmlformats.org/officeDocument/2006/customXml" ds:itemID="{A50EC660-24D0-43A0-AE5E-E274115E726B}">
   <ds:schemaRefs>
-    <ds:schemaRef ds:uri="http://schemas.microsoft.com/office/2006/metadata/contentType"/>
-    <ds:schemaRef ds:uri="http://schemas.microsoft.com/office/2006/metadata/properties/metaAttributes"/>
-    <ds:schemaRef ds:uri="http://www.w3.org/2001/XMLSchema"/>
+    <ds:schemaRef ds:uri="http://purl.org/dc/elements/1.1/"/>
     <ds:schemaRef ds:uri="http://schemas.microsoft.com/office/2006/metadata/properties"/>
+    <ds:schemaRef ds:uri="http://purl.org/dc/terms/"/>
     <ds:schemaRef ds:uri="http://schemas.openxmlformats.org/package/2006/metadata/core-properties"/>
-    <ds:schemaRef ds:uri="http://purl.org/dc/elements/1.1/"/>
-    <ds:schemaRef ds:uri="http://purl.org/dc/terms/"/>
-    <ds:schemaRef ds:uri="http://schemas.microsoft.com/office/internal/2005/internalDocumentation"/>
+    <ds:schemaRef ds:uri="http://schemas.microsoft.com/office/2006/documentManagement/types"/>
+    <ds:schemaRef ds:uri="http://www.w3.org/XML/1998/namespace"/>
+    <ds:schemaRef ds:uri="http://purl.org/dc/dcmitype/"/>
+    <ds:schemaRef ds:uri="http://schemas.microsoft.com/office/infopath/2007/PartnerControls"/>
   </ds:schemaRefs>
 </ds:datastoreItem>
 </file>
</xml_diff>

<commit_message>
Update intro to include DavidR
</commit_message>
<xml_diff>
--- a/intro.pptx
+++ b/intro.pptx
@@ -265,7 +265,7 @@
           <a:p>
             <a:fld id="{0B842F42-2CE9-4E35-95C1-410DC08A50B1}" type="datetimeFigureOut">
               <a:rPr lang="en-US" smtClean="0"/>
-              <a:t>10/11/2021</a:t>
+              <a:t>11/14/2021</a:t>
             </a:fld>
             <a:endParaRPr lang="en-US"/>
           </a:p>
@@ -430,7 +430,7 @@
           <a:p>
             <a:fld id="{6F282904-F315-4730-8D91-37D99E141A6F}" type="datetimeFigureOut">
               <a:rPr lang="en-US" smtClean="0"/>
-              <a:t>10/11/2021</a:t>
+              <a:t>11/14/2021</a:t>
             </a:fld>
             <a:endParaRPr lang="en-US"/>
           </a:p>
@@ -4115,7 +4115,7 @@
         </p:nvSpPr>
         <p:spPr>
           <a:xfrm>
-            <a:off x="3177632" y="2085962"/>
+            <a:off x="3177632" y="1959498"/>
             <a:ext cx="5329441" cy="2855300"/>
           </a:xfrm>
         </p:spPr>
@@ -4126,6 +4126,12 @@
             <a:r>
               <a:rPr lang="en-US" dirty="0"/>
               <a:t>David E. Bernholdt, Anshu Dubey, Patricia A. Grubel, Rinku K. Gupta, and Gregory R. Watson</a:t>
+            </a:r>
+          </a:p>
+          <a:p>
+            <a:r>
+              <a:rPr lang="en-US" dirty="0"/>
+              <a:t>with help from David M. Rogers</a:t>
             </a:r>
           </a:p>
           <a:p>
@@ -4980,12 +4986,19 @@
               </a:spcBef>
             </a:pPr>
             <a:r>
-              <a:rPr lang="en-US"/>
-              <a:t>Greg Watson, </a:t>
-            </a:r>
-            <a:r>
               <a:rPr lang="en-US" dirty="0"/>
-              <a:t>ORNL</a:t>
+              <a:t>Greg Watson, ORNL</a:t>
+            </a:r>
+          </a:p>
+          <a:p>
+            <a:pPr>
+              <a:spcBef>
+                <a:spcPts val="1000"/>
+              </a:spcBef>
+            </a:pPr>
+            <a:r>
+              <a:rPr lang="en-US" dirty="0"/>
+              <a:t>David Rogers, ORNL (helper)</a:t>
             </a:r>
           </a:p>
           <a:p>
@@ -5050,7 +5063,7 @@
         </p:nvGrpSpPr>
         <p:grpSpPr>
           <a:xfrm>
-            <a:off x="9529477" y="1280696"/>
+            <a:off x="8411923" y="1272139"/>
             <a:ext cx="1009507" cy="1851663"/>
             <a:chOff x="9969639" y="348151"/>
             <a:chExt cx="1009507" cy="1851663"/>
@@ -5158,7 +5171,7 @@
         </p:nvGrpSpPr>
         <p:grpSpPr>
           <a:xfrm>
-            <a:off x="7248749" y="1280696"/>
+            <a:off x="6176267" y="1272139"/>
             <a:ext cx="954107" cy="1805497"/>
             <a:chOff x="6614147" y="1346049"/>
             <a:chExt cx="954107" cy="1805497"/>
@@ -5266,7 +5279,7 @@
         </p:nvGrpSpPr>
         <p:grpSpPr>
           <a:xfrm>
-            <a:off x="8361413" y="1280696"/>
+            <a:off x="7266395" y="1272139"/>
             <a:ext cx="1009507" cy="1851663"/>
             <a:chOff x="8066531" y="1374891"/>
             <a:chExt cx="1009507" cy="1851663"/>
@@ -5373,7 +5386,7 @@
         </p:nvGrpSpPr>
         <p:grpSpPr>
           <a:xfrm>
-            <a:off x="10697542" y="1280696"/>
+            <a:off x="9557451" y="1272139"/>
             <a:ext cx="1038027" cy="1804941"/>
             <a:chOff x="9222950" y="1485878"/>
             <a:chExt cx="1038027" cy="1804941"/>
@@ -5468,10 +5481,10 @@
       </p:grpSp>
       <p:grpSp>
         <p:nvGrpSpPr>
-          <p:cNvPr id="22" name="Group 21">
+          <p:cNvPr id="25" name="Group 24">
             <a:extLst>
               <a:ext uri="{FF2B5EF4-FFF2-40B4-BE49-F238E27FC236}">
-                <a16:creationId xmlns:a16="http://schemas.microsoft.com/office/drawing/2014/main" id="{AC0154FC-1792-44D9-937F-1BB2AF5C68CA}"/>
+                <a16:creationId xmlns:a16="http://schemas.microsoft.com/office/drawing/2014/main" id="{FD2361BF-58F3-4573-9CE4-721C246BFE7C}"/>
               </a:ext>
             </a:extLst>
           </p:cNvPr>
@@ -5480,18 +5493,18 @@
         </p:nvGrpSpPr>
         <p:grpSpPr>
           <a:xfrm>
-            <a:off x="6052165" y="1280696"/>
-            <a:ext cx="1038027" cy="1797939"/>
-            <a:chOff x="4187619" y="4211394"/>
-            <a:chExt cx="1038027" cy="1797939"/>
+            <a:off x="10731498" y="1272139"/>
+            <a:ext cx="1005403" cy="1805497"/>
+            <a:chOff x="10526802" y="1346049"/>
+            <a:chExt cx="1005403" cy="1805497"/>
           </a:xfrm>
         </p:grpSpPr>
         <p:pic>
           <p:nvPicPr>
-            <p:cNvPr id="23" name="Picture 22" descr="A person wearing glasses&#10;&#10;Description automatically generated with low confidence">
+            <p:cNvPr id="26" name="Picture 25" descr="A person wearing glasses&#10;&#10;Description automatically generated with medium confidence">
               <a:extLst>
                 <a:ext uri="{FF2B5EF4-FFF2-40B4-BE49-F238E27FC236}">
-                  <a16:creationId xmlns:a16="http://schemas.microsoft.com/office/drawing/2014/main" id="{74A97466-69A1-4AB0-8DE7-4A617C2B9D52}"/>
+                  <a16:creationId xmlns:a16="http://schemas.microsoft.com/office/drawing/2014/main" id="{0290A57B-E35C-4248-B037-1FE71E333FC2}"/>
                 </a:ext>
               </a:extLst>
             </p:cNvPr>
@@ -5501,20 +5514,20 @@
             <p:nvPr/>
           </p:nvPicPr>
           <p:blipFill rotWithShape="1">
-            <a:blip r:embed="rId7" cstate="print">
+            <a:blip r:embed="rId7">
               <a:extLst>
                 <a:ext uri="{28A0092B-C50C-407E-A947-70E740481C1C}">
                   <a14:useLocalDpi xmlns:a14="http://schemas.microsoft.com/office/drawing/2010/main" val="0"/>
                 </a:ext>
               </a:extLst>
             </a:blip>
-            <a:srcRect l="8053" t="854" r="5947" b="-854"/>
+            <a:srcRect l="12970" r="9695"/>
             <a:stretch/>
           </p:blipFill>
           <p:spPr>
             <a:xfrm>
-              <a:off x="4187619" y="4211394"/>
-              <a:ext cx="1038027" cy="1207008"/>
+              <a:off x="10562794" y="1346049"/>
+              <a:ext cx="933420" cy="1207008"/>
             </a:xfrm>
             <a:prstGeom prst="rect">
               <a:avLst/>
@@ -5523,10 +5536,10 @@
         </p:pic>
         <p:sp>
           <p:nvSpPr>
-            <p:cNvPr id="24" name="TextBox 23">
+            <p:cNvPr id="27" name="TextBox 26">
               <a:extLst>
                 <a:ext uri="{FF2B5EF4-FFF2-40B4-BE49-F238E27FC236}">
-                  <a16:creationId xmlns:a16="http://schemas.microsoft.com/office/drawing/2014/main" id="{B27114CE-9182-4B73-8E67-9E088169590C}"/>
+                  <a16:creationId xmlns:a16="http://schemas.microsoft.com/office/drawing/2014/main" id="{85C0C0CD-2B3D-4C6F-8251-6E60BB082C39}"/>
                 </a:ext>
               </a:extLst>
             </p:cNvPr>
@@ -5535,8 +5548,8 @@
           </p:nvSpPr>
           <p:spPr>
             <a:xfrm>
-              <a:off x="4268051" y="5418402"/>
-              <a:ext cx="877163" cy="590931"/>
+              <a:off x="10526802" y="2560615"/>
+              <a:ext cx="1005403" cy="590931"/>
             </a:xfrm>
             <a:prstGeom prst="rect">
               <a:avLst/>
@@ -5556,7 +5569,114 @@
               </a:pPr>
               <a:r>
                 <a:rPr lang="en-US" dirty="0"/>
-                <a:t>David</a:t>
+                <a:t>David R</a:t>
+              </a:r>
+            </a:p>
+            <a:p>
+              <a:pPr algn="ctr">
+                <a:lnSpc>
+                  <a:spcPct val="90000"/>
+                </a:lnSpc>
+              </a:pPr>
+              <a:r>
+                <a:rPr lang="en-US" i="1" dirty="0"/>
+                <a:t>he/him</a:t>
+              </a:r>
+            </a:p>
+          </p:txBody>
+        </p:sp>
+      </p:grpSp>
+      <p:grpSp>
+        <p:nvGrpSpPr>
+          <p:cNvPr id="34" name="Group 33">
+            <a:extLst>
+              <a:ext uri="{FF2B5EF4-FFF2-40B4-BE49-F238E27FC236}">
+                <a16:creationId xmlns:a16="http://schemas.microsoft.com/office/drawing/2014/main" id="{359F422B-AF99-4858-B201-47AE77456C4A}"/>
+              </a:ext>
+            </a:extLst>
+          </p:cNvPr>
+          <p:cNvGrpSpPr/>
+          <p:nvPr/>
+        </p:nvGrpSpPr>
+        <p:grpSpPr>
+          <a:xfrm>
+            <a:off x="5002219" y="1272139"/>
+            <a:ext cx="1038027" cy="1796940"/>
+            <a:chOff x="2690082" y="4212393"/>
+            <a:chExt cx="1038027" cy="1796940"/>
+          </a:xfrm>
+        </p:grpSpPr>
+        <p:pic>
+          <p:nvPicPr>
+            <p:cNvPr id="35" name="Picture 34" descr="A person wearing glasses&#10;&#10;Description automatically generated with low confidence">
+              <a:extLst>
+                <a:ext uri="{FF2B5EF4-FFF2-40B4-BE49-F238E27FC236}">
+                  <a16:creationId xmlns:a16="http://schemas.microsoft.com/office/drawing/2014/main" id="{D809B8C1-AFB2-4B94-B717-7027630549BD}"/>
+                </a:ext>
+              </a:extLst>
+            </p:cNvPr>
+            <p:cNvPicPr>
+              <a:picLocks noChangeAspect="1"/>
+            </p:cNvPicPr>
+            <p:nvPr/>
+          </p:nvPicPr>
+          <p:blipFill rotWithShape="1">
+            <a:blip r:embed="rId8" cstate="print">
+              <a:extLst>
+                <a:ext uri="{28A0092B-C50C-407E-A947-70E740481C1C}">
+                  <a14:useLocalDpi xmlns:a14="http://schemas.microsoft.com/office/drawing/2010/main" val="0"/>
+                </a:ext>
+              </a:extLst>
+            </a:blip>
+            <a:srcRect l="8053" t="854" r="5947" b="-854"/>
+            <a:stretch/>
+          </p:blipFill>
+          <p:spPr>
+            <a:xfrm>
+              <a:off x="2690082" y="4212393"/>
+              <a:ext cx="1038027" cy="1207008"/>
+            </a:xfrm>
+            <a:prstGeom prst="rect">
+              <a:avLst/>
+            </a:prstGeom>
+          </p:spPr>
+        </p:pic>
+        <p:sp>
+          <p:nvSpPr>
+            <p:cNvPr id="36" name="TextBox 35">
+              <a:extLst>
+                <a:ext uri="{FF2B5EF4-FFF2-40B4-BE49-F238E27FC236}">
+                  <a16:creationId xmlns:a16="http://schemas.microsoft.com/office/drawing/2014/main" id="{1237A6AA-6D17-4974-9231-D4E17B28F74A}"/>
+                </a:ext>
+              </a:extLst>
+            </p:cNvPr>
+            <p:cNvSpPr txBox="1"/>
+            <p:nvPr/>
+          </p:nvSpPr>
+          <p:spPr>
+            <a:xfrm>
+              <a:off x="2712806" y="5418402"/>
+              <a:ext cx="992579" cy="590931"/>
+            </a:xfrm>
+            <a:prstGeom prst="rect">
+              <a:avLst/>
+            </a:prstGeom>
+            <a:noFill/>
+          </p:spPr>
+          <p:txBody>
+            <a:bodyPr wrap="none" rtlCol="0">
+              <a:spAutoFit/>
+            </a:bodyPr>
+            <a:lstStyle/>
+            <a:p>
+              <a:pPr algn="ctr">
+                <a:lnSpc>
+                  <a:spcPct val="90000"/>
+                </a:lnSpc>
+              </a:pPr>
+              <a:r>
+                <a:rPr lang="en-US" dirty="0"/>
+                <a:t>David B</a:t>
               </a:r>
             </a:p>
             <a:p>
@@ -11610,6 +11730,21 @@
 </file>
 
 <file path=customXml/item1.xml><?xml version="1.0" encoding="utf-8"?>
+<p:properties xmlns:p="http://schemas.microsoft.com/office/2006/metadata/properties" xmlns:xsi="http://www.w3.org/2001/XMLSchema-instance" xmlns:pc="http://schemas.microsoft.com/office/infopath/2007/PartnerControls">
+  <documentManagement/>
+</p:properties>
+</file>
+
+<file path=customXml/item2.xml><?xml version="1.0" encoding="utf-8"?>
+<?mso-contentType ?>
+<FormTemplates xmlns="http://schemas.microsoft.com/sharepoint/v3/contenttype/forms">
+  <Display>DocumentLibraryForm</Display>
+  <Edit>DocumentLibraryForm</Edit>
+  <New>DocumentLibraryForm</New>
+</FormTemplates>
+</file>
+
+<file path=customXml/item3.xml><?xml version="1.0" encoding="utf-8"?>
 <ct:contentTypeSchema xmlns:ct="http://schemas.microsoft.com/office/2006/metadata/contentType" xmlns:ma="http://schemas.microsoft.com/office/2006/metadata/properties/metaAttributes" ct:_="" ma:_="" ma:contentTypeName="Document" ma:contentTypeID="0x010100565464437F680748A68B85EB6594EA7D" ma:contentTypeVersion="0" ma:contentTypeDescription="Create a new document." ma:contentTypeScope="" ma:versionID="fe3f4dd58d5914c51cfc6deaa8ad845c">
   <xsd:schema xmlns:xsd="http://www.w3.org/2001/XMLSchema" xmlns:p="http://schemas.microsoft.com/office/2006/metadata/properties" targetNamespace="http://schemas.microsoft.com/office/2006/metadata/properties" ma:root="true" ma:fieldsID="4aeb20c0e3442673af7ee10786458764">
     <xsd:element name="properties">
@@ -11658,32 +11793,17 @@
 </ct:contentTypeSchema>
 </file>
 
-<file path=customXml/item2.xml><?xml version="1.0" encoding="utf-8"?>
-<?mso-contentType ?>
-<FormTemplates xmlns="http://schemas.microsoft.com/sharepoint/v3/contenttype/forms">
-  <Display>DocumentLibraryForm</Display>
-  <Edit>DocumentLibraryForm</Edit>
-  <New>DocumentLibraryForm</New>
-</FormTemplates>
-</file>
-
-<file path=customXml/item3.xml><?xml version="1.0" encoding="utf-8"?>
-<p:properties xmlns:p="http://schemas.microsoft.com/office/2006/metadata/properties" xmlns:xsi="http://www.w3.org/2001/XMLSchema-instance" xmlns:pc="http://schemas.microsoft.com/office/infopath/2007/PartnerControls">
-  <documentManagement/>
-</p:properties>
-</file>
-
 <file path=customXml/itemProps1.xml><?xml version="1.0" encoding="utf-8"?>
-<ds:datastoreItem xmlns:ds="http://schemas.openxmlformats.org/officeDocument/2006/customXml" ds:itemID="{E8DB7DEB-074E-4EE8-9B6E-FD277323109C}">
+<ds:datastoreItem xmlns:ds="http://schemas.openxmlformats.org/officeDocument/2006/customXml" ds:itemID="{A50EC660-24D0-43A0-AE5E-E274115E726B}">
   <ds:schemaRefs>
-    <ds:schemaRef ds:uri="http://schemas.microsoft.com/office/2006/metadata/contentType"/>
-    <ds:schemaRef ds:uri="http://schemas.microsoft.com/office/2006/metadata/properties/metaAttributes"/>
-    <ds:schemaRef ds:uri="http://www.w3.org/2001/XMLSchema"/>
+    <ds:schemaRef ds:uri="http://purl.org/dc/elements/1.1/"/>
     <ds:schemaRef ds:uri="http://schemas.microsoft.com/office/2006/metadata/properties"/>
+    <ds:schemaRef ds:uri="http://purl.org/dc/terms/"/>
     <ds:schemaRef ds:uri="http://schemas.openxmlformats.org/package/2006/metadata/core-properties"/>
-    <ds:schemaRef ds:uri="http://purl.org/dc/elements/1.1/"/>
-    <ds:schemaRef ds:uri="http://purl.org/dc/terms/"/>
-    <ds:schemaRef ds:uri="http://schemas.microsoft.com/office/internal/2005/internalDocumentation"/>
+    <ds:schemaRef ds:uri="http://schemas.microsoft.com/office/2006/documentManagement/types"/>
+    <ds:schemaRef ds:uri="http://www.w3.org/XML/1998/namespace"/>
+    <ds:schemaRef ds:uri="http://purl.org/dc/dcmitype/"/>
+    <ds:schemaRef ds:uri="http://schemas.microsoft.com/office/infopath/2007/PartnerControls"/>
   </ds:schemaRefs>
 </ds:datastoreItem>
 </file>
@@ -11697,16 +11817,16 @@
 </file>
 
 <file path=customXml/itemProps3.xml><?xml version="1.0" encoding="utf-8"?>
-<ds:datastoreItem xmlns:ds="http://schemas.openxmlformats.org/officeDocument/2006/customXml" ds:itemID="{A50EC660-24D0-43A0-AE5E-E274115E726B}">
+<ds:datastoreItem xmlns:ds="http://schemas.openxmlformats.org/officeDocument/2006/customXml" ds:itemID="{E8DB7DEB-074E-4EE8-9B6E-FD277323109C}">
   <ds:schemaRefs>
+    <ds:schemaRef ds:uri="http://schemas.microsoft.com/office/2006/metadata/contentType"/>
+    <ds:schemaRef ds:uri="http://schemas.microsoft.com/office/2006/metadata/properties/metaAttributes"/>
+    <ds:schemaRef ds:uri="http://www.w3.org/2001/XMLSchema"/>
+    <ds:schemaRef ds:uri="http://schemas.microsoft.com/office/2006/metadata/properties"/>
+    <ds:schemaRef ds:uri="http://schemas.openxmlformats.org/package/2006/metadata/core-properties"/>
     <ds:schemaRef ds:uri="http://purl.org/dc/elements/1.1/"/>
-    <ds:schemaRef ds:uri="http://schemas.microsoft.com/office/2006/metadata/properties"/>
     <ds:schemaRef ds:uri="http://purl.org/dc/terms/"/>
-    <ds:schemaRef ds:uri="http://schemas.openxmlformats.org/package/2006/metadata/core-properties"/>
-    <ds:schemaRef ds:uri="http://schemas.microsoft.com/office/2006/documentManagement/types"/>
-    <ds:schemaRef ds:uri="http://www.w3.org/XML/1998/namespace"/>
-    <ds:schemaRef ds:uri="http://purl.org/dc/dcmitype/"/>
-    <ds:schemaRef ds:uri="http://schemas.microsoft.com/office/infopath/2007/PartnerControls"/>
+    <ds:schemaRef ds:uri="http://schemas.microsoft.com/office/internal/2005/internalDocumentation"/>
   </ds:schemaRefs>
 </ds:datastoreItem>
 </file>
</xml_diff>

<commit_message>
Fixing various formatting infelicities
Nothing catastrophic, but things that we prefer not to carry forward.
</commit_message>
<xml_diff>
--- a/intro.pptx
+++ b/intro.pptx
@@ -265,7 +265,7 @@
           <a:p>
             <a:fld id="{0B842F42-2CE9-4E35-95C1-410DC08A50B1}" type="datetimeFigureOut">
               <a:rPr lang="en-US" smtClean="0"/>
-              <a:t>4/17/2022</a:t>
+              <a:t>5/6/2022</a:t>
             </a:fld>
             <a:endParaRPr lang="en-US"/>
           </a:p>
@@ -430,7 +430,7 @@
           <a:p>
             <a:fld id="{6F282904-F315-4730-8D91-37D99E141A6F}" type="datetimeFigureOut">
               <a:rPr lang="en-US" smtClean="0"/>
-              <a:t>4/17/2022</a:t>
+              <a:t>5/6/2022</a:t>
             </a:fld>
             <a:endParaRPr lang="en-US"/>
           </a:p>
@@ -5309,8 +5309,8 @@
         </p:nvSpPr>
         <p:spPr>
           <a:xfrm>
-            <a:off x="363096" y="4186797"/>
-            <a:ext cx="9878184" cy="461665"/>
+            <a:off x="363095" y="4186797"/>
+            <a:ext cx="10123321" cy="461665"/>
           </a:xfrm>
           <a:prstGeom prst="rect">
             <a:avLst/>
@@ -5332,7 +5332,7 @@
             </a:pPr>
             <a:r>
               <a:rPr lang="en-US" sz="2400" dirty="0"/>
-              <a:t>Member of the IDEAS Productivity Project: </a:t>
+              <a:t>Members of the IDEAS Productivity Project: </a:t>
             </a:r>
             <a:r>
               <a:rPr lang="en-US" sz="2400" dirty="0">
@@ -11359,15 +11359,6 @@
 </file>
 
 <file path=customXml/item1.xml><?xml version="1.0" encoding="utf-8"?>
-<?mso-contentType ?>
-<FormTemplates xmlns="http://schemas.microsoft.com/sharepoint/v3/contenttype/forms">
-  <Display>DocumentLibraryForm</Display>
-  <Edit>DocumentLibraryForm</Edit>
-  <New>DocumentLibraryForm</New>
-</FormTemplates>
-</file>
-
-<file path=customXml/item2.xml><?xml version="1.0" encoding="utf-8"?>
 <ct:contentTypeSchema xmlns:ct="http://schemas.microsoft.com/office/2006/metadata/contentType" xmlns:ma="http://schemas.microsoft.com/office/2006/metadata/properties/metaAttributes" ct:_="" ma:_="" ma:contentTypeName="Document" ma:contentTypeID="0x010100565464437F680748A68B85EB6594EA7D" ma:contentTypeVersion="0" ma:contentTypeDescription="Create a new document." ma:contentTypeScope="" ma:versionID="fe3f4dd58d5914c51cfc6deaa8ad845c">
   <xsd:schema xmlns:xsd="http://www.w3.org/2001/XMLSchema" xmlns:p="http://schemas.microsoft.com/office/2006/metadata/properties" targetNamespace="http://schemas.microsoft.com/office/2006/metadata/properties" ma:root="true" ma:fieldsID="4aeb20c0e3442673af7ee10786458764">
     <xsd:element name="properties">
@@ -11416,6 +11407,15 @@
 </ct:contentTypeSchema>
 </file>
 
+<file path=customXml/item2.xml><?xml version="1.0" encoding="utf-8"?>
+<?mso-contentType ?>
+<FormTemplates xmlns="http://schemas.microsoft.com/sharepoint/v3/contenttype/forms">
+  <Display>DocumentLibraryForm</Display>
+  <Edit>DocumentLibraryForm</Edit>
+  <New>DocumentLibraryForm</New>
+</FormTemplates>
+</file>
+
 <file path=customXml/item3.xml><?xml version="1.0" encoding="utf-8"?>
 <p:properties xmlns:p="http://schemas.microsoft.com/office/2006/metadata/properties" xmlns:xsi="http://www.w3.org/2001/XMLSchema-instance" xmlns:pc="http://schemas.microsoft.com/office/infopath/2007/PartnerControls">
   <documentManagement/>
@@ -11423,14 +11423,6 @@
 </file>
 
 <file path=customXml/itemProps1.xml><?xml version="1.0" encoding="utf-8"?>
-<ds:datastoreItem xmlns:ds="http://schemas.openxmlformats.org/officeDocument/2006/customXml" ds:itemID="{19E20559-B232-4371-8690-E3D8007EDB82}">
-  <ds:schemaRefs>
-    <ds:schemaRef ds:uri="http://schemas.microsoft.com/sharepoint/v3/contenttype/forms"/>
-  </ds:schemaRefs>
-</ds:datastoreItem>
-</file>
-
-<file path=customXml/itemProps2.xml><?xml version="1.0" encoding="utf-8"?>
 <ds:datastoreItem xmlns:ds="http://schemas.openxmlformats.org/officeDocument/2006/customXml" ds:itemID="{E8DB7DEB-074E-4EE8-9B6E-FD277323109C}">
   <ds:schemaRefs>
     <ds:schemaRef ds:uri="http://schemas.microsoft.com/office/2006/metadata/contentType"/>
@@ -11441,6 +11433,14 @@
     <ds:schemaRef ds:uri="http://purl.org/dc/elements/1.1/"/>
     <ds:schemaRef ds:uri="http://purl.org/dc/terms/"/>
     <ds:schemaRef ds:uri="http://schemas.microsoft.com/office/internal/2005/internalDocumentation"/>
+  </ds:schemaRefs>
+</ds:datastoreItem>
+</file>
+
+<file path=customXml/itemProps2.xml><?xml version="1.0" encoding="utf-8"?>
+<ds:datastoreItem xmlns:ds="http://schemas.openxmlformats.org/officeDocument/2006/customXml" ds:itemID="{19E20559-B232-4371-8690-E3D8007EDB82}">
+  <ds:schemaRefs>
+    <ds:schemaRef ds:uri="http://schemas.microsoft.com/sharepoint/v3/contenttype/forms"/>
   </ds:schemaRefs>
 </ds:datastoreItem>
 </file>

</xml_diff>

<commit_message>
Up[date intro for ECP tutorial
</commit_message>
<xml_diff>
--- a/intro.pptx
+++ b/intro.pptx
@@ -5,10 +5,10 @@
     <p:sldMasterId id="2147483935" r:id="rId4"/>
   </p:sldMasterIdLst>
   <p:notesMasterIdLst>
-    <p:notesMasterId r:id="rId17"/>
+    <p:notesMasterId r:id="rId16"/>
   </p:notesMasterIdLst>
   <p:handoutMasterIdLst>
-    <p:handoutMasterId r:id="rId18"/>
+    <p:handoutMasterId r:id="rId17"/>
   </p:handoutMasterIdLst>
   <p:sldIdLst>
     <p:sldId id="617" r:id="rId5"/>
@@ -20,9 +20,8 @@
     <p:sldId id="619" r:id="rId11"/>
     <p:sldId id="620" r:id="rId12"/>
     <p:sldId id="622" r:id="rId13"/>
-    <p:sldId id="315" r:id="rId14"/>
-    <p:sldId id="626" r:id="rId15"/>
-    <p:sldId id="261" r:id="rId16"/>
+    <p:sldId id="626" r:id="rId14"/>
+    <p:sldId id="261" r:id="rId15"/>
   </p:sldIdLst>
   <p:sldSz cx="12188825" cy="6858000"/>
   <p:notesSz cx="7010400" cy="9296400"/>
@@ -266,7 +265,7 @@
           <a:p>
             <a:fld id="{0B842F42-2CE9-4E35-95C1-410DC08A50B1}" type="datetimeFigureOut">
               <a:rPr lang="en-US" smtClean="0"/>
-              <a:t>5/19/2022</a:t>
+              <a:t>2/1/2023</a:t>
             </a:fld>
             <a:endParaRPr lang="en-US"/>
           </a:p>
@@ -431,7 +430,7 @@
           <a:p>
             <a:fld id="{6F282904-F315-4730-8D91-37D99E141A6F}" type="datetimeFigureOut">
               <a:rPr lang="en-US" smtClean="0"/>
-              <a:t>5/19/2022</a:t>
+              <a:t>2/1/2023</a:t>
             </a:fld>
             <a:endParaRPr lang="en-US"/>
           </a:p>
@@ -696,93 +695,6 @@
     </a:lvl9pPr>
   </p:notesStyle>
 </p:notesMaster>
-</file>
-
-<file path=ppt/notesSlides/notesSlide1.xml><?xml version="1.0" encoding="utf-8"?>
-<p:notes xmlns:a="http://schemas.openxmlformats.org/drawingml/2006/main" xmlns:r="http://schemas.openxmlformats.org/officeDocument/2006/relationships" xmlns:p="http://schemas.openxmlformats.org/presentationml/2006/main">
-  <p:cSld>
-    <p:spTree>
-      <p:nvGrpSpPr>
-        <p:cNvPr id="1" name=""/>
-        <p:cNvGrpSpPr/>
-        <p:nvPr/>
-      </p:nvGrpSpPr>
-      <p:grpSpPr>
-        <a:xfrm>
-          <a:off x="0" y="0"/>
-          <a:ext cx="0" cy="0"/>
-          <a:chOff x="0" y="0"/>
-          <a:chExt cx="0" cy="0"/>
-        </a:xfrm>
-      </p:grpSpPr>
-      <p:sp>
-        <p:nvSpPr>
-          <p:cNvPr id="2" name="Slide Image Placeholder 1"/>
-          <p:cNvSpPr>
-            <a:spLocks noGrp="1" noRot="1" noChangeAspect="1"/>
-          </p:cNvSpPr>
-          <p:nvPr>
-            <p:ph type="sldImg"/>
-          </p:nvPr>
-        </p:nvSpPr>
-        <p:spPr/>
-      </p:sp>
-      <p:sp>
-        <p:nvSpPr>
-          <p:cNvPr id="3" name="Notes Placeholder 2"/>
-          <p:cNvSpPr>
-            <a:spLocks noGrp="1"/>
-          </p:cNvSpPr>
-          <p:nvPr>
-            <p:ph type="body" idx="1"/>
-          </p:nvPr>
-        </p:nvSpPr>
-        <p:spPr/>
-        <p:txBody>
-          <a:bodyPr/>
-          <a:lstStyle/>
-          <a:p>
-            <a:r>
-              <a:rPr lang="en-US" dirty="0"/>
-              <a:t>Variant for hands-on being part of the agenda.</a:t>
-            </a:r>
-          </a:p>
-        </p:txBody>
-      </p:sp>
-      <p:sp>
-        <p:nvSpPr>
-          <p:cNvPr id="4" name="Slide Number Placeholder 3"/>
-          <p:cNvSpPr>
-            <a:spLocks noGrp="1"/>
-          </p:cNvSpPr>
-          <p:nvPr>
-            <p:ph type="sldNum" sz="quarter" idx="5"/>
-          </p:nvPr>
-        </p:nvSpPr>
-        <p:spPr/>
-        <p:txBody>
-          <a:bodyPr/>
-          <a:lstStyle/>
-          <a:p>
-            <a:fld id="{54E672D7-8E2D-4611-973D-F4591A707C34}" type="slidenum">
-              <a:rPr lang="en-US" smtClean="0"/>
-              <a:t>10</a:t>
-            </a:fld>
-            <a:endParaRPr lang="en-US"/>
-          </a:p>
-        </p:txBody>
-      </p:sp>
-    </p:spTree>
-    <p:extLst>
-      <p:ext uri="{BB962C8B-B14F-4D97-AF65-F5344CB8AC3E}">
-        <p14:creationId xmlns:p14="http://schemas.microsoft.com/office/powerpoint/2010/main" val="547864804"/>
-      </p:ext>
-    </p:extLst>
-  </p:cSld>
-  <p:clrMapOvr>
-    <a:masterClrMapping/>
-  </p:clrMapOvr>
-</p:notes>
 </file>
 
 <file path=ppt/slideLayouts/slideLayout1.xml><?xml version="1.0" encoding="utf-8"?>
@@ -4165,8 +4077,8 @@
         </p:nvSpPr>
         <p:spPr>
           <a:xfrm>
-            <a:off x="3177633" y="503144"/>
-            <a:ext cx="8369032" cy="1030930"/>
+            <a:off x="3177632" y="724124"/>
+            <a:ext cx="8846727" cy="1030930"/>
           </a:xfrm>
         </p:spPr>
         <p:txBody>
@@ -4180,7 +4092,7 @@
             </a:pPr>
             <a:r>
               <a:rPr lang="en-US" dirty="0"/>
-              <a:t>Better Scientific Software</a:t>
+              <a:t>Software Practices for Better Science: Testing, Reproducibility, and Documentation</a:t>
             </a:r>
           </a:p>
         </p:txBody>
@@ -4212,21 +4124,21 @@
           <a:lstStyle/>
           <a:p>
             <a:r>
-              <a:rPr lang="en-US" dirty="0" err="1"/>
-              <a:t>Anshu</a:t>
-            </a:r>
-            <a:r>
               <a:rPr lang="en-US" dirty="0"/>
-              <a:t> Dubey and Gregory R. Watson, </a:t>
-            </a:r>
-          </a:p>
-          <a:p>
-            <a:r>
-              <a:rPr lang="en-US" dirty="0"/>
-              <a:t>Better Scientific Software tutorial @ ISC 2022</a:t>
-            </a:r>
-          </a:p>
-          <a:p>
+              <a:t>David E. Bernholdt, David M. Rogers, and Gregory R. Watson, </a:t>
+            </a:r>
+          </a:p>
+          <a:p>
+            <a:r>
+              <a:rPr lang="en-US" b="0" i="0" dirty="0">
+                <a:solidFill>
+                  <a:srgbClr val="111111"/>
+                </a:solidFill>
+                <a:effectLst/>
+                <a:latin typeface="-apple-system"/>
+              </a:rPr>
+              <a:t>Exascale Computing Project Tutorial Days</a:t>
+            </a:r>
             <a:endParaRPr lang="en-US" dirty="0"/>
           </a:p>
         </p:txBody>
@@ -4325,178 +4237,6 @@
           <p:cNvPr id="2" name="Title 1">
             <a:extLst>
               <a:ext uri="{FF2B5EF4-FFF2-40B4-BE49-F238E27FC236}">
-                <a16:creationId xmlns:a16="http://schemas.microsoft.com/office/drawing/2014/main" id="{965012BA-8349-4F63-995A-190570787086}"/>
-              </a:ext>
-            </a:extLst>
-          </p:cNvPr>
-          <p:cNvSpPr>
-            <a:spLocks noGrp="1"/>
-          </p:cNvSpPr>
-          <p:nvPr>
-            <p:ph type="title"/>
-          </p:nvPr>
-        </p:nvSpPr>
-        <p:spPr/>
-        <p:txBody>
-          <a:bodyPr/>
-          <a:lstStyle/>
-          <a:p>
-            <a:r>
-              <a:rPr lang="en-US" dirty="0"/>
-              <a:t>Hands-On Activities</a:t>
-            </a:r>
-          </a:p>
-        </p:txBody>
-      </p:sp>
-      <p:sp>
-        <p:nvSpPr>
-          <p:cNvPr id="3" name="Content Placeholder 2">
-            <a:extLst>
-              <a:ext uri="{FF2B5EF4-FFF2-40B4-BE49-F238E27FC236}">
-                <a16:creationId xmlns:a16="http://schemas.microsoft.com/office/drawing/2014/main" id="{0F20C93A-8687-4A10-A3FB-77446A44FBAB}"/>
-              </a:ext>
-            </a:extLst>
-          </p:cNvPr>
-          <p:cNvSpPr>
-            <a:spLocks noGrp="1"/>
-          </p:cNvSpPr>
-          <p:nvPr>
-            <p:ph idx="1"/>
-          </p:nvPr>
-        </p:nvSpPr>
-        <p:spPr>
-          <a:xfrm>
-            <a:off x="365761" y="1012149"/>
-            <a:ext cx="6211614" cy="4047778"/>
-          </a:xfrm>
-        </p:spPr>
-        <p:txBody>
-          <a:bodyPr/>
-          <a:lstStyle/>
-          <a:p>
-            <a:pPr marL="0" indent="0">
-              <a:buNone/>
-            </a:pPr>
-            <a:r>
-              <a:rPr lang="en-US" dirty="0"/>
-              <a:t>We have created a simple example to give you some (optional) hands-on experience with some of the concepts in this tutorial</a:t>
-            </a:r>
-          </a:p>
-          <a:p>
-            <a:pPr>
-              <a:spcBef>
-                <a:spcPts val="800"/>
-              </a:spcBef>
-            </a:pPr>
-            <a:r>
-              <a:rPr lang="en-US" sz="2000" dirty="0"/>
-              <a:t>You don’t need to understand the math/physics to do the exercises, or find them useful</a:t>
-            </a:r>
-          </a:p>
-          <a:p>
-            <a:pPr marL="0" indent="0">
-              <a:spcBef>
-                <a:spcPts val="3600"/>
-              </a:spcBef>
-              <a:buNone/>
-            </a:pPr>
-            <a:r>
-              <a:rPr lang="en-US" dirty="0"/>
-              <a:t>We do not have much time in the agenda for the hands-on activities, but feel free to continue to work on them outside of the tutorial.  We’ll give feedback on pull requests and issues filed (or email us, see next slide).</a:t>
-            </a:r>
-          </a:p>
-          <a:p>
-            <a:pPr marL="0" indent="0">
-              <a:spcBef>
-                <a:spcPts val="3600"/>
-              </a:spcBef>
-              <a:buNone/>
-            </a:pPr>
-            <a:r>
-              <a:rPr lang="en-US" b="1" dirty="0"/>
-              <a:t>Instructions on the tutorial web site: </a:t>
-            </a:r>
-            <a:r>
-              <a:rPr lang="en-US" sz="2400" b="1" dirty="0">
-                <a:hlinkClick r:id="rId3"/>
-              </a:rPr>
-              <a:t>https://bssw-tutorial.github.io/</a:t>
-            </a:r>
-            <a:br>
-              <a:rPr lang="en-US" sz="2400" b="1" dirty="0"/>
-            </a:br>
-            <a:r>
-              <a:rPr lang="en-US" sz="2400" dirty="0"/>
-              <a:t>and click the link for today’s tutorial</a:t>
-            </a:r>
-            <a:endParaRPr lang="en-US" sz="2800" dirty="0"/>
-          </a:p>
-        </p:txBody>
-      </p:sp>
-      <p:pic>
-        <p:nvPicPr>
-          <p:cNvPr id="4" name="Picture 3">
-            <a:extLst>
-              <a:ext uri="{FF2B5EF4-FFF2-40B4-BE49-F238E27FC236}">
-                <a16:creationId xmlns:a16="http://schemas.microsoft.com/office/drawing/2014/main" id="{B9D05DF5-DD70-4892-B1EC-CCD1C9DC6DD4}"/>
-              </a:ext>
-            </a:extLst>
-          </p:cNvPr>
-          <p:cNvPicPr>
-            <a:picLocks noChangeAspect="1"/>
-          </p:cNvPicPr>
-          <p:nvPr/>
-        </p:nvPicPr>
-        <p:blipFill rotWithShape="1">
-          <a:blip r:embed="rId4"/>
-          <a:srcRect l="8639" t="17307" r="21360" b="13562"/>
-          <a:stretch/>
-        </p:blipFill>
-        <p:spPr>
-          <a:xfrm>
-            <a:off x="6728716" y="1146154"/>
-            <a:ext cx="5120640" cy="2863018"/>
-          </a:xfrm>
-          <a:prstGeom prst="rect">
-            <a:avLst/>
-          </a:prstGeom>
-        </p:spPr>
-      </p:pic>
-    </p:spTree>
-    <p:extLst>
-      <p:ext uri="{BB962C8B-B14F-4D97-AF65-F5344CB8AC3E}">
-        <p14:creationId xmlns:p14="http://schemas.microsoft.com/office/powerpoint/2010/main" val="2645602955"/>
-      </p:ext>
-    </p:extLst>
-  </p:cSld>
-  <p:clrMapOvr>
-    <a:masterClrMapping/>
-  </p:clrMapOvr>
-</p:sld>
-</file>
-
-<file path=ppt/slides/slide11.xml><?xml version="1.0" encoding="utf-8"?>
-<p:sld xmlns:a="http://schemas.openxmlformats.org/drawingml/2006/main" xmlns:r="http://schemas.openxmlformats.org/officeDocument/2006/relationships" xmlns:p="http://schemas.openxmlformats.org/presentationml/2006/main">
-  <p:cSld>
-    <p:spTree>
-      <p:nvGrpSpPr>
-        <p:cNvPr id="1" name=""/>
-        <p:cNvGrpSpPr/>
-        <p:nvPr/>
-      </p:nvGrpSpPr>
-      <p:grpSpPr>
-        <a:xfrm>
-          <a:off x="0" y="0"/>
-          <a:ext cx="0" cy="0"/>
-          <a:chOff x="0" y="0"/>
-          <a:chExt cx="0" cy="0"/>
-        </a:xfrm>
-      </p:grpSpPr>
-      <p:sp>
-        <p:nvSpPr>
-          <p:cNvPr id="2" name="Title 1">
-            <a:extLst>
-              <a:ext uri="{FF2B5EF4-FFF2-40B4-BE49-F238E27FC236}">
                 <a16:creationId xmlns:a16="http://schemas.microsoft.com/office/drawing/2014/main" id="{88D7CFF0-36AC-4BF3-96D2-C6F302144850}"/>
               </a:ext>
             </a:extLst>
@@ -4575,8 +4315,15 @@
             </a:pPr>
             <a:r>
               <a:rPr lang="en-US" dirty="0"/>
-              <a:t>If you work on the hands-on activities, we’ll be glad to provide feedback</a:t>
-            </a:r>
+              <a:t>After the tutorial email us at </a:t>
+            </a:r>
+            <a:r>
+              <a:rPr lang="en-US" dirty="0">
+                <a:hlinkClick r:id="rId2"/>
+              </a:rPr>
+              <a:t>bssw-tutorial@lists.mcs.anl.gov</a:t>
+            </a:r>
+            <a:endParaRPr lang="en-US" dirty="0"/>
           </a:p>
           <a:p>
             <a:pPr lvl="1">
@@ -4586,35 +4333,6 @@
             </a:pPr>
             <a:r>
               <a:rPr lang="en-US" dirty="0"/>
-              <a:t>Submit a pull request and we’ll take a look</a:t>
-            </a:r>
-          </a:p>
-          <a:p>
-            <a:pPr>
-              <a:spcBef>
-                <a:spcPts val="1200"/>
-              </a:spcBef>
-            </a:pPr>
-            <a:r>
-              <a:rPr lang="en-US" dirty="0"/>
-              <a:t>After the tutorial email us at </a:t>
-            </a:r>
-            <a:r>
-              <a:rPr lang="en-US" dirty="0">
-                <a:hlinkClick r:id="rId2"/>
-              </a:rPr>
-              <a:t>bssw-tutorial@lists.mcs.anl.gov</a:t>
-            </a:r>
-            <a:endParaRPr lang="en-US" dirty="0"/>
-          </a:p>
-          <a:p>
-            <a:pPr lvl="1">
-              <a:spcBef>
-                <a:spcPts val="400"/>
-              </a:spcBef>
-            </a:pPr>
-            <a:r>
-              <a:rPr lang="en-US" dirty="0"/>
               <a:t>With questions or feedback</a:t>
             </a:r>
           </a:p>
@@ -4640,6 +4358,85 @@
               <a:rPr lang="en-US" dirty="0"/>
               <a:t> page for all tutorial materials</a:t>
             </a:r>
+          </a:p>
+          <a:p>
+            <a:pPr marL="0" indent="0">
+              <a:spcBef>
+                <a:spcPts val="3600"/>
+              </a:spcBef>
+              <a:buNone/>
+            </a:pPr>
+            <a:r>
+              <a:rPr lang="en-US" sz="2800" b="1" dirty="0"/>
+              <a:t>Related Events: ECP Community </a:t>
+            </a:r>
+            <a:r>
+              <a:rPr lang="en-US" sz="2800" b="1" dirty="0" err="1"/>
+              <a:t>BoF</a:t>
+            </a:r>
+            <a:r>
+              <a:rPr lang="en-US" sz="2800" b="1" dirty="0"/>
+              <a:t> Days</a:t>
+            </a:r>
+          </a:p>
+          <a:p>
+            <a:pPr algn="l">
+              <a:buFont typeface="Arial" panose="020B0604020202020204" pitchFamily="34" charset="0"/>
+              <a:buChar char="•"/>
+            </a:pPr>
+            <a:r>
+              <a:rPr lang="en-US" b="0" i="0" u="sng" dirty="0">
+                <a:solidFill>
+                  <a:srgbClr val="111111"/>
+                </a:solidFill>
+                <a:effectLst/>
+                <a:latin typeface="+mn-lt"/>
+                <a:hlinkClick r:id="rId4"/>
+              </a:rPr>
+              <a:t>Sharing Your Software Sustainability, Productivity, and Quality Experience through BSSw.io</a:t>
+            </a:r>
+            <a:endParaRPr lang="en-US" b="0" i="0" dirty="0">
+              <a:solidFill>
+                <a:srgbClr val="111111"/>
+              </a:solidFill>
+              <a:effectLst/>
+              <a:latin typeface="+mn-lt"/>
+            </a:endParaRPr>
+          </a:p>
+          <a:p>
+            <a:pPr algn="l">
+              <a:buFont typeface="Arial" panose="020B0604020202020204" pitchFamily="34" charset="0"/>
+              <a:buChar char="•"/>
+            </a:pPr>
+            <a:r>
+              <a:rPr lang="en-US" b="0" i="0" u="none" strike="noStrike" dirty="0" err="1">
+                <a:solidFill>
+                  <a:srgbClr val="2A7AE2"/>
+                </a:solidFill>
+                <a:effectLst/>
+                <a:latin typeface="+mn-lt"/>
+                <a:hlinkClick r:id="rId5"/>
+              </a:rPr>
+              <a:t>BSSw</a:t>
+            </a:r>
+            <a:r>
+              <a:rPr lang="en-US" b="0" i="0" u="none" strike="noStrike" dirty="0">
+                <a:solidFill>
+                  <a:srgbClr val="2A7AE2"/>
+                </a:solidFill>
+                <a:effectLst/>
+                <a:latin typeface="+mn-lt"/>
+                <a:hlinkClick r:id="rId5"/>
+              </a:rPr>
+              <a:t> Fellowship</a:t>
+            </a:r>
+            <a:endParaRPr lang="en-US" b="0" i="0" dirty="0">
+              <a:solidFill>
+                <a:srgbClr val="111111"/>
+              </a:solidFill>
+              <a:effectLst/>
+              <a:latin typeface="+mn-lt"/>
+            </a:endParaRPr>
           </a:p>
         </p:txBody>
       </p:sp>
@@ -4656,7 +4453,7 @@
 </p:sld>
 </file>
 
-<file path=ppt/slides/slide12.xml><?xml version="1.0" encoding="utf-8"?>
+<file path=ppt/slides/slide11.xml><?xml version="1.0" encoding="utf-8"?>
 <p:sld xmlns:a="http://schemas.openxmlformats.org/drawingml/2006/main" xmlns:r="http://schemas.openxmlformats.org/officeDocument/2006/relationships" xmlns:p="http://schemas.openxmlformats.org/presentationml/2006/main">
   <p:cSld>
     <p:spTree>
@@ -4722,14 +4519,14 @@
             <p:ph idx="1"/>
             <p:extLst>
               <p:ext uri="{D42A27DB-BD31-4B8C-83A1-F6EECF244321}">
-                <p14:modId xmlns:p14="http://schemas.microsoft.com/office/powerpoint/2010/main" val="2316698016"/>
+                <p14:modId xmlns:p14="http://schemas.microsoft.com/office/powerpoint/2010/main" val="1435102374"/>
               </p:ext>
             </p:extLst>
           </p:nvPr>
         </p:nvGraphicFramePr>
         <p:xfrm>
-          <a:off x="365759" y="836121"/>
-          <a:ext cx="11372473" cy="5943600"/>
+          <a:off x="365758" y="836121"/>
+          <a:ext cx="11372473" cy="3952146"/>
         </p:xfrm>
         <a:graphic>
           <a:graphicData uri="http://schemas.openxmlformats.org/drawingml/2006/table">
@@ -4738,28 +4535,21 @@
                 <a:tableStyleId>{5C22544A-7EE6-4342-B048-85BDC9FD1C3A}</a:tableStyleId>
               </a:tblPr>
               <a:tblGrid>
-                <a:gridCol w="1475653">
+                <a:gridCol w="1627245">
                   <a:extLst>
                     <a:ext uri="{9D8B030D-6E8A-4147-A177-3AD203B41FA5}">
                       <a16:colId xmlns:a16="http://schemas.microsoft.com/office/drawing/2014/main" val="41390910"/>
                     </a:ext>
                   </a:extLst>
                 </a:gridCol>
-                <a:gridCol w="1059443">
-                  <a:extLst>
-                    <a:ext uri="{9D8B030D-6E8A-4147-A177-3AD203B41FA5}">
-                      <a16:colId xmlns:a16="http://schemas.microsoft.com/office/drawing/2014/main" val="2968622667"/>
-                    </a:ext>
-                  </a:extLst>
-                </a:gridCol>
-                <a:gridCol w="5757567">
+                <a:gridCol w="6587117">
                   <a:extLst>
                     <a:ext uri="{9D8B030D-6E8A-4147-A177-3AD203B41FA5}">
                       <a16:colId xmlns:a16="http://schemas.microsoft.com/office/drawing/2014/main" val="1261297711"/>
                     </a:ext>
                   </a:extLst>
                 </a:gridCol>
-                <a:gridCol w="3079810">
+                <a:gridCol w="3158111">
                   <a:extLst>
                     <a:ext uri="{9D8B030D-6E8A-4147-A177-3AD203B41FA5}">
                       <a16:colId xmlns:a16="http://schemas.microsoft.com/office/drawing/2014/main" val="3622604584"/>
@@ -4778,23 +4568,7 @@
                         <a:rPr lang="en-US" sz="1800" dirty="0">
                           <a:effectLst/>
                         </a:rPr>
-                        <a:t>Time (CEST)</a:t>
-                      </a:r>
-                    </a:p>
-                  </a:txBody>
-                  <a:tcPr marL="114300" marR="114300" marT="76200" marB="76200" anchor="ctr"/>
-                </a:tc>
-                <a:tc>
-                  <a:txBody>
-                    <a:bodyPr/>
-                    <a:lstStyle/>
-                    <a:p>
-                      <a:pPr algn="r"/>
-                      <a:r>
-                        <a:rPr lang="en-US" sz="1800" dirty="0">
-                          <a:effectLst/>
-                        </a:rPr>
-                        <a:t>Module</a:t>
+                        <a:t>Time (EST)</a:t>
                       </a:r>
                     </a:p>
                   </a:txBody>
@@ -4836,75 +4610,6 @@
                   </a:ext>
                 </a:extLst>
               </a:tr>
-              <a:tr h="412004">
-                <a:tc>
-                  <a:txBody>
-                    <a:bodyPr/>
-                    <a:lstStyle/>
-                    <a:p>
-                      <a:pPr algn="r"/>
-                      <a:r>
-                        <a:rPr lang="en-US">
-                          <a:effectLst/>
-                        </a:rPr>
-                        <a:t>2:00 PM</a:t>
-                      </a:r>
-                    </a:p>
-                  </a:txBody>
-                  <a:tcPr marL="114300" marR="114300" marT="76200" marB="76200" anchor="ctr"/>
-                </a:tc>
-                <a:tc>
-                  <a:txBody>
-                    <a:bodyPr/>
-                    <a:lstStyle/>
-                    <a:p>
-                      <a:pPr algn="r"/>
-                      <a:r>
-                        <a:rPr lang="en-US">
-                          <a:effectLst/>
-                        </a:rPr>
-                        <a:t>0</a:t>
-                      </a:r>
-                    </a:p>
-                  </a:txBody>
-                  <a:tcPr marL="114300" marR="114300" marT="76200" marB="76200" anchor="ctr"/>
-                </a:tc>
-                <a:tc>
-                  <a:txBody>
-                    <a:bodyPr/>
-                    <a:lstStyle/>
-                    <a:p>
-                      <a:r>
-                        <a:rPr lang="en-US">
-                          <a:effectLst/>
-                        </a:rPr>
-                        <a:t>Introduction and Setup</a:t>
-                      </a:r>
-                    </a:p>
-                  </a:txBody>
-                  <a:tcPr marL="114300" marR="114300" marT="76200" marB="76200" anchor="ctr"/>
-                </a:tc>
-                <a:tc>
-                  <a:txBody>
-                    <a:bodyPr/>
-                    <a:lstStyle/>
-                    <a:p>
-                      <a:r>
-                        <a:rPr lang="en-US">
-                          <a:effectLst/>
-                        </a:rPr>
-                        <a:t>Anshu Dubey (ANL)</a:t>
-                      </a:r>
-                    </a:p>
-                  </a:txBody>
-                  <a:tcPr marL="114300" marR="114300" marT="76200" marB="76200" anchor="ctr"/>
-                </a:tc>
-                <a:extLst>
-                  <a:ext uri="{0D108BD9-81ED-4DB2-BD59-A6C34878D82A}">
-                    <a16:rowId xmlns:a16="http://schemas.microsoft.com/office/drawing/2014/main" val="1735798684"/>
-                  </a:ext>
-                </a:extLst>
-              </a:tr>
               <a:tr h="676863">
                 <a:tc>
                   <a:txBody>
@@ -4916,27 +4621,11 @@
                         <a:rPr lang="en-US">
                           <a:effectLst/>
                         </a:rPr>
-                        <a:t>2:10 PM</a:t>
+                        <a:t>3:00 PM</a:t>
                       </a:r>
                     </a:p>
                   </a:txBody>
-                  <a:tcPr marL="114300" marR="114300" marT="76200" marB="76200" anchor="ctr"/>
-                </a:tc>
-                <a:tc>
-                  <a:txBody>
-                    <a:bodyPr/>
-                    <a:lstStyle/>
-                    <a:p>
-                      <a:pPr algn="r"/>
-                      <a:r>
-                        <a:rPr lang="en-US">
-                          <a:effectLst/>
-                        </a:rPr>
-                        <a:t>1</a:t>
-                      </a:r>
-                    </a:p>
-                  </a:txBody>
-                  <a:tcPr marL="114300" marR="114300" marT="76200" marB="76200" anchor="ctr"/>
+                  <a:tcPr marL="142875" marR="142875" marT="95250" marB="95250" anchor="ctr"/>
                 </a:tc>
                 <a:tc>
                   <a:txBody>
@@ -4944,14 +4633,14 @@
                     <a:lstStyle/>
                     <a:p>
                       <a:r>
-                        <a:rPr lang="en-US">
+                        <a:rPr lang="en-US" dirty="0">
                           <a:effectLst/>
                         </a:rPr>
-                        <a:t>Motivation and Overview of Best Practices in HPC Software Development</a:t>
+                        <a:t>Introduction</a:t>
                       </a:r>
                     </a:p>
                   </a:txBody>
-                  <a:tcPr marL="114300" marR="114300" marT="76200" marB="76200" anchor="ctr"/>
+                  <a:tcPr marL="142875" marR="142875" marT="95250" marB="95250" anchor="ctr"/>
                 </a:tc>
                 <a:tc>
                   <a:txBody>
@@ -4959,14 +4648,14 @@
                     <a:lstStyle/>
                     <a:p>
                       <a:r>
-                        <a:rPr lang="en-US">
+                        <a:rPr lang="en-US" dirty="0">
                           <a:effectLst/>
                         </a:rPr>
-                        <a:t>Anshu Dubey (ANL)</a:t>
+                        <a:t>David E. Bernholdt (ORNL)</a:t>
                       </a:r>
                     </a:p>
                   </a:txBody>
-                  <a:tcPr marL="114300" marR="114300" marT="76200" marB="76200" anchor="ctr"/>
+                  <a:tcPr marL="142875" marR="142875" marT="95250" marB="95250" anchor="ctr"/>
                 </a:tc>
                 <a:extLst>
                   <a:ext uri="{0D108BD9-81ED-4DB2-BD59-A6C34878D82A}">
@@ -4985,27 +4674,11 @@
                         <a:rPr lang="en-US">
                           <a:effectLst/>
                         </a:rPr>
-                        <a:t>2:30 PM</a:t>
+                        <a:t>3:05 PM</a:t>
                       </a:r>
                     </a:p>
                   </a:txBody>
-                  <a:tcPr marL="114300" marR="114300" marT="76200" marB="76200" anchor="ctr"/>
-                </a:tc>
-                <a:tc>
-                  <a:txBody>
-                    <a:bodyPr/>
-                    <a:lstStyle/>
-                    <a:p>
-                      <a:pPr algn="r"/>
-                      <a:r>
-                        <a:rPr lang="en-US">
-                          <a:effectLst/>
-                        </a:rPr>
-                        <a:t>2</a:t>
-                      </a:r>
-                    </a:p>
-                  </a:txBody>
-                  <a:tcPr marL="114300" marR="114300" marT="76200" marB="76200" anchor="ctr"/>
+                  <a:tcPr marL="142875" marR="142875" marT="95250" marB="95250" anchor="ctr"/>
                 </a:tc>
                 <a:tc>
                   <a:txBody>
@@ -5016,11 +4689,11 @@
                         <a:rPr lang="en-US">
                           <a:effectLst/>
                         </a:rPr>
-                        <a:t>Agile Methodologies</a:t>
+                        <a:t>Software Testing and Verification</a:t>
                       </a:r>
                     </a:p>
                   </a:txBody>
-                  <a:tcPr marL="114300" marR="114300" marT="76200" marB="76200" anchor="ctr"/>
+                  <a:tcPr marL="142875" marR="142875" marT="95250" marB="95250" anchor="ctr"/>
                 </a:tc>
                 <a:tc>
                   <a:txBody>
@@ -5031,11 +4704,11 @@
                         <a:rPr lang="en-US">
                           <a:effectLst/>
                         </a:rPr>
-                        <a:t>Gregory R. Watson (ORNL)</a:t>
+                        <a:t>David M. Rogers (ORNL)</a:t>
                       </a:r>
                     </a:p>
                   </a:txBody>
-                  <a:tcPr marL="114300" marR="114300" marT="76200" marB="76200" anchor="ctr"/>
+                  <a:tcPr marL="142875" marR="142875" marT="95250" marB="95250" anchor="ctr"/>
                 </a:tc>
                 <a:extLst>
                   <a:ext uri="{0D108BD9-81ED-4DB2-BD59-A6C34878D82A}">
@@ -5054,27 +4727,11 @@
                         <a:rPr lang="en-US">
                           <a:effectLst/>
                         </a:rPr>
-                        <a:t>3:00 PM</a:t>
+                        <a:t>4:00 PM</a:t>
                       </a:r>
                     </a:p>
                   </a:txBody>
-                  <a:tcPr marL="114300" marR="114300" marT="76200" marB="76200" anchor="ctr"/>
-                </a:tc>
-                <a:tc>
-                  <a:txBody>
-                    <a:bodyPr/>
-                    <a:lstStyle/>
-                    <a:p>
-                      <a:pPr algn="r"/>
-                      <a:r>
-                        <a:rPr lang="en-US">
-                          <a:effectLst/>
-                        </a:rPr>
-                        <a:t>3</a:t>
-                      </a:r>
-                    </a:p>
-                  </a:txBody>
-                  <a:tcPr marL="114300" marR="114300" marT="76200" marB="76200" anchor="ctr"/>
+                  <a:tcPr marL="142875" marR="142875" marT="95250" marB="95250" anchor="ctr"/>
                 </a:tc>
                 <a:tc>
                   <a:txBody>
@@ -5082,29 +4739,29 @@
                     <a:lstStyle/>
                     <a:p>
                       <a:r>
-                        <a:rPr lang="en-US">
+                        <a:rPr lang="en-US" i="1">
                           <a:effectLst/>
                         </a:rPr>
-                        <a:t>Git Workflows</a:t>
+                        <a:t>Break</a:t>
                       </a:r>
+                      <a:endParaRPr lang="en-US">
+                        <a:effectLst/>
+                      </a:endParaRPr>
                     </a:p>
                   </a:txBody>
-                  <a:tcPr marL="114300" marR="114300" marT="76200" marB="76200" anchor="ctr"/>
+                  <a:tcPr marL="142875" marR="142875" marT="95250" marB="95250" anchor="ctr"/>
                 </a:tc>
                 <a:tc>
                   <a:txBody>
                     <a:bodyPr/>
                     <a:lstStyle/>
                     <a:p>
-                      <a:r>
-                        <a:rPr lang="en-US">
-                          <a:effectLst/>
-                        </a:rPr>
-                        <a:t>Gregory R. Watson (ORNL)</a:t>
-                      </a:r>
+                      <a:endParaRPr lang="en-US" dirty="0">
+                        <a:effectLst/>
+                      </a:endParaRPr>
                     </a:p>
                   </a:txBody>
-                  <a:tcPr marL="114300" marR="114300" marT="76200" marB="76200" anchor="ctr"/>
+                  <a:tcPr marL="142875" marR="142875" marT="95250" marB="95250" anchor="ctr"/>
                 </a:tc>
                 <a:extLst>
                   <a:ext uri="{0D108BD9-81ED-4DB2-BD59-A6C34878D82A}">
@@ -5123,27 +4780,11 @@
                         <a:rPr lang="en-US">
                           <a:effectLst/>
                         </a:rPr>
-                        <a:t>3:30 PM</a:t>
+                        <a:t>4:15 PM</a:t>
                       </a:r>
                     </a:p>
                   </a:txBody>
-                  <a:tcPr marL="114300" marR="114300" marT="76200" marB="76200" anchor="ctr"/>
-                </a:tc>
-                <a:tc>
-                  <a:txBody>
-                    <a:bodyPr/>
-                    <a:lstStyle/>
-                    <a:p>
-                      <a:pPr algn="r"/>
-                      <a:r>
-                        <a:rPr lang="en-US">
-                          <a:effectLst/>
-                        </a:rPr>
-                        <a:t>4</a:t>
-                      </a:r>
-                    </a:p>
-                  </a:txBody>
-                  <a:tcPr marL="114300" marR="114300" marT="76200" marB="76200" anchor="ctr"/>
+                  <a:tcPr marL="142875" marR="142875" marT="95250" marB="95250" anchor="ctr"/>
                 </a:tc>
                 <a:tc>
                   <a:txBody>
@@ -5154,11 +4795,11 @@
                         <a:rPr lang="en-US">
                           <a:effectLst/>
                         </a:rPr>
-                        <a:t>Scientific Software Design</a:t>
+                        <a:t>Improving Reproducibility Through Better Software Practices</a:t>
                       </a:r>
                     </a:p>
                   </a:txBody>
-                  <a:tcPr marL="114300" marR="114300" marT="76200" marB="76200" anchor="ctr"/>
+                  <a:tcPr marL="142875" marR="142875" marT="95250" marB="95250" anchor="ctr"/>
                 </a:tc>
                 <a:tc>
                   <a:txBody>
@@ -5169,11 +4810,11 @@
                         <a:rPr lang="en-US">
                           <a:effectLst/>
                         </a:rPr>
-                        <a:t>Anshu Dubey (ANL)</a:t>
+                        <a:t>Gregory R. Watson (ORNL)</a:t>
                       </a:r>
                     </a:p>
                   </a:txBody>
-                  <a:tcPr marL="114300" marR="114300" marT="76200" marB="76200" anchor="ctr"/>
+                  <a:tcPr marL="142875" marR="142875" marT="95250" marB="95250" anchor="ctr"/>
                 </a:tc>
                 <a:extLst>
                   <a:ext uri="{0D108BD9-81ED-4DB2-BD59-A6C34878D82A}">
@@ -5192,24 +4833,11 @@
                         <a:rPr lang="en-US">
                           <a:effectLst/>
                         </a:rPr>
-                        <a:t>4:00 PM</a:t>
+                        <a:t>5:15 PM</a:t>
                       </a:r>
                     </a:p>
                   </a:txBody>
-                  <a:tcPr marL="114300" marR="114300" marT="76200" marB="76200" anchor="ctr"/>
-                </a:tc>
-                <a:tc>
-                  <a:txBody>
-                    <a:bodyPr/>
-                    <a:lstStyle/>
-                    <a:p>
-                      <a:pPr algn="r"/>
-                      <a:endParaRPr lang="en-US">
-                        <a:effectLst/>
-                      </a:endParaRPr>
-                    </a:p>
-                  </a:txBody>
-                  <a:tcPr marL="114300" marR="114300" marT="76200" marB="76200" anchor="ctr"/>
+                  <a:tcPr marL="142875" marR="142875" marT="95250" marB="95250" anchor="ctr"/>
                 </a:tc>
                 <a:tc>
                   <a:txBody>
@@ -5217,29 +4845,29 @@
                     <a:lstStyle/>
                     <a:p>
                       <a:r>
-                        <a:rPr lang="en-US" i="1">
+                        <a:rPr lang="en-US">
                           <a:effectLst/>
                         </a:rPr>
-                        <a:t>Break</a:t>
+                        <a:t>Lab Notebooks for Computational Mathematics, Sciences, &amp; Engineering</a:t>
                       </a:r>
-                      <a:endParaRPr lang="en-US">
-                        <a:effectLst/>
-                      </a:endParaRPr>
                     </a:p>
                   </a:txBody>
-                  <a:tcPr marL="114300" marR="114300" marT="76200" marB="76200" anchor="ctr"/>
+                  <a:tcPr marL="142875" marR="142875" marT="95250" marB="95250" anchor="ctr"/>
                 </a:tc>
                 <a:tc>
                   <a:txBody>
                     <a:bodyPr/>
                     <a:lstStyle/>
                     <a:p>
-                      <a:endParaRPr lang="en-US">
-                        <a:effectLst/>
-                      </a:endParaRPr>
+                      <a:r>
+                        <a:rPr lang="en-US">
+                          <a:effectLst/>
+                        </a:rPr>
+                        <a:t>David E. Bernholdt (ORNL)</a:t>
+                      </a:r>
                     </a:p>
                   </a:txBody>
-                  <a:tcPr marL="114300" marR="114300" marT="76200" marB="76200" anchor="ctr"/>
+                  <a:tcPr marL="142875" marR="142875" marT="95250" marB="95250" anchor="ctr"/>
                 </a:tc>
                 <a:extLst>
                   <a:ext uri="{0D108BD9-81ED-4DB2-BD59-A6C34878D82A}">
@@ -5258,27 +4886,11 @@
                         <a:rPr lang="en-US">
                           <a:effectLst/>
                         </a:rPr>
-                        <a:t>4:30 PM</a:t>
+                        <a:t>6:15 PM</a:t>
                       </a:r>
                     </a:p>
                   </a:txBody>
-                  <a:tcPr marL="114300" marR="114300" marT="76200" marB="76200" anchor="ctr"/>
-                </a:tc>
-                <a:tc>
-                  <a:txBody>
-                    <a:bodyPr/>
-                    <a:lstStyle/>
-                    <a:p>
-                      <a:pPr algn="r"/>
-                      <a:r>
-                        <a:rPr lang="en-US">
-                          <a:effectLst/>
-                        </a:rPr>
-                        <a:t>5</a:t>
-                      </a:r>
-                    </a:p>
-                  </a:txBody>
-                  <a:tcPr marL="114300" marR="114300" marT="76200" marB="76200" anchor="ctr"/>
+                  <a:tcPr marL="142875" marR="142875" marT="95250" marB="95250" anchor="ctr"/>
                 </a:tc>
                 <a:tc>
                   <a:txBody>
@@ -5286,306 +4898,31 @@
                     <a:lstStyle/>
                     <a:p>
                       <a:r>
-                        <a:rPr lang="en-US">
+                        <a:rPr lang="en-US" i="1">
                           <a:effectLst/>
                         </a:rPr>
-                        <a:t>Improving Reproducibility Through Better Software Practices</a:t>
+                        <a:t>Adjourn</a:t>
                       </a:r>
+                      <a:endParaRPr lang="en-US">
+                        <a:effectLst/>
+                      </a:endParaRPr>
                     </a:p>
                   </a:txBody>
-                  <a:tcPr marL="114300" marR="114300" marT="76200" marB="76200" anchor="ctr"/>
+                  <a:tcPr marL="142875" marR="142875" marT="95250" marB="95250" anchor="ctr"/>
                 </a:tc>
                 <a:tc>
                   <a:txBody>
                     <a:bodyPr/>
                     <a:lstStyle/>
                     <a:p>
-                      <a:r>
-                        <a:rPr lang="en-US">
-                          <a:effectLst/>
-                        </a:rPr>
-                        <a:t>Gregory R. Watson (ORNL)</a:t>
-                      </a:r>
+                      <a:endParaRPr lang="en-US" dirty="0"/>
                     </a:p>
                   </a:txBody>
-                  <a:tcPr marL="114300" marR="114300" marT="76200" marB="76200" anchor="ctr"/>
+                  <a:tcPr/>
                 </a:tc>
                 <a:extLst>
                   <a:ext uri="{0D108BD9-81ED-4DB2-BD59-A6C34878D82A}">
                     <a16:rowId xmlns:a16="http://schemas.microsoft.com/office/drawing/2014/main" val="110245607"/>
-                  </a:ext>
-                </a:extLst>
-              </a:tr>
-              <a:tr h="412004">
-                <a:tc>
-                  <a:txBody>
-                    <a:bodyPr/>
-                    <a:lstStyle/>
-                    <a:p>
-                      <a:pPr algn="r"/>
-                      <a:r>
-                        <a:rPr lang="en-US">
-                          <a:effectLst/>
-                        </a:rPr>
-                        <a:t>5:00 PM</a:t>
-                      </a:r>
-                    </a:p>
-                  </a:txBody>
-                  <a:tcPr marL="114300" marR="114300" marT="76200" marB="76200" anchor="ctr"/>
-                </a:tc>
-                <a:tc>
-                  <a:txBody>
-                    <a:bodyPr/>
-                    <a:lstStyle/>
-                    <a:p>
-                      <a:pPr algn="r"/>
-                      <a:r>
-                        <a:rPr lang="en-US">
-                          <a:effectLst/>
-                        </a:rPr>
-                        <a:t>6</a:t>
-                      </a:r>
-                    </a:p>
-                  </a:txBody>
-                  <a:tcPr marL="114300" marR="114300" marT="76200" marB="76200" anchor="ctr"/>
-                </a:tc>
-                <a:tc>
-                  <a:txBody>
-                    <a:bodyPr/>
-                    <a:lstStyle/>
-                    <a:p>
-                      <a:r>
-                        <a:rPr lang="en-US">
-                          <a:effectLst/>
-                        </a:rPr>
-                        <a:t>Software Testing Introduction</a:t>
-                      </a:r>
-                    </a:p>
-                  </a:txBody>
-                  <a:tcPr marL="114300" marR="114300" marT="76200" marB="76200" anchor="ctr"/>
-                </a:tc>
-                <a:tc>
-                  <a:txBody>
-                    <a:bodyPr/>
-                    <a:lstStyle/>
-                    <a:p>
-                      <a:r>
-                        <a:rPr lang="en-US">
-                          <a:effectLst/>
-                        </a:rPr>
-                        <a:t>Gregory R. Watson (ORNL)</a:t>
-                      </a:r>
-                    </a:p>
-                  </a:txBody>
-                  <a:tcPr marL="114300" marR="114300" marT="76200" marB="76200" anchor="ctr"/>
-                </a:tc>
-                <a:extLst>
-                  <a:ext uri="{0D108BD9-81ED-4DB2-BD59-A6C34878D82A}">
-                    <a16:rowId xmlns:a16="http://schemas.microsoft.com/office/drawing/2014/main" val="1951011699"/>
-                  </a:ext>
-                </a:extLst>
-              </a:tr>
-              <a:tr h="412004">
-                <a:tc>
-                  <a:txBody>
-                    <a:bodyPr/>
-                    <a:lstStyle/>
-                    <a:p>
-                      <a:pPr algn="r"/>
-                      <a:r>
-                        <a:rPr lang="en-US">
-                          <a:effectLst/>
-                        </a:rPr>
-                        <a:t>5:20 PM</a:t>
-                      </a:r>
-                    </a:p>
-                  </a:txBody>
-                  <a:tcPr marL="114300" marR="114300" marT="76200" marB="76200" anchor="ctr"/>
-                </a:tc>
-                <a:tc>
-                  <a:txBody>
-                    <a:bodyPr/>
-                    <a:lstStyle/>
-                    <a:p>
-                      <a:pPr algn="r"/>
-                      <a:r>
-                        <a:rPr lang="en-US">
-                          <a:effectLst/>
-                        </a:rPr>
-                        <a:t>7</a:t>
-                      </a:r>
-                    </a:p>
-                  </a:txBody>
-                  <a:tcPr marL="114300" marR="114300" marT="76200" marB="76200" anchor="ctr"/>
-                </a:tc>
-                <a:tc>
-                  <a:txBody>
-                    <a:bodyPr/>
-                    <a:lstStyle/>
-                    <a:p>
-                      <a:r>
-                        <a:rPr lang="en-US">
-                          <a:effectLst/>
-                        </a:rPr>
-                        <a:t>Continuous Integration</a:t>
-                      </a:r>
-                    </a:p>
-                  </a:txBody>
-                  <a:tcPr marL="114300" marR="114300" marT="76200" marB="76200" anchor="ctr"/>
-                </a:tc>
-                <a:tc>
-                  <a:txBody>
-                    <a:bodyPr/>
-                    <a:lstStyle/>
-                    <a:p>
-                      <a:r>
-                        <a:rPr lang="en-US">
-                          <a:effectLst/>
-                        </a:rPr>
-                        <a:t>Gregory R. Watson (ORNL)</a:t>
-                      </a:r>
-                    </a:p>
-                  </a:txBody>
-                  <a:tcPr marL="114300" marR="114300" marT="76200" marB="76200" anchor="ctr"/>
-                </a:tc>
-                <a:extLst>
-                  <a:ext uri="{0D108BD9-81ED-4DB2-BD59-A6C34878D82A}">
-                    <a16:rowId xmlns:a16="http://schemas.microsoft.com/office/drawing/2014/main" val="2677893716"/>
-                  </a:ext>
-                </a:extLst>
-              </a:tr>
-              <a:tr h="412004">
-                <a:tc>
-                  <a:txBody>
-                    <a:bodyPr/>
-                    <a:lstStyle/>
-                    <a:p>
-                      <a:pPr algn="r"/>
-                      <a:r>
-                        <a:rPr lang="en-US" dirty="0">
-                          <a:effectLst/>
-                        </a:rPr>
-                        <a:t>5:40 PM</a:t>
-                      </a:r>
-                    </a:p>
-                  </a:txBody>
-                  <a:tcPr marL="114300" marR="114300" marT="76200" marB="76200" anchor="ctr"/>
-                </a:tc>
-                <a:tc>
-                  <a:txBody>
-                    <a:bodyPr/>
-                    <a:lstStyle/>
-                    <a:p>
-                      <a:pPr algn="r"/>
-                      <a:r>
-                        <a:rPr lang="en-US">
-                          <a:effectLst/>
-                        </a:rPr>
-                        <a:t>8</a:t>
-                      </a:r>
-                    </a:p>
-                  </a:txBody>
-                  <a:tcPr marL="114300" marR="114300" marT="76200" marB="76200" anchor="ctr"/>
-                </a:tc>
-                <a:tc>
-                  <a:txBody>
-                    <a:bodyPr/>
-                    <a:lstStyle/>
-                    <a:p>
-                      <a:r>
-                        <a:rPr lang="en-US">
-                          <a:effectLst/>
-                        </a:rPr>
-                        <a:t>Summary</a:t>
-                      </a:r>
-                    </a:p>
-                  </a:txBody>
-                  <a:tcPr marL="114300" marR="114300" marT="76200" marB="76200" anchor="ctr"/>
-                </a:tc>
-                <a:tc>
-                  <a:txBody>
-                    <a:bodyPr/>
-                    <a:lstStyle/>
-                    <a:p>
-                      <a:r>
-                        <a:rPr lang="en-US" dirty="0">
-                          <a:effectLst/>
-                        </a:rPr>
-                        <a:t>Anshu Dubey (ANL)</a:t>
-                      </a:r>
-                    </a:p>
-                  </a:txBody>
-                  <a:tcPr marL="114300" marR="114300" marT="76200" marB="76200" anchor="ctr"/>
-                </a:tc>
-                <a:extLst>
-                  <a:ext uri="{0D108BD9-81ED-4DB2-BD59-A6C34878D82A}">
-                    <a16:rowId xmlns:a16="http://schemas.microsoft.com/office/drawing/2014/main" val="1485688880"/>
-                  </a:ext>
-                </a:extLst>
-              </a:tr>
-              <a:tr h="412004">
-                <a:tc>
-                  <a:txBody>
-                    <a:bodyPr/>
-                    <a:lstStyle/>
-                    <a:p>
-                      <a:pPr algn="r"/>
-                      <a:r>
-                        <a:rPr lang="en-US" dirty="0">
-                          <a:effectLst/>
-                        </a:rPr>
-                        <a:t>6:00 PM</a:t>
-                      </a:r>
-                    </a:p>
-                  </a:txBody>
-                  <a:tcPr marL="114300" marR="114300" marT="76200" marB="76200" anchor="ctr"/>
-                </a:tc>
-                <a:tc>
-                  <a:txBody>
-                    <a:bodyPr/>
-                    <a:lstStyle/>
-                    <a:p>
-                      <a:pPr algn="r"/>
-                      <a:endParaRPr lang="en-US">
-                        <a:effectLst/>
-                      </a:endParaRPr>
-                    </a:p>
-                  </a:txBody>
-                  <a:tcPr marL="114300" marR="114300" marT="76200" marB="76200" anchor="ctr"/>
-                </a:tc>
-                <a:tc>
-                  <a:txBody>
-                    <a:bodyPr/>
-                    <a:lstStyle/>
-                    <a:p>
-                      <a:r>
-                        <a:rPr lang="en-US" i="1" dirty="0">
-                          <a:effectLst/>
-                        </a:rPr>
-                        <a:t>Adjourn</a:t>
-                      </a:r>
-                      <a:endParaRPr lang="en-US" dirty="0">
-                        <a:effectLst/>
-                      </a:endParaRPr>
-                    </a:p>
-                  </a:txBody>
-                  <a:tcPr marL="114300" marR="114300" marT="76200" marB="76200" anchor="ctr"/>
-                </a:tc>
-                <a:tc>
-                  <a:txBody>
-                    <a:bodyPr/>
-                    <a:lstStyle/>
-                    <a:p>
-                      <a:endParaRPr lang="en-US" dirty="0">
-                        <a:effectLst/>
-                      </a:endParaRPr>
-                    </a:p>
-                  </a:txBody>
-                  <a:tcPr marL="114300" marR="114300" marT="76200" marB="76200" anchor="ctr"/>
-                </a:tc>
-                <a:extLst>
-                  <a:ext uri="{0D108BD9-81ED-4DB2-BD59-A6C34878D82A}">
-                    <a16:rowId xmlns:a16="http://schemas.microsoft.com/office/drawing/2014/main" val="1079961533"/>
                   </a:ext>
                 </a:extLst>
               </a:tr>
@@ -6015,12 +5352,19 @@
               </a:spcBef>
             </a:pPr>
             <a:r>
-              <a:rPr lang="en-US" dirty="0" err="1"/>
-              <a:t>Anshu</a:t>
-            </a:r>
-            <a:r>
               <a:rPr lang="en-US" dirty="0"/>
-              <a:t> Dubey, ANL</a:t>
+              <a:t>David E. Bernholdt, ORNL</a:t>
+            </a:r>
+          </a:p>
+          <a:p>
+            <a:pPr>
+              <a:spcBef>
+                <a:spcPts val="1000"/>
+              </a:spcBef>
+            </a:pPr>
+            <a:r>
+              <a:rPr lang="en-US" dirty="0"/>
+              <a:t>David M. Rogers, ORNL</a:t>
             </a:r>
           </a:p>
           <a:p>
@@ -6078,7 +5422,7 @@
         </p:nvGrpSpPr>
         <p:grpSpPr>
           <a:xfrm>
-            <a:off x="6187929" y="1233230"/>
+            <a:off x="9448389" y="1275274"/>
             <a:ext cx="1038027" cy="1804941"/>
             <a:chOff x="9222950" y="1485878"/>
             <a:chExt cx="1038027" cy="1804941"/>
@@ -6220,93 +5564,220 @@
           </a:p>
         </p:txBody>
       </p:sp>
-      <p:pic>
-        <p:nvPicPr>
-          <p:cNvPr id="5" name="Picture 4">
+      <p:grpSp>
+        <p:nvGrpSpPr>
+          <p:cNvPr id="4" name="Group 3">
             <a:extLst>
               <a:ext uri="{FF2B5EF4-FFF2-40B4-BE49-F238E27FC236}">
-                <a16:creationId xmlns:a16="http://schemas.microsoft.com/office/drawing/2014/main" id="{6CC8798C-054E-37C8-6C39-64AA002F0A79}"/>
+                <a16:creationId xmlns:a16="http://schemas.microsoft.com/office/drawing/2014/main" id="{FB556DB8-D50A-7346-1321-5D7CDF2F73B1}"/>
               </a:ext>
             </a:extLst>
           </p:cNvPr>
-          <p:cNvPicPr>
-            <a:picLocks noChangeAspect="1"/>
-          </p:cNvPicPr>
+          <p:cNvGrpSpPr/>
           <p:nvPr/>
-        </p:nvPicPr>
-        <p:blipFill rotWithShape="1">
-          <a:blip r:embed="rId4" cstate="print">
-            <a:extLst>
-              <a:ext uri="{28A0092B-C50C-407E-A947-70E740481C1C}">
-                <a14:useLocalDpi xmlns:a14="http://schemas.microsoft.com/office/drawing/2010/main" val="0"/>
-              </a:ext>
-            </a:extLst>
-          </a:blip>
-          <a:srcRect t="-1" b="21904"/>
-          <a:stretch/>
-        </p:blipFill>
-        <p:spPr>
+        </p:nvGrpSpPr>
+        <p:grpSpPr>
           <a:xfrm>
-            <a:off x="4929524" y="1233228"/>
-            <a:ext cx="1157986" cy="1188720"/>
+            <a:off x="6108967" y="1275274"/>
+            <a:ext cx="1038027" cy="1796940"/>
+            <a:chOff x="2690082" y="4212393"/>
+            <a:chExt cx="1038027" cy="1796940"/>
           </a:xfrm>
-          <a:prstGeom prst="rect">
-            <a:avLst/>
-          </a:prstGeom>
-        </p:spPr>
-      </p:pic>
-      <p:sp>
-        <p:nvSpPr>
-          <p:cNvPr id="13" name="TextBox 12">
+        </p:grpSpPr>
+        <p:pic>
+          <p:nvPicPr>
+            <p:cNvPr id="6" name="Picture 5" descr="A person wearing glasses&#10;&#10;Description automatically generated with low confidence">
+              <a:extLst>
+                <a:ext uri="{FF2B5EF4-FFF2-40B4-BE49-F238E27FC236}">
+                  <a16:creationId xmlns:a16="http://schemas.microsoft.com/office/drawing/2014/main" id="{B6882300-2E77-64EB-4F71-DA922E61B054}"/>
+                </a:ext>
+              </a:extLst>
+            </p:cNvPr>
+            <p:cNvPicPr>
+              <a:picLocks noChangeAspect="1"/>
+            </p:cNvPicPr>
+            <p:nvPr/>
+          </p:nvPicPr>
+          <p:blipFill rotWithShape="1">
+            <a:blip r:embed="rId4" cstate="print">
+              <a:extLst>
+                <a:ext uri="{28A0092B-C50C-407E-A947-70E740481C1C}">
+                  <a14:useLocalDpi xmlns:a14="http://schemas.microsoft.com/office/drawing/2010/main" val="0"/>
+                </a:ext>
+              </a:extLst>
+            </a:blip>
+            <a:srcRect l="8053" t="854" r="5947" b="-854"/>
+            <a:stretch/>
+          </p:blipFill>
+          <p:spPr>
+            <a:xfrm>
+              <a:off x="2690082" y="4212393"/>
+              <a:ext cx="1038027" cy="1207008"/>
+            </a:xfrm>
+            <a:prstGeom prst="rect">
+              <a:avLst/>
+            </a:prstGeom>
+          </p:spPr>
+        </p:pic>
+        <p:sp>
+          <p:nvSpPr>
+            <p:cNvPr id="7" name="TextBox 6">
+              <a:extLst>
+                <a:ext uri="{FF2B5EF4-FFF2-40B4-BE49-F238E27FC236}">
+                  <a16:creationId xmlns:a16="http://schemas.microsoft.com/office/drawing/2014/main" id="{5DC6A828-15FC-300B-CD50-DB401FC7F744}"/>
+                </a:ext>
+              </a:extLst>
+            </p:cNvPr>
+            <p:cNvSpPr txBox="1"/>
+            <p:nvPr/>
+          </p:nvSpPr>
+          <p:spPr>
+            <a:xfrm>
+              <a:off x="2712806" y="5418402"/>
+              <a:ext cx="992579" cy="590931"/>
+            </a:xfrm>
+            <a:prstGeom prst="rect">
+              <a:avLst/>
+            </a:prstGeom>
+            <a:noFill/>
+          </p:spPr>
+          <p:txBody>
+            <a:bodyPr wrap="none" rtlCol="0">
+              <a:spAutoFit/>
+            </a:bodyPr>
+            <a:lstStyle/>
+            <a:p>
+              <a:pPr algn="ctr">
+                <a:lnSpc>
+                  <a:spcPct val="90000"/>
+                </a:lnSpc>
+              </a:pPr>
+              <a:r>
+                <a:rPr lang="en-US" dirty="0"/>
+                <a:t>David B</a:t>
+              </a:r>
+            </a:p>
+            <a:p>
+              <a:pPr algn="ctr">
+                <a:lnSpc>
+                  <a:spcPct val="90000"/>
+                </a:lnSpc>
+              </a:pPr>
+              <a:r>
+                <a:rPr lang="en-US" i="1" dirty="0"/>
+                <a:t>he/him</a:t>
+              </a:r>
+            </a:p>
+          </p:txBody>
+        </p:sp>
+      </p:grpSp>
+      <p:grpSp>
+        <p:nvGrpSpPr>
+          <p:cNvPr id="8" name="Group 7">
             <a:extLst>
               <a:ext uri="{FF2B5EF4-FFF2-40B4-BE49-F238E27FC236}">
-                <a16:creationId xmlns:a16="http://schemas.microsoft.com/office/drawing/2014/main" id="{F7244D04-A37E-FA33-716C-7A01F0FF1A4E}"/>
+                <a16:creationId xmlns:a16="http://schemas.microsoft.com/office/drawing/2014/main" id="{D3427B7C-1BDA-8C1C-69DC-D7F128CDE26D}"/>
               </a:ext>
             </a:extLst>
           </p:cNvPr>
-          <p:cNvSpPr txBox="1"/>
+          <p:cNvGrpSpPr/>
           <p:nvPr/>
-        </p:nvSpPr>
-        <p:spPr>
+        </p:nvGrpSpPr>
+        <p:grpSpPr>
           <a:xfrm>
-            <a:off x="4947701" y="2394747"/>
-            <a:ext cx="954108" cy="590931"/>
+            <a:off x="7794990" y="1275274"/>
+            <a:ext cx="1005403" cy="1805497"/>
+            <a:chOff x="10526802" y="1346049"/>
+            <a:chExt cx="1005403" cy="1805497"/>
           </a:xfrm>
-          <a:prstGeom prst="rect">
-            <a:avLst/>
-          </a:prstGeom>
-          <a:noFill/>
-        </p:spPr>
-        <p:txBody>
-          <a:bodyPr wrap="none" rtlCol="0">
-            <a:spAutoFit/>
-          </a:bodyPr>
-          <a:lstStyle/>
-          <a:p>
-            <a:pPr algn="ctr">
-              <a:lnSpc>
-                <a:spcPct val="90000"/>
-              </a:lnSpc>
-            </a:pPr>
-            <a:r>
-              <a:rPr lang="en-US" dirty="0" err="1"/>
-              <a:t>Anshu</a:t>
-            </a:r>
-            <a:endParaRPr lang="en-US" dirty="0"/>
-          </a:p>
-          <a:p>
-            <a:pPr algn="ctr">
-              <a:lnSpc>
-                <a:spcPct val="90000"/>
-              </a:lnSpc>
-            </a:pPr>
-            <a:r>
-              <a:rPr lang="en-US" i="1" dirty="0"/>
-              <a:t>she/her</a:t>
-            </a:r>
-          </a:p>
-        </p:txBody>
-      </p:sp>
+        </p:grpSpPr>
+        <p:pic>
+          <p:nvPicPr>
+            <p:cNvPr id="9" name="Picture 8" descr="A person wearing glasses&#10;&#10;Description automatically generated with medium confidence">
+              <a:extLst>
+                <a:ext uri="{FF2B5EF4-FFF2-40B4-BE49-F238E27FC236}">
+                  <a16:creationId xmlns:a16="http://schemas.microsoft.com/office/drawing/2014/main" id="{EE765C1C-D92D-8E8D-DD43-708190CE9003}"/>
+                </a:ext>
+              </a:extLst>
+            </p:cNvPr>
+            <p:cNvPicPr>
+              <a:picLocks noChangeAspect="1"/>
+            </p:cNvPicPr>
+            <p:nvPr/>
+          </p:nvPicPr>
+          <p:blipFill rotWithShape="1">
+            <a:blip r:embed="rId5">
+              <a:extLst>
+                <a:ext uri="{28A0092B-C50C-407E-A947-70E740481C1C}">
+                  <a14:useLocalDpi xmlns:a14="http://schemas.microsoft.com/office/drawing/2010/main" val="0"/>
+                </a:ext>
+              </a:extLst>
+            </a:blip>
+            <a:srcRect l="12970" r="9695"/>
+            <a:stretch/>
+          </p:blipFill>
+          <p:spPr>
+            <a:xfrm>
+              <a:off x="10562794" y="1346049"/>
+              <a:ext cx="933420" cy="1207008"/>
+            </a:xfrm>
+            <a:prstGeom prst="rect">
+              <a:avLst/>
+            </a:prstGeom>
+          </p:spPr>
+        </p:pic>
+        <p:sp>
+          <p:nvSpPr>
+            <p:cNvPr id="10" name="TextBox 9">
+              <a:extLst>
+                <a:ext uri="{FF2B5EF4-FFF2-40B4-BE49-F238E27FC236}">
+                  <a16:creationId xmlns:a16="http://schemas.microsoft.com/office/drawing/2014/main" id="{746E4FA7-D9EE-AE8A-0C3C-EF3AB750A765}"/>
+                </a:ext>
+              </a:extLst>
+            </p:cNvPr>
+            <p:cNvSpPr txBox="1"/>
+            <p:nvPr/>
+          </p:nvSpPr>
+          <p:spPr>
+            <a:xfrm>
+              <a:off x="10526802" y="2560615"/>
+              <a:ext cx="1005403" cy="590931"/>
+            </a:xfrm>
+            <a:prstGeom prst="rect">
+              <a:avLst/>
+            </a:prstGeom>
+            <a:noFill/>
+          </p:spPr>
+          <p:txBody>
+            <a:bodyPr wrap="none" rtlCol="0">
+              <a:spAutoFit/>
+            </a:bodyPr>
+            <a:lstStyle/>
+            <a:p>
+              <a:pPr algn="ctr">
+                <a:lnSpc>
+                  <a:spcPct val="90000"/>
+                </a:lnSpc>
+              </a:pPr>
+              <a:r>
+                <a:rPr lang="en-US" dirty="0"/>
+                <a:t>David R</a:t>
+              </a:r>
+            </a:p>
+            <a:p>
+              <a:pPr algn="ctr">
+                <a:lnSpc>
+                  <a:spcPct val="90000"/>
+                </a:lnSpc>
+              </a:pPr>
+              <a:r>
+                <a:rPr lang="en-US" i="1" dirty="0"/>
+                <a:t>he/him</a:t>
+              </a:r>
+            </a:p>
+          </p:txBody>
+        </p:sp>
+      </p:grpSp>
     </p:spTree>
     <p:extLst>
       <p:ext uri="{BB962C8B-B14F-4D97-AF65-F5344CB8AC3E}">
@@ -11148,13 +10619,6 @@
             </a:r>
           </a:p>
           <a:p>
-            <a:pPr lvl="1"/>
-            <a:r>
-              <a:rPr lang="en-US" dirty="0"/>
-              <a:t>We will backfill tutorials before 2021 as time permits</a:t>
-            </a:r>
-          </a:p>
-          <a:p>
             <a:r>
               <a:rPr lang="en-US" dirty="0"/>
               <a:t>Each tutorial page is considered archival</a:t>
@@ -12301,6 +11765,12 @@
 </file>
 
 <file path=customXml/item1.xml><?xml version="1.0" encoding="utf-8"?>
+<p:properties xmlns:p="http://schemas.microsoft.com/office/2006/metadata/properties" xmlns:xsi="http://www.w3.org/2001/XMLSchema-instance" xmlns:pc="http://schemas.microsoft.com/office/infopath/2007/PartnerControls">
+  <documentManagement/>
+</p:properties>
+</file>
+
+<file path=customXml/item2.xml><?xml version="1.0" encoding="utf-8"?>
 <ct:contentTypeSchema xmlns:ct="http://schemas.microsoft.com/office/2006/metadata/contentType" xmlns:ma="http://schemas.microsoft.com/office/2006/metadata/properties/metaAttributes" ct:_="" ma:_="" ma:contentTypeName="Document" ma:contentTypeID="0x010100565464437F680748A68B85EB6594EA7D" ma:contentTypeVersion="0" ma:contentTypeDescription="Create a new document." ma:contentTypeScope="" ma:versionID="fe3f4dd58d5914c51cfc6deaa8ad845c">
   <xsd:schema xmlns:xsd="http://www.w3.org/2001/XMLSchema" xmlns:p="http://schemas.microsoft.com/office/2006/metadata/properties" targetNamespace="http://schemas.microsoft.com/office/2006/metadata/properties" ma:root="true" ma:fieldsID="4aeb20c0e3442673af7ee10786458764">
     <xsd:element name="properties">
@@ -12349,12 +11819,6 @@
 </ct:contentTypeSchema>
 </file>
 
-<file path=customXml/item2.xml><?xml version="1.0" encoding="utf-8"?>
-<p:properties xmlns:p="http://schemas.microsoft.com/office/2006/metadata/properties" xmlns:xsi="http://www.w3.org/2001/XMLSchema-instance" xmlns:pc="http://schemas.microsoft.com/office/infopath/2007/PartnerControls">
-  <documentManagement/>
-</p:properties>
-</file>
-
 <file path=customXml/item3.xml><?xml version="1.0" encoding="utf-8"?>
 <?mso-contentType ?>
 <FormTemplates xmlns="http://schemas.microsoft.com/sharepoint/v3/contenttype/forms">
@@ -12365,6 +11829,21 @@
 </file>
 
 <file path=customXml/itemProps1.xml><?xml version="1.0" encoding="utf-8"?>
+<ds:datastoreItem xmlns:ds="http://schemas.openxmlformats.org/officeDocument/2006/customXml" ds:itemID="{A50EC660-24D0-43A0-AE5E-E274115E726B}">
+  <ds:schemaRefs>
+    <ds:schemaRef ds:uri="http://purl.org/dc/elements/1.1/"/>
+    <ds:schemaRef ds:uri="http://schemas.microsoft.com/office/2006/metadata/properties"/>
+    <ds:schemaRef ds:uri="http://purl.org/dc/terms/"/>
+    <ds:schemaRef ds:uri="http://schemas.openxmlformats.org/package/2006/metadata/core-properties"/>
+    <ds:schemaRef ds:uri="http://schemas.microsoft.com/office/2006/documentManagement/types"/>
+    <ds:schemaRef ds:uri="http://www.w3.org/XML/1998/namespace"/>
+    <ds:schemaRef ds:uri="http://purl.org/dc/dcmitype/"/>
+    <ds:schemaRef ds:uri="http://schemas.microsoft.com/office/infopath/2007/PartnerControls"/>
+  </ds:schemaRefs>
+</ds:datastoreItem>
+</file>
+
+<file path=customXml/itemProps2.xml><?xml version="1.0" encoding="utf-8"?>
 <ds:datastoreItem xmlns:ds="http://schemas.openxmlformats.org/officeDocument/2006/customXml" ds:itemID="{E8DB7DEB-074E-4EE8-9B6E-FD277323109C}">
   <ds:schemaRefs>
     <ds:schemaRef ds:uri="http://schemas.microsoft.com/office/2006/metadata/contentType"/>
@@ -12379,21 +11858,6 @@
 </ds:datastoreItem>
 </file>
 
-<file path=customXml/itemProps2.xml><?xml version="1.0" encoding="utf-8"?>
-<ds:datastoreItem xmlns:ds="http://schemas.openxmlformats.org/officeDocument/2006/customXml" ds:itemID="{A50EC660-24D0-43A0-AE5E-E274115E726B}">
-  <ds:schemaRefs>
-    <ds:schemaRef ds:uri="http://purl.org/dc/elements/1.1/"/>
-    <ds:schemaRef ds:uri="http://schemas.microsoft.com/office/2006/metadata/properties"/>
-    <ds:schemaRef ds:uri="http://purl.org/dc/terms/"/>
-    <ds:schemaRef ds:uri="http://schemas.openxmlformats.org/package/2006/metadata/core-properties"/>
-    <ds:schemaRef ds:uri="http://schemas.microsoft.com/office/2006/documentManagement/types"/>
-    <ds:schemaRef ds:uri="http://www.w3.org/XML/1998/namespace"/>
-    <ds:schemaRef ds:uri="http://purl.org/dc/dcmitype/"/>
-    <ds:schemaRef ds:uri="http://schemas.microsoft.com/office/infopath/2007/PartnerControls"/>
-  </ds:schemaRefs>
-</ds:datastoreItem>
-</file>
-
 <file path=customXml/itemProps3.xml><?xml version="1.0" encoding="utf-8"?>
 <ds:datastoreItem xmlns:ds="http://schemas.openxmlformats.org/officeDocument/2006/customXml" ds:itemID="{19E20559-B232-4371-8690-E3D8007EDB82}">
   <ds:schemaRefs>

</xml_diff>

<commit_message>
Fix minor bugs in intro
</commit_message>
<xml_diff>
--- a/intro.pptx
+++ b/intro.pptx
@@ -12,7 +12,7 @@
   </p:handoutMasterIdLst>
   <p:sldIdLst>
     <p:sldId id="617" r:id="rId5"/>
-    <p:sldId id="320" r:id="rId6"/>
+    <p:sldId id="627" r:id="rId6"/>
     <p:sldId id="308" r:id="rId7"/>
     <p:sldId id="327" r:id="rId8"/>
     <p:sldId id="324" r:id="rId9"/>
@@ -265,7 +265,7 @@
           <a:p>
             <a:fld id="{0B842F42-2CE9-4E35-95C1-410DC08A50B1}" type="datetimeFigureOut">
               <a:rPr lang="en-US" smtClean="0"/>
-              <a:t>2/1/2023</a:t>
+              <a:t>2/6/2023</a:t>
             </a:fld>
             <a:endParaRPr lang="en-US"/>
           </a:p>
@@ -430,7 +430,7 @@
           <a:p>
             <a:fld id="{6F282904-F315-4730-8D91-37D99E141A6F}" type="datetimeFigureOut">
               <a:rPr lang="en-US" smtClean="0"/>
-              <a:t>2/1/2023</a:t>
+              <a:t>2/6/2023</a:t>
             </a:fld>
             <a:endParaRPr lang="en-US"/>
           </a:p>
@@ -4125,7 +4125,7 @@
           <a:p>
             <a:r>
               <a:rPr lang="en-US" dirty="0"/>
-              <a:t>David E. Bernholdt, David M. Rogers, and Gregory R. Watson, </a:t>
+              <a:t>David E. Bernholdt, David M. Rogers, and Gregory R. Watson </a:t>
             </a:r>
           </a:p>
           <a:p>
@@ -5115,12 +5115,35 @@
               <a:t>The requested citation the overall tutorial is: </a:t>
             </a:r>
             <a:r>
-              <a:rPr lang="en-US" sz="1600" b="1" dirty="0" err="1"/>
-              <a:t>Anshu</a:t>
-            </a:r>
-            <a:r>
-              <a:rPr lang="en-US" sz="1600" b="1" dirty="0"/>
-              <a:t> Dubey and Gregory R. Watson, Better Scientific Software Tutorial, in ISC High Performance, 2022, Hamburg Germany. DOI: 10.6084/m9.figshare.19781752</a:t>
+              <a:rPr lang="en-US" sz="1600" b="0" i="0" dirty="0">
+                <a:solidFill>
+                  <a:srgbClr val="111111"/>
+                </a:solidFill>
+                <a:effectLst/>
+                <a:latin typeface="+mn-lt"/>
+              </a:rPr>
+              <a:t>David E. Bernholdt, David M. Rogers, and Gregory R. Watson, Software Practices for Better Science: Testing, Reproducibility, and Documentation tutorial, in Exascale Computing Project Tutorial Days, online, 2023. DOI: </a:t>
+            </a:r>
+            <a:r>
+              <a:rPr lang="en-US" sz="1600" b="0" i="0" u="none" strike="noStrike" dirty="0">
+                <a:solidFill>
+                  <a:srgbClr val="2A7AE2"/>
+                </a:solidFill>
+                <a:effectLst/>
+                <a:latin typeface="+mn-lt"/>
+                <a:hlinkClick r:id="rId4"/>
+              </a:rPr>
+              <a:t>10.6084/m9.figshare.21989507</a:t>
+            </a:r>
+            <a:r>
+              <a:rPr lang="en-US" sz="1600" b="0" i="0" dirty="0">
+                <a:solidFill>
+                  <a:srgbClr val="111111"/>
+                </a:solidFill>
+                <a:effectLst/>
+                <a:latin typeface="+mn-lt"/>
+              </a:rPr>
+              <a:t>.</a:t>
             </a:r>
           </a:p>
           <a:p>
@@ -5139,7 +5162,29 @@
             </a:r>
             <a:r>
               <a:rPr lang="en-US" sz="1600" dirty="0"/>
-              <a:t>, in Better Scientific Software tutorial, ISC, 2022 …</a:t>
+              <a:t>, </a:t>
+            </a:r>
+            <a:r>
+              <a:rPr lang="en-US" sz="1600"/>
+              <a:t>in </a:t>
+            </a:r>
+            <a:r>
+              <a:rPr lang="en-US" sz="1600" b="0" i="0">
+                <a:solidFill>
+                  <a:srgbClr val="111111"/>
+                </a:solidFill>
+                <a:effectLst/>
+                <a:latin typeface="+mn-lt"/>
+              </a:rPr>
+              <a:t>Software Practices for Better Science: Testing, Reproducibility, and Documentation tutorial</a:t>
+            </a:r>
+            <a:r>
+              <a:rPr lang="en-US" sz="1600"/>
+              <a:t>, </a:t>
+            </a:r>
+            <a:r>
+              <a:rPr lang="en-US" sz="1600" dirty="0"/>
+              <a:t>…</a:t>
             </a:r>
           </a:p>
           <a:p>
@@ -5162,15 +5207,7 @@
             </a:pPr>
             <a:r>
               <a:rPr lang="en-US" sz="1400" dirty="0"/>
-              <a:t>This work was supported by the U.S. Department of Energy Office of Science, Office of Advanced Scientific Computing Research (ASCR), and by the </a:t>
-            </a:r>
-            <a:r>
-              <a:rPr lang="en-US" sz="1400" dirty="0" err="1"/>
-              <a:t>Exascale</a:t>
-            </a:r>
-            <a:r>
-              <a:rPr lang="en-US" sz="1400" dirty="0"/>
-              <a:t> Computing Project (17-SC-20-SC), a collaborative effort of the U.S. Department of Energy Office of Science and the National Nuclear Security Administration</a:t>
+              <a:t>This work was supported by the U.S. Department of Energy Office of Science, Office of Advanced Scientific Computing Research (ASCR), and by the Exascale Computing Project (17-SC-20-SC), a collaborative effort of the U.S. Department of Energy Office of Science and the National Nuclear Security Administration</a:t>
             </a:r>
             <a:r>
               <a:rPr lang="en-US" sz="1400" i="1" dirty="0"/>
@@ -5186,15 +5223,7 @@
             </a:pPr>
             <a:r>
               <a:rPr lang="en-US" sz="1400" dirty="0"/>
-              <a:t>This work was performed in part at the Argonne National Laboratory, which is managed by </a:t>
-            </a:r>
-            <a:r>
-              <a:rPr lang="en-US" sz="1400" dirty="0" err="1"/>
-              <a:t>UChicago</a:t>
-            </a:r>
-            <a:r>
-              <a:rPr lang="en-US" sz="1400" dirty="0"/>
-              <a:t> Argonne, LLC for the U.S. Department of Energy under Contract No. DE-AC02-06CH11357.</a:t>
+              <a:t>This work was performed in part at the Argonne National Laboratory, which is managed by UChicago Argonne, LLC for the U.S. Department of Energy under Contract No. DE-AC02-06CH11357.</a:t>
             </a:r>
           </a:p>
           <a:p>
@@ -5205,7 +5234,7 @@
             </a:pPr>
             <a:r>
               <a:rPr lang="en-US" sz="1400" dirty="0"/>
-              <a:t>This work was performed in part at the Oak Ridge National Laboratory, which is managed by UT-Battelle, LLC for the U.S. Department of Energy under Contract No. DE-AC05-00OR22725.</a:t>
+              <a:t>This work was performed in part at the Lawrence Livermore National Laboratory, which is managed by Lawrence Livermore National Security, LLC for the U.S. Department of Energy under Contract No. DE-AC52-07NA27344.</a:t>
             </a:r>
           </a:p>
           <a:p>
@@ -5216,7 +5245,7 @@
             </a:pPr>
             <a:r>
               <a:rPr lang="en-US" sz="1400" dirty="0"/>
-              <a:t>This work was performed in part at the Lawrence Livermore National Laboratory, which is managed by Lawrence Livermore National Security, LLC for the U.S. Department of Energy under Contract No. DE-AC52-07NA27344.</a:t>
+              <a:t>This work was performed in part at the Los Alamos National Laboratory, which is managed by Triad National Security, LLC for the U.S. Department of Energy under Contract No.89233218CNA000001</a:t>
             </a:r>
           </a:p>
           <a:p>
@@ -5227,7 +5256,7 @@
             </a:pPr>
             <a:r>
               <a:rPr lang="en-US" sz="1400" dirty="0"/>
-              <a:t>This work was performed in part at the Los Alamos National Laboratory, which is managed by Triad National Security, LLC for the U.S. Department of Energy under Contract No.89233218CNA000001</a:t>
+              <a:t>This work was performed in part at the Oak Ridge National Laboratory, which is managed by UT-Battelle, LLC for the U.S. Department of Energy under Contract No. DE-AC05-00OR22725.</a:t>
             </a:r>
           </a:p>
           <a:p>
@@ -5258,7 +5287,7 @@
           <p:nvPr/>
         </p:nvPicPr>
         <p:blipFill>
-          <a:blip r:embed="rId4">
+          <a:blip r:embed="rId5">
             <a:extLst>
               <a:ext uri="{28A0092B-C50C-407E-A947-70E740481C1C}">
                 <a14:useLocalDpi xmlns:a14="http://schemas.microsoft.com/office/drawing/2010/main" val="0"/>
@@ -5293,7 +5322,7 @@
     </p:spTree>
     <p:extLst>
       <p:ext uri="{BB962C8B-B14F-4D97-AF65-F5344CB8AC3E}">
-        <p14:creationId xmlns:p14="http://schemas.microsoft.com/office/powerpoint/2010/main" val="1013042433"/>
+        <p14:creationId xmlns:p14="http://schemas.microsoft.com/office/powerpoint/2010/main" val="978726433"/>
       </p:ext>
     </p:extLst>
   </p:cSld>
@@ -11765,12 +11794,6 @@
 </file>
 
 <file path=customXml/item1.xml><?xml version="1.0" encoding="utf-8"?>
-<p:properties xmlns:p="http://schemas.microsoft.com/office/2006/metadata/properties" xmlns:xsi="http://www.w3.org/2001/XMLSchema-instance" xmlns:pc="http://schemas.microsoft.com/office/infopath/2007/PartnerControls">
-  <documentManagement/>
-</p:properties>
-</file>
-
-<file path=customXml/item2.xml><?xml version="1.0" encoding="utf-8"?>
 <ct:contentTypeSchema xmlns:ct="http://schemas.microsoft.com/office/2006/metadata/contentType" xmlns:ma="http://schemas.microsoft.com/office/2006/metadata/properties/metaAttributes" ct:_="" ma:_="" ma:contentTypeName="Document" ma:contentTypeID="0x010100565464437F680748A68B85EB6594EA7D" ma:contentTypeVersion="0" ma:contentTypeDescription="Create a new document." ma:contentTypeScope="" ma:versionID="fe3f4dd58d5914c51cfc6deaa8ad845c">
   <xsd:schema xmlns:xsd="http://www.w3.org/2001/XMLSchema" xmlns:p="http://schemas.microsoft.com/office/2006/metadata/properties" targetNamespace="http://schemas.microsoft.com/office/2006/metadata/properties" ma:root="true" ma:fieldsID="4aeb20c0e3442673af7ee10786458764">
     <xsd:element name="properties">
@@ -11819,6 +11842,12 @@
 </ct:contentTypeSchema>
 </file>
 
+<file path=customXml/item2.xml><?xml version="1.0" encoding="utf-8"?>
+<p:properties xmlns:p="http://schemas.microsoft.com/office/2006/metadata/properties" xmlns:xsi="http://www.w3.org/2001/XMLSchema-instance" xmlns:pc="http://schemas.microsoft.com/office/infopath/2007/PartnerControls">
+  <documentManagement/>
+</p:properties>
+</file>
+
 <file path=customXml/item3.xml><?xml version="1.0" encoding="utf-8"?>
 <?mso-contentType ?>
 <FormTemplates xmlns="http://schemas.microsoft.com/sharepoint/v3/contenttype/forms">
@@ -11829,6 +11858,21 @@
 </file>
 
 <file path=customXml/itemProps1.xml><?xml version="1.0" encoding="utf-8"?>
+<ds:datastoreItem xmlns:ds="http://schemas.openxmlformats.org/officeDocument/2006/customXml" ds:itemID="{E8DB7DEB-074E-4EE8-9B6E-FD277323109C}">
+  <ds:schemaRefs>
+    <ds:schemaRef ds:uri="http://schemas.microsoft.com/office/2006/metadata/contentType"/>
+    <ds:schemaRef ds:uri="http://schemas.microsoft.com/office/2006/metadata/properties/metaAttributes"/>
+    <ds:schemaRef ds:uri="http://www.w3.org/2001/XMLSchema"/>
+    <ds:schemaRef ds:uri="http://schemas.microsoft.com/office/2006/metadata/properties"/>
+    <ds:schemaRef ds:uri="http://schemas.openxmlformats.org/package/2006/metadata/core-properties"/>
+    <ds:schemaRef ds:uri="http://purl.org/dc/elements/1.1/"/>
+    <ds:schemaRef ds:uri="http://purl.org/dc/terms/"/>
+    <ds:schemaRef ds:uri="http://schemas.microsoft.com/office/internal/2005/internalDocumentation"/>
+  </ds:schemaRefs>
+</ds:datastoreItem>
+</file>
+
+<file path=customXml/itemProps2.xml><?xml version="1.0" encoding="utf-8"?>
 <ds:datastoreItem xmlns:ds="http://schemas.openxmlformats.org/officeDocument/2006/customXml" ds:itemID="{A50EC660-24D0-43A0-AE5E-E274115E726B}">
   <ds:schemaRefs>
     <ds:schemaRef ds:uri="http://purl.org/dc/elements/1.1/"/>
@@ -11843,21 +11887,6 @@
 </ds:datastoreItem>
 </file>
 
-<file path=customXml/itemProps2.xml><?xml version="1.0" encoding="utf-8"?>
-<ds:datastoreItem xmlns:ds="http://schemas.openxmlformats.org/officeDocument/2006/customXml" ds:itemID="{E8DB7DEB-074E-4EE8-9B6E-FD277323109C}">
-  <ds:schemaRefs>
-    <ds:schemaRef ds:uri="http://schemas.microsoft.com/office/2006/metadata/contentType"/>
-    <ds:schemaRef ds:uri="http://schemas.microsoft.com/office/2006/metadata/properties/metaAttributes"/>
-    <ds:schemaRef ds:uri="http://www.w3.org/2001/XMLSchema"/>
-    <ds:schemaRef ds:uri="http://schemas.microsoft.com/office/2006/metadata/properties"/>
-    <ds:schemaRef ds:uri="http://schemas.openxmlformats.org/package/2006/metadata/core-properties"/>
-    <ds:schemaRef ds:uri="http://purl.org/dc/elements/1.1/"/>
-    <ds:schemaRef ds:uri="http://purl.org/dc/terms/"/>
-    <ds:schemaRef ds:uri="http://schemas.microsoft.com/office/internal/2005/internalDocumentation"/>
-  </ds:schemaRefs>
-</ds:datastoreItem>
-</file>
-
 <file path=customXml/itemProps3.xml><?xml version="1.0" encoding="utf-8"?>
 <ds:datastoreItem xmlns:ds="http://schemas.openxmlformats.org/officeDocument/2006/customXml" ds:itemID="{19E20559-B232-4371-8690-E3D8007EDB82}">
   <ds:schemaRefs>

</xml_diff>

<commit_message>
Added Greg to intro
</commit_message>
<xml_diff>
--- a/intro.pptx
+++ b/intro.pptx
@@ -265,7 +265,7 @@
           <a:p>
             <a:fld id="{0B842F42-2CE9-4E35-95C1-410DC08A50B1}" type="datetimeFigureOut">
               <a:rPr lang="en-US" smtClean="0"/>
-              <a:t>4/17/2023</a:t>
+              <a:t>10/19/23</a:t>
             </a:fld>
             <a:endParaRPr lang="en-US"/>
           </a:p>
@@ -430,7 +430,7 @@
           <a:p>
             <a:fld id="{6F282904-F315-4730-8D91-37D99E141A6F}" type="datetimeFigureOut">
               <a:rPr lang="en-US" smtClean="0"/>
-              <a:t>4/17/2023</a:t>
+              <a:t>10/19/23</a:t>
             </a:fld>
             <a:endParaRPr lang="en-US"/>
           </a:p>
@@ -4116,7 +4116,7 @@
         <p:spPr>
           <a:xfrm>
             <a:off x="3177632" y="1959498"/>
-            <a:ext cx="6777898" cy="2855300"/>
+            <a:ext cx="6156149" cy="2855300"/>
           </a:xfrm>
         </p:spPr>
         <p:txBody>
@@ -4125,7 +4125,7 @@
           <a:p>
             <a:r>
               <a:rPr lang="en-US" dirty="0"/>
-              <a:t>David E. Bernholdt, Patricia A. Grubel, and David M. Rogers</a:t>
+              <a:t>David E. Bernholdt, Patricia A. Grubel, David M. Rogers, and Gregory Watson</a:t>
             </a:r>
           </a:p>
           <a:p>
@@ -5594,7 +5594,7 @@
         </p:nvGrpSpPr>
         <p:grpSpPr>
           <a:xfrm>
-            <a:off x="7946256" y="1269264"/>
+            <a:off x="6523295" y="1191022"/>
             <a:ext cx="1009507" cy="1851663"/>
             <a:chOff x="8066531" y="1374891"/>
             <a:chExt cx="1009507" cy="1851663"/>
@@ -5705,7 +5705,7 @@
         </p:nvSpPr>
         <p:spPr>
           <a:xfrm>
-            <a:off x="365760" y="1280696"/>
+            <a:off x="409507" y="1198438"/>
             <a:ext cx="11369809" cy="4047778"/>
           </a:xfrm>
         </p:spPr>
@@ -5743,6 +5743,17 @@
             <a:r>
               <a:rPr lang="en-US" dirty="0"/>
               <a:t>David M. Rogers, ORNL</a:t>
+            </a:r>
+          </a:p>
+          <a:p>
+            <a:pPr>
+              <a:spcBef>
+                <a:spcPts val="1000"/>
+              </a:spcBef>
+            </a:pPr>
+            <a:r>
+              <a:rPr lang="en-US" dirty="0"/>
+              <a:t>Gregory Watson, ORNL</a:t>
             </a:r>
           </a:p>
         </p:txBody>
@@ -5838,7 +5849,7 @@
         </p:nvGrpSpPr>
         <p:grpSpPr>
           <a:xfrm>
-            <a:off x="6108967" y="1269264"/>
+            <a:off x="4961654" y="1198438"/>
             <a:ext cx="1038027" cy="1796940"/>
             <a:chOff x="2690082" y="4212393"/>
             <a:chExt cx="1038027" cy="1796940"/>
@@ -5945,7 +5956,7 @@
         </p:nvGrpSpPr>
         <p:grpSpPr>
           <a:xfrm>
-            <a:off x="9755024" y="1269264"/>
+            <a:off x="8183400" y="1215546"/>
             <a:ext cx="1005403" cy="1805497"/>
             <a:chOff x="10526802" y="1346049"/>
             <a:chExt cx="1005403" cy="1805497"/>
@@ -6022,6 +6033,150 @@
               <a:r>
                 <a:rPr lang="en-US" dirty="0"/>
                 <a:t>David R</a:t>
+              </a:r>
+            </a:p>
+            <a:p>
+              <a:pPr algn="ctr">
+                <a:lnSpc>
+                  <a:spcPct val="90000"/>
+                </a:lnSpc>
+              </a:pPr>
+              <a:r>
+                <a:rPr lang="en-US" i="1" dirty="0"/>
+                <a:t>he/him</a:t>
+              </a:r>
+            </a:p>
+          </p:txBody>
+        </p:sp>
+      </p:grpSp>
+      <p:sp>
+        <p:nvSpPr>
+          <p:cNvPr id="15" name="TextBox 14">
+            <a:extLst>
+              <a:ext uri="{FF2B5EF4-FFF2-40B4-BE49-F238E27FC236}">
+                <a16:creationId xmlns:a16="http://schemas.microsoft.com/office/drawing/2014/main" id="{2CD48F1C-6C06-9FA0-AD37-2D6B3479DE27}"/>
+              </a:ext>
+            </a:extLst>
+          </p:cNvPr>
+          <p:cNvSpPr txBox="1"/>
+          <p:nvPr/>
+        </p:nvSpPr>
+        <p:spPr>
+          <a:xfrm>
+            <a:off x="-457200" y="-1717978"/>
+            <a:ext cx="240130" cy="433965"/>
+          </a:xfrm>
+          <a:prstGeom prst="rect">
+            <a:avLst/>
+          </a:prstGeom>
+          <a:noFill/>
+        </p:spPr>
+        <p:txBody>
+          <a:bodyPr wrap="none" lIns="118872" tIns="91440" rIns="118872" bIns="91440" rtlCol="0" anchor="ctr" anchorCtr="0">
+            <a:spAutoFit/>
+          </a:bodyPr>
+          <a:lstStyle/>
+          <a:p>
+            <a:pPr algn="l">
+              <a:lnSpc>
+                <a:spcPct val="90000"/>
+              </a:lnSpc>
+            </a:pPr>
+            <a:endParaRPr lang="en-US" dirty="0"/>
+          </a:p>
+        </p:txBody>
+      </p:sp>
+      <p:grpSp>
+        <p:nvGrpSpPr>
+          <p:cNvPr id="18" name="Group 17">
+            <a:extLst>
+              <a:ext uri="{FF2B5EF4-FFF2-40B4-BE49-F238E27FC236}">
+                <a16:creationId xmlns:a16="http://schemas.microsoft.com/office/drawing/2014/main" id="{051E86D2-2D18-6DAD-A78D-D21718ABDD83}"/>
+              </a:ext>
+            </a:extLst>
+          </p:cNvPr>
+          <p:cNvGrpSpPr/>
+          <p:nvPr/>
+        </p:nvGrpSpPr>
+        <p:grpSpPr>
+          <a:xfrm>
+            <a:off x="9556593" y="1180578"/>
+            <a:ext cx="1300357" cy="1862107"/>
+            <a:chOff x="10379326" y="1289439"/>
+            <a:chExt cx="1300357" cy="1862107"/>
+          </a:xfrm>
+        </p:grpSpPr>
+        <p:pic>
+          <p:nvPicPr>
+            <p:cNvPr id="19" name="Picture 18">
+              <a:extLst>
+                <a:ext uri="{FF2B5EF4-FFF2-40B4-BE49-F238E27FC236}">
+                  <a16:creationId xmlns:a16="http://schemas.microsoft.com/office/drawing/2014/main" id="{23D64F1C-0D77-EB89-5ECC-F9A86696135C}"/>
+                </a:ext>
+              </a:extLst>
+            </p:cNvPr>
+            <p:cNvPicPr>
+              <a:picLocks noChangeAspect="1"/>
+            </p:cNvPicPr>
+            <p:nvPr/>
+          </p:nvPicPr>
+          <p:blipFill>
+            <a:blip r:embed="rId6">
+              <a:extLst>
+                <a:ext uri="{28A0092B-C50C-407E-A947-70E740481C1C}">
+                  <a14:useLocalDpi xmlns:a14="http://schemas.microsoft.com/office/drawing/2010/main" val="0"/>
+                </a:ext>
+              </a:extLst>
+            </a:blip>
+            <a:srcRect l="11333" r="11333"/>
+            <a:stretch/>
+          </p:blipFill>
+          <p:spPr>
+            <a:xfrm>
+              <a:off x="10562794" y="1289439"/>
+              <a:ext cx="933420" cy="1207008"/>
+            </a:xfrm>
+            <a:prstGeom prst="rect">
+              <a:avLst/>
+            </a:prstGeom>
+          </p:spPr>
+        </p:pic>
+        <p:sp>
+          <p:nvSpPr>
+            <p:cNvPr id="20" name="TextBox 19">
+              <a:extLst>
+                <a:ext uri="{FF2B5EF4-FFF2-40B4-BE49-F238E27FC236}">
+                  <a16:creationId xmlns:a16="http://schemas.microsoft.com/office/drawing/2014/main" id="{5740A3EC-EB28-7D94-3864-184BCF754013}"/>
+                </a:ext>
+              </a:extLst>
+            </p:cNvPr>
+            <p:cNvSpPr txBox="1"/>
+            <p:nvPr/>
+          </p:nvSpPr>
+          <p:spPr>
+            <a:xfrm>
+              <a:off x="10379326" y="2560615"/>
+              <a:ext cx="1300357" cy="590931"/>
+            </a:xfrm>
+            <a:prstGeom prst="rect">
+              <a:avLst/>
+            </a:prstGeom>
+            <a:noFill/>
+          </p:spPr>
+          <p:txBody>
+            <a:bodyPr wrap="none" rtlCol="0">
+              <a:spAutoFit/>
+            </a:bodyPr>
+            <a:lstStyle/>
+            <a:p>
+              <a:pPr algn="ctr">
+                <a:lnSpc>
+                  <a:spcPct val="90000"/>
+                </a:lnSpc>
+              </a:pPr>
+              <a:r>
+                <a:rPr lang="en-US" dirty="0"/>
+                <a:t>Gregory W</a:t>
               </a:r>
             </a:p>
             <a:p>
@@ -12030,6 +12185,21 @@
 </file>
 
 <file path=customXml/item1.xml><?xml version="1.0" encoding="utf-8"?>
+<p:properties xmlns:p="http://schemas.microsoft.com/office/2006/metadata/properties" xmlns:xsi="http://www.w3.org/2001/XMLSchema-instance" xmlns:pc="http://schemas.microsoft.com/office/infopath/2007/PartnerControls">
+  <documentManagement/>
+</p:properties>
+</file>
+
+<file path=customXml/item2.xml><?xml version="1.0" encoding="utf-8"?>
+<?mso-contentType ?>
+<FormTemplates xmlns="http://schemas.microsoft.com/sharepoint/v3/contenttype/forms">
+  <Display>DocumentLibraryForm</Display>
+  <Edit>DocumentLibraryForm</Edit>
+  <New>DocumentLibraryForm</New>
+</FormTemplates>
+</file>
+
+<file path=customXml/item3.xml><?xml version="1.0" encoding="utf-8"?>
 <ct:contentTypeSchema xmlns:ct="http://schemas.microsoft.com/office/2006/metadata/contentType" xmlns:ma="http://schemas.microsoft.com/office/2006/metadata/properties/metaAttributes" ct:_="" ma:_="" ma:contentTypeName="Document" ma:contentTypeID="0x010100565464437F680748A68B85EB6594EA7D" ma:contentTypeVersion="0" ma:contentTypeDescription="Create a new document." ma:contentTypeScope="" ma:versionID="fe3f4dd58d5914c51cfc6deaa8ad845c">
   <xsd:schema xmlns:xsd="http://www.w3.org/2001/XMLSchema" xmlns:p="http://schemas.microsoft.com/office/2006/metadata/properties" targetNamespace="http://schemas.microsoft.com/office/2006/metadata/properties" ma:root="true" ma:fieldsID="4aeb20c0e3442673af7ee10786458764">
     <xsd:element name="properties">
@@ -12078,32 +12248,17 @@
 </ct:contentTypeSchema>
 </file>
 
-<file path=customXml/item2.xml><?xml version="1.0" encoding="utf-8"?>
-<?mso-contentType ?>
-<FormTemplates xmlns="http://schemas.microsoft.com/sharepoint/v3/contenttype/forms">
-  <Display>DocumentLibraryForm</Display>
-  <Edit>DocumentLibraryForm</Edit>
-  <New>DocumentLibraryForm</New>
-</FormTemplates>
-</file>
-
-<file path=customXml/item3.xml><?xml version="1.0" encoding="utf-8"?>
-<p:properties xmlns:p="http://schemas.microsoft.com/office/2006/metadata/properties" xmlns:xsi="http://www.w3.org/2001/XMLSchema-instance" xmlns:pc="http://schemas.microsoft.com/office/infopath/2007/PartnerControls">
-  <documentManagement/>
-</p:properties>
-</file>
-
 <file path=customXml/itemProps1.xml><?xml version="1.0" encoding="utf-8"?>
-<ds:datastoreItem xmlns:ds="http://schemas.openxmlformats.org/officeDocument/2006/customXml" ds:itemID="{E8DB7DEB-074E-4EE8-9B6E-FD277323109C}">
+<ds:datastoreItem xmlns:ds="http://schemas.openxmlformats.org/officeDocument/2006/customXml" ds:itemID="{A50EC660-24D0-43A0-AE5E-E274115E726B}">
   <ds:schemaRefs>
-    <ds:schemaRef ds:uri="http://schemas.microsoft.com/office/2006/metadata/contentType"/>
-    <ds:schemaRef ds:uri="http://schemas.microsoft.com/office/2006/metadata/properties/metaAttributes"/>
-    <ds:schemaRef ds:uri="http://www.w3.org/2001/XMLSchema"/>
+    <ds:schemaRef ds:uri="http://purl.org/dc/elements/1.1/"/>
     <ds:schemaRef ds:uri="http://schemas.microsoft.com/office/2006/metadata/properties"/>
+    <ds:schemaRef ds:uri="http://purl.org/dc/terms/"/>
     <ds:schemaRef ds:uri="http://schemas.openxmlformats.org/package/2006/metadata/core-properties"/>
-    <ds:schemaRef ds:uri="http://purl.org/dc/elements/1.1/"/>
-    <ds:schemaRef ds:uri="http://purl.org/dc/terms/"/>
-    <ds:schemaRef ds:uri="http://schemas.microsoft.com/office/internal/2005/internalDocumentation"/>
+    <ds:schemaRef ds:uri="http://schemas.microsoft.com/office/2006/documentManagement/types"/>
+    <ds:schemaRef ds:uri="http://www.w3.org/XML/1998/namespace"/>
+    <ds:schemaRef ds:uri="http://purl.org/dc/dcmitype/"/>
+    <ds:schemaRef ds:uri="http://schemas.microsoft.com/office/infopath/2007/PartnerControls"/>
   </ds:schemaRefs>
 </ds:datastoreItem>
 </file>
@@ -12117,16 +12272,16 @@
 </file>
 
 <file path=customXml/itemProps3.xml><?xml version="1.0" encoding="utf-8"?>
-<ds:datastoreItem xmlns:ds="http://schemas.openxmlformats.org/officeDocument/2006/customXml" ds:itemID="{A50EC660-24D0-43A0-AE5E-E274115E726B}">
+<ds:datastoreItem xmlns:ds="http://schemas.openxmlformats.org/officeDocument/2006/customXml" ds:itemID="{E8DB7DEB-074E-4EE8-9B6E-FD277323109C}">
   <ds:schemaRefs>
+    <ds:schemaRef ds:uri="http://schemas.microsoft.com/office/2006/metadata/contentType"/>
+    <ds:schemaRef ds:uri="http://schemas.microsoft.com/office/2006/metadata/properties/metaAttributes"/>
+    <ds:schemaRef ds:uri="http://www.w3.org/2001/XMLSchema"/>
+    <ds:schemaRef ds:uri="http://schemas.microsoft.com/office/2006/metadata/properties"/>
+    <ds:schemaRef ds:uri="http://schemas.openxmlformats.org/package/2006/metadata/core-properties"/>
     <ds:schemaRef ds:uri="http://purl.org/dc/elements/1.1/"/>
-    <ds:schemaRef ds:uri="http://schemas.microsoft.com/office/2006/metadata/properties"/>
     <ds:schemaRef ds:uri="http://purl.org/dc/terms/"/>
-    <ds:schemaRef ds:uri="http://schemas.openxmlformats.org/package/2006/metadata/core-properties"/>
-    <ds:schemaRef ds:uri="http://schemas.microsoft.com/office/2006/documentManagement/types"/>
-    <ds:schemaRef ds:uri="http://www.w3.org/XML/1998/namespace"/>
-    <ds:schemaRef ds:uri="http://purl.org/dc/dcmitype/"/>
-    <ds:schemaRef ds:uri="http://schemas.microsoft.com/office/infopath/2007/PartnerControls"/>
+    <ds:schemaRef ds:uri="http://schemas.microsoft.com/office/internal/2005/internalDocumentation"/>
   </ds:schemaRefs>
 </ds:datastoreItem>
 </file>
</xml_diff>

<commit_message>
Update Pat's presentations for SC23
</commit_message>
<xml_diff>
--- a/intro.pptx
+++ b/intro.pptx
@@ -5,14 +5,14 @@
     <p:sldMasterId id="2147483935" r:id="rId4"/>
   </p:sldMasterIdLst>
   <p:notesMasterIdLst>
-    <p:notesMasterId r:id="rId16"/>
+    <p:notesMasterId r:id="rId17"/>
   </p:notesMasterIdLst>
   <p:handoutMasterIdLst>
-    <p:handoutMasterId r:id="rId17"/>
+    <p:handoutMasterId r:id="rId18"/>
   </p:handoutMasterIdLst>
   <p:sldIdLst>
     <p:sldId id="617" r:id="rId5"/>
-    <p:sldId id="320" r:id="rId6"/>
+    <p:sldId id="628" r:id="rId6"/>
     <p:sldId id="308" r:id="rId7"/>
     <p:sldId id="327" r:id="rId8"/>
     <p:sldId id="324" r:id="rId9"/>
@@ -22,6 +22,7 @@
     <p:sldId id="622" r:id="rId13"/>
     <p:sldId id="626" r:id="rId14"/>
     <p:sldId id="261" r:id="rId15"/>
+    <p:sldId id="627" r:id="rId16"/>
   </p:sldIdLst>
   <p:sldSz cx="12188825" cy="6858000"/>
   <p:notesSz cx="7010400" cy="9296400"/>
@@ -265,7 +266,7 @@
           <a:p>
             <a:fld id="{0B842F42-2CE9-4E35-95C1-410DC08A50B1}" type="datetimeFigureOut">
               <a:rPr lang="en-US" smtClean="0"/>
-              <a:t>10/19/23</a:t>
+              <a:t>10/26/2023</a:t>
             </a:fld>
             <a:endParaRPr lang="en-US"/>
           </a:p>
@@ -430,7 +431,7 @@
           <a:p>
             <a:fld id="{6F282904-F315-4730-8D91-37D99E141A6F}" type="datetimeFigureOut">
               <a:rPr lang="en-US" smtClean="0"/>
-              <a:t>10/19/23</a:t>
+              <a:t>10/26/2023</a:t>
             </a:fld>
             <a:endParaRPr lang="en-US"/>
           </a:p>
@@ -4091,9 +4092,15 @@
               </a:spcBef>
             </a:pPr>
             <a:r>
-              <a:rPr lang="en-US" dirty="0"/>
-              <a:t>Better Scientific Software</a:t>
-            </a:r>
+              <a:rPr lang="en-US" i="0" dirty="0">
+                <a:solidFill>
+                  <a:srgbClr val="111111"/>
+                </a:solidFill>
+                <a:effectLst/>
+              </a:rPr>
+              <a:t>Better Software for Reproducible Science</a:t>
+            </a:r>
+            <a:endParaRPr lang="en-US" dirty="0"/>
           </a:p>
         </p:txBody>
       </p:sp>
@@ -4137,7 +4144,7 @@
                 <a:effectLst/>
                 <a:latin typeface="-apple-system"/>
               </a:rPr>
-              <a:t>Improving Scientific Software conference (2023)</a:t>
+              <a:t>The International Conference for High-Performance Computing, Networking, Storage, and Analysis (SC23) conference</a:t>
             </a:r>
             <a:endParaRPr lang="en-US" dirty="0"/>
           </a:p>
@@ -4358,6 +4365,67 @@
               <a:rPr lang="en-US" dirty="0"/>
               <a:t> page for all tutorial materials</a:t>
             </a:r>
+          </a:p>
+        </p:txBody>
+      </p:sp>
+      <p:sp>
+        <p:nvSpPr>
+          <p:cNvPr id="6" name="TextBox 5">
+            <a:extLst>
+              <a:ext uri="{FF2B5EF4-FFF2-40B4-BE49-F238E27FC236}">
+                <a16:creationId xmlns:a16="http://schemas.microsoft.com/office/drawing/2014/main" id="{FD775666-00EA-4946-A36B-827208F32092}"/>
+              </a:ext>
+            </a:extLst>
+          </p:cNvPr>
+          <p:cNvSpPr txBox="1"/>
+          <p:nvPr/>
+        </p:nvSpPr>
+        <p:spPr>
+          <a:xfrm>
+            <a:off x="3361713" y="4043678"/>
+            <a:ext cx="5465397" cy="1846659"/>
+          </a:xfrm>
+          <a:prstGeom prst="rect">
+            <a:avLst/>
+          </a:prstGeom>
+          <a:solidFill>
+            <a:srgbClr val="FFFF00"/>
+          </a:solidFill>
+          <a:ln>
+            <a:solidFill>
+              <a:schemeClr val="tx1"/>
+            </a:solidFill>
+          </a:ln>
+        </p:spPr>
+        <p:txBody>
+          <a:bodyPr wrap="square" lIns="118872" tIns="91440" rIns="118872" bIns="91440" rtlCol="0" anchor="ctr" anchorCtr="0">
+            <a:spAutoFit/>
+          </a:bodyPr>
+          <a:lstStyle/>
+          <a:p>
+            <a:pPr algn="ctr">
+              <a:lnSpc>
+                <a:spcPct val="90000"/>
+              </a:lnSpc>
+            </a:pPr>
+            <a:r>
+              <a:rPr lang="en-US" sz="2400" dirty="0"/>
+              <a:t>You may also be interested in these other software-related events at SC23: </a:t>
+            </a:r>
+            <a:r>
+              <a:rPr lang="en-US" sz="2400" dirty="0">
+                <a:hlinkClick r:id="rId4"/>
+              </a:rPr>
+              <a:t>https://bssw.io/events/sc23-software-related-events</a:t>
+            </a:r>
+            <a:br>
+              <a:rPr lang="en-US" sz="2400" dirty="0"/>
+            </a:br>
+            <a:r>
+              <a:rPr lang="en-US" dirty="0"/>
+              <a:t>(link is also on tutorial web page)</a:t>
+            </a:r>
+            <a:endParaRPr lang="en-US" sz="2400" dirty="0"/>
           </a:p>
         </p:txBody>
       </p:sp>
@@ -4419,7 +4487,7 @@
           <a:p>
             <a:r>
               <a:rPr lang="en-US" dirty="0"/>
-              <a:t>Agenda </a:t>
+              <a:t>Agenda (1/2) </a:t>
             </a:r>
           </a:p>
         </p:txBody>
@@ -4440,14 +4508,14 @@
             <p:ph idx="1"/>
             <p:extLst>
               <p:ext uri="{D42A27DB-BD31-4B8C-83A1-F6EECF244321}">
-                <p14:modId xmlns:p14="http://schemas.microsoft.com/office/powerpoint/2010/main" val="2838353602"/>
+                <p14:modId xmlns:p14="http://schemas.microsoft.com/office/powerpoint/2010/main" val="2927661847"/>
               </p:ext>
             </p:extLst>
           </p:nvPr>
         </p:nvGraphicFramePr>
         <p:xfrm>
           <a:off x="408175" y="923337"/>
-          <a:ext cx="11372473" cy="5888943"/>
+          <a:ext cx="11372473" cy="4669743"/>
         </p:xfrm>
         <a:graphic>
           <a:graphicData uri="http://schemas.openxmlformats.org/drawingml/2006/table">
@@ -4463,14 +4531,14 @@
                     </a:ext>
                   </a:extLst>
                 </a:gridCol>
-                <a:gridCol w="6998597">
+                <a:gridCol w="6872360">
                   <a:extLst>
                     <a:ext uri="{9D8B030D-6E8A-4147-A177-3AD203B41FA5}">
                       <a16:colId xmlns:a16="http://schemas.microsoft.com/office/drawing/2014/main" val="1261297711"/>
                     </a:ext>
                   </a:extLst>
                 </a:gridCol>
-                <a:gridCol w="2746631">
+                <a:gridCol w="2872868">
                   <a:extLst>
                     <a:ext uri="{9D8B030D-6E8A-4147-A177-3AD203B41FA5}">
                       <a16:colId xmlns:a16="http://schemas.microsoft.com/office/drawing/2014/main" val="3622604584"/>
@@ -4489,7 +4557,7 @@
                         <a:rPr lang="en-US" sz="1600" dirty="0">
                           <a:effectLst/>
                         </a:rPr>
-                        <a:t>Time (MDT)</a:t>
+                        <a:t>Time (MST)</a:t>
                       </a:r>
                     </a:p>
                   </a:txBody>
@@ -4531,7 +4599,7 @@
                   </a:ext>
                 </a:extLst>
               </a:tr>
-              <a:tr h="262476">
+              <a:tr h="254856">
                 <a:tc>
                   <a:txBody>
                     <a:bodyPr/>
@@ -4539,10 +4607,10 @@
                     <a:p>
                       <a:pPr algn="r"/>
                       <a:r>
-                        <a:rPr lang="en-US" sz="1600" dirty="0">
+                        <a:rPr lang="en-US" dirty="0">
                           <a:effectLst/>
                         </a:rPr>
-                        <a:t>9:00 AM</a:t>
+                        <a:t>8:30 AM</a:t>
                       </a:r>
                     </a:p>
                   </a:txBody>
@@ -4554,7 +4622,7 @@
                     <a:lstStyle/>
                     <a:p>
                       <a:r>
-                        <a:rPr lang="en-US" sz="1600">
+                        <a:rPr lang="en-US">
                           <a:effectLst/>
                         </a:rPr>
                         <a:t>Introduction</a:t>
@@ -4569,63 +4637,10 @@
                     <a:lstStyle/>
                     <a:p>
                       <a:r>
-                        <a:rPr lang="en-US" sz="1600" dirty="0">
+                        <a:rPr lang="en-US" dirty="0">
                           <a:effectLst/>
                         </a:rPr>
-                        <a:t>David E. Bernholdt (ORNL)</a:t>
-                      </a:r>
-                    </a:p>
-                  </a:txBody>
-                  <a:tcPr marL="142875" marR="142875" marT="95250" marB="95250" anchor="ctr"/>
-                </a:tc>
-                <a:extLst>
-                  <a:ext uri="{0D108BD9-81ED-4DB2-BD59-A6C34878D82A}">
-                    <a16:rowId xmlns:a16="http://schemas.microsoft.com/office/drawing/2014/main" val="3771408676"/>
-                  </a:ext>
-                </a:extLst>
-              </a:tr>
-              <a:tr h="254856">
-                <a:tc>
-                  <a:txBody>
-                    <a:bodyPr/>
-                    <a:lstStyle/>
-                    <a:p>
-                      <a:pPr algn="r"/>
-                      <a:r>
-                        <a:rPr lang="en-US" sz="1600">
-                          <a:effectLst/>
-                        </a:rPr>
-                        <a:t>9:10 AM</a:t>
-                      </a:r>
-                    </a:p>
-                  </a:txBody>
-                  <a:tcPr marL="142875" marR="142875" marT="95250" marB="95250" anchor="ctr"/>
-                </a:tc>
-                <a:tc>
-                  <a:txBody>
-                    <a:bodyPr/>
-                    <a:lstStyle/>
-                    <a:p>
-                      <a:r>
-                        <a:rPr lang="en-US" sz="1600" dirty="0">
-                          <a:effectLst/>
-                        </a:rPr>
-                        <a:t>Motivation and Overview of Best Practices in HPC Software Development</a:t>
-                      </a:r>
-                    </a:p>
-                  </a:txBody>
-                  <a:tcPr marL="142875" marR="142875" marT="95250" marB="95250" anchor="ctr"/>
-                </a:tc>
-                <a:tc>
-                  <a:txBody>
-                    <a:bodyPr/>
-                    <a:lstStyle/>
-                    <a:p>
-                      <a:r>
-                        <a:rPr lang="en-US" sz="1600">
-                          <a:effectLst/>
-                        </a:rPr>
-                        <a:t>David E. Bernholdt (ORNL)</a:t>
+                        <a:t>Patricia A. Grubel (LANL)</a:t>
                       </a:r>
                     </a:p>
                   </a:txBody>
@@ -4645,10 +4660,10 @@
                     <a:p>
                       <a:pPr algn="r"/>
                       <a:r>
-                        <a:rPr lang="en-US" sz="1600">
+                        <a:rPr lang="en-US">
                           <a:effectLst/>
                         </a:rPr>
-                        <a:t>9:35 AM</a:t>
+                        <a:t>8:40 AM</a:t>
                       </a:r>
                     </a:p>
                   </a:txBody>
@@ -4660,10 +4675,10 @@
                     <a:lstStyle/>
                     <a:p>
                       <a:r>
-                        <a:rPr lang="en-US" sz="1600">
+                        <a:rPr lang="en-US">
                           <a:effectLst/>
                         </a:rPr>
-                        <a:t>Scientific Software Design</a:t>
+                        <a:t>Motivation and Overview of Best Practices in HPC Software Development</a:t>
                       </a:r>
                     </a:p>
                   </a:txBody>
@@ -4675,10 +4690,10 @@
                     <a:lstStyle/>
                     <a:p>
                       <a:r>
-                        <a:rPr lang="en-US" sz="1600">
+                        <a:rPr lang="en-US">
                           <a:effectLst/>
                         </a:rPr>
-                        <a:t>David E. Bernholdt (ORNL)</a:t>
+                        <a:t>Patricia A. Grubel (LANL)</a:t>
                       </a:r>
                     </a:p>
                   </a:txBody>
@@ -4698,10 +4713,10 @@
                     <a:p>
                       <a:pPr algn="r"/>
                       <a:r>
-                        <a:rPr lang="en-US" sz="1600">
+                        <a:rPr lang="en-US">
                           <a:effectLst/>
                         </a:rPr>
-                        <a:t>10:00 AM</a:t>
+                        <a:t>9:05 AM</a:t>
                       </a:r>
                     </a:p>
                   </a:txBody>
@@ -4713,10 +4728,10 @@
                     <a:lstStyle/>
                     <a:p>
                       <a:r>
-                        <a:rPr lang="en-US" sz="1600">
+                        <a:rPr lang="en-US">
                           <a:effectLst/>
                         </a:rPr>
-                        <a:t>Refactoring Scientific Software</a:t>
+                        <a:t>Scientific Software Design</a:t>
                       </a:r>
                     </a:p>
                   </a:txBody>
@@ -4728,10 +4743,10 @@
                     <a:lstStyle/>
                     <a:p>
                       <a:r>
-                        <a:rPr lang="en-US" sz="1600">
+                        <a:rPr lang="en-US">
                           <a:effectLst/>
                         </a:rPr>
-                        <a:t>David E. Bernholdt (ORNL)</a:t>
+                        <a:t>David M. Rogers (ORNL)</a:t>
                       </a:r>
                     </a:p>
                   </a:txBody>
@@ -4751,10 +4766,10 @@
                     <a:p>
                       <a:pPr algn="r"/>
                       <a:r>
-                        <a:rPr lang="en-US" sz="1600">
+                        <a:rPr lang="en-US">
                           <a:effectLst/>
                         </a:rPr>
-                        <a:t>10:30 AM</a:t>
+                        <a:t>9:30 AM</a:t>
                       </a:r>
                     </a:p>
                   </a:txBody>
@@ -4766,14 +4781,11 @@
                     <a:lstStyle/>
                     <a:p>
                       <a:r>
-                        <a:rPr lang="en-US" sz="1600" i="1">
+                        <a:rPr lang="en-US">
                           <a:effectLst/>
                         </a:rPr>
-                        <a:t>Break</a:t>
+                        <a:t>Refactoring Scientific Software</a:t>
                       </a:r>
-                      <a:endParaRPr lang="en-US" sz="1600">
-                        <a:effectLst/>
-                      </a:endParaRPr>
                     </a:p>
                   </a:txBody>
                   <a:tcPr marL="142875" marR="142875" marT="95250" marB="95250" anchor="ctr"/>
@@ -4783,9 +4795,12 @@
                     <a:bodyPr/>
                     <a:lstStyle/>
                     <a:p>
-                      <a:endParaRPr lang="en-US" sz="1600">
-                        <a:effectLst/>
-                      </a:endParaRPr>
+                      <a:r>
+                        <a:rPr lang="en-US">
+                          <a:effectLst/>
+                        </a:rPr>
+                        <a:t>David M. Rogers (ORNL)</a:t>
+                      </a:r>
                     </a:p>
                   </a:txBody>
                   <a:tcPr marL="142875" marR="142875" marT="95250" marB="95250" anchor="ctr"/>
@@ -4804,10 +4819,10 @@
                     <a:p>
                       <a:pPr algn="r"/>
                       <a:r>
-                        <a:rPr lang="en-US" sz="1600">
+                        <a:rPr lang="en-US">
                           <a:effectLst/>
                         </a:rPr>
-                        <a:t>11:00 AM</a:t>
+                        <a:t>10:00 AM</a:t>
                       </a:r>
                     </a:p>
                   </a:txBody>
@@ -4819,11 +4834,14 @@
                     <a:lstStyle/>
                     <a:p>
                       <a:r>
-                        <a:rPr lang="en-US" sz="1600">
+                        <a:rPr lang="en-US" i="1">
                           <a:effectLst/>
                         </a:rPr>
-                        <a:t>Collaborative Software Development</a:t>
+                        <a:t>Morning break</a:t>
                       </a:r>
+                      <a:endParaRPr lang="en-US">
+                        <a:effectLst/>
+                      </a:endParaRPr>
                     </a:p>
                   </a:txBody>
                   <a:tcPr marL="142875" marR="142875" marT="95250" marB="95250" anchor="ctr"/>
@@ -4833,12 +4851,9 @@
                     <a:bodyPr/>
                     <a:lstStyle/>
                     <a:p>
-                      <a:r>
-                        <a:rPr lang="en-US" sz="1600">
-                          <a:effectLst/>
-                        </a:rPr>
-                        <a:t>Patricia A. Grubel (LANL)</a:t>
-                      </a:r>
+                      <a:endParaRPr lang="en-US">
+                        <a:effectLst/>
+                      </a:endParaRPr>
                     </a:p>
                   </a:txBody>
                   <a:tcPr marL="142875" marR="142875" marT="95250" marB="95250" anchor="ctr"/>
@@ -4857,10 +4872,10 @@
                     <a:p>
                       <a:pPr algn="r"/>
                       <a:r>
-                        <a:rPr lang="en-US" sz="1600">
+                        <a:rPr lang="en-US">
                           <a:effectLst/>
                         </a:rPr>
-                        <a:t>11:40 AM</a:t>
+                        <a:t>10:30 AM</a:t>
                       </a:r>
                     </a:p>
                   </a:txBody>
@@ -4872,10 +4887,10 @@
                     <a:lstStyle/>
                     <a:p>
                       <a:r>
-                        <a:rPr lang="en-US" sz="1600">
+                        <a:rPr lang="en-US">
                           <a:effectLst/>
                         </a:rPr>
-                        <a:t>Software Packaging - Condensed Version</a:t>
+                        <a:t>Software Packaging</a:t>
                       </a:r>
                     </a:p>
                   </a:txBody>
@@ -4887,7 +4902,7 @@
                     <a:lstStyle/>
                     <a:p>
                       <a:r>
-                        <a:rPr lang="en-US" sz="1600">
+                        <a:rPr lang="en-US">
                           <a:effectLst/>
                         </a:rPr>
                         <a:t>David M. Rogers (ORNL)</a:t>
@@ -4910,10 +4925,10 @@
                     <a:p>
                       <a:pPr algn="r"/>
                       <a:r>
-                        <a:rPr lang="en-US" sz="1600">
+                        <a:rPr lang="en-US">
                           <a:effectLst/>
                         </a:rPr>
-                        <a:t>12:00 PM</a:t>
+                        <a:t>11:00 AM</a:t>
                       </a:r>
                     </a:p>
                   </a:txBody>
@@ -4925,14 +4940,11 @@
                     <a:lstStyle/>
                     <a:p>
                       <a:r>
-                        <a:rPr lang="en-US" sz="1600" i="1">
+                        <a:rPr lang="en-US">
                           <a:effectLst/>
                         </a:rPr>
-                        <a:t>Lunch break</a:t>
+                        <a:t>Collaborative Software Development</a:t>
                       </a:r>
-                      <a:endParaRPr lang="en-US" sz="1600">
-                        <a:effectLst/>
-                      </a:endParaRPr>
                     </a:p>
                   </a:txBody>
                   <a:tcPr marL="142875" marR="142875" marT="95250" marB="95250" anchor="ctr"/>
@@ -4942,9 +4954,12 @@
                     <a:bodyPr/>
                     <a:lstStyle/>
                     <a:p>
-                      <a:endParaRPr lang="en-US" sz="1600">
-                        <a:effectLst/>
-                      </a:endParaRPr>
+                      <a:r>
+                        <a:rPr lang="en-US">
+                          <a:effectLst/>
+                        </a:rPr>
+                        <a:t>Patricia A. Grubel (LANL)</a:t>
+                      </a:r>
                     </a:p>
                   </a:txBody>
                   <a:tcPr marL="142875" marR="142875" marT="95250" marB="95250" anchor="ctr"/>
@@ -4963,10 +4978,10 @@
                     <a:p>
                       <a:pPr algn="r"/>
                       <a:r>
-                        <a:rPr lang="en-US" sz="1600">
+                        <a:rPr lang="en-US">
                           <a:effectLst/>
                         </a:rPr>
-                        <a:t>1:00 PM</a:t>
+                        <a:t>12:00 PM</a:t>
                       </a:r>
                     </a:p>
                   </a:txBody>
@@ -4978,171 +4993,12 @@
                     <a:lstStyle/>
                     <a:p>
                       <a:r>
-                        <a:rPr lang="en-US" sz="1600">
+                        <a:rPr lang="en-US" i="1">
                           <a:effectLst/>
                         </a:rPr>
-                        <a:t>Testing Strategies - Condensed Version</a:t>
+                        <a:t>Lunch break</a:t>
                       </a:r>
-                    </a:p>
-                  </a:txBody>
-                  <a:tcPr marL="142875" marR="142875" marT="95250" marB="95250" anchor="ctr"/>
-                </a:tc>
-                <a:tc>
-                  <a:txBody>
-                    <a:bodyPr/>
-                    <a:lstStyle/>
-                    <a:p>
-                      <a:r>
-                        <a:rPr lang="en-US" sz="1600">
-                          <a:effectLst/>
-                        </a:rPr>
-                        <a:t>David M. Rogers (ORNL)</a:t>
-                      </a:r>
-                    </a:p>
-                  </a:txBody>
-                  <a:tcPr marL="142875" marR="142875" marT="95250" marB="95250" anchor="ctr"/>
-                </a:tc>
-                <a:extLst>
-                  <a:ext uri="{0D108BD9-81ED-4DB2-BD59-A6C34878D82A}">
-                    <a16:rowId xmlns:a16="http://schemas.microsoft.com/office/drawing/2014/main" val="1954771440"/>
-                  </a:ext>
-                </a:extLst>
-              </a:tr>
-              <a:tr h="0">
-                <a:tc>
-                  <a:txBody>
-                    <a:bodyPr/>
-                    <a:lstStyle/>
-                    <a:p>
-                      <a:pPr algn="r"/>
-                      <a:r>
-                        <a:rPr lang="en-US" sz="1600">
-                          <a:effectLst/>
-                        </a:rPr>
-                        <a:t>1:30 PM</a:t>
-                      </a:r>
-                    </a:p>
-                  </a:txBody>
-                  <a:tcPr marL="142875" marR="142875" marT="95250" marB="95250" anchor="ctr"/>
-                </a:tc>
-                <a:tc>
-                  <a:txBody>
-                    <a:bodyPr/>
-                    <a:lstStyle/>
-                    <a:p>
-                      <a:r>
-                        <a:rPr lang="en-US" sz="1600">
-                          <a:effectLst/>
-                        </a:rPr>
-                        <a:t>Improving Reproducibility Through Better Software Practices</a:t>
-                      </a:r>
-                    </a:p>
-                  </a:txBody>
-                  <a:tcPr marL="142875" marR="142875" marT="95250" marB="95250" anchor="ctr"/>
-                </a:tc>
-                <a:tc>
-                  <a:txBody>
-                    <a:bodyPr/>
-                    <a:lstStyle/>
-                    <a:p>
-                      <a:r>
-                        <a:rPr lang="en-US" sz="1600">
-                          <a:effectLst/>
-                        </a:rPr>
-                        <a:t>Patricia A. Grubel (LANL)</a:t>
-                      </a:r>
-                    </a:p>
-                  </a:txBody>
-                  <a:tcPr marL="142875" marR="142875" marT="95250" marB="95250" anchor="ctr"/>
-                </a:tc>
-                <a:extLst>
-                  <a:ext uri="{0D108BD9-81ED-4DB2-BD59-A6C34878D82A}">
-                    <a16:rowId xmlns:a16="http://schemas.microsoft.com/office/drawing/2014/main" val="746396693"/>
-                  </a:ext>
-                </a:extLst>
-              </a:tr>
-              <a:tr h="0">
-                <a:tc>
-                  <a:txBody>
-                    <a:bodyPr/>
-                    <a:lstStyle/>
-                    <a:p>
-                      <a:pPr algn="r"/>
-                      <a:r>
-                        <a:rPr lang="en-US" sz="1600">
-                          <a:effectLst/>
-                        </a:rPr>
-                        <a:t>2:15 PM</a:t>
-                      </a:r>
-                    </a:p>
-                  </a:txBody>
-                  <a:tcPr marL="142875" marR="142875" marT="95250" marB="95250" anchor="ctr"/>
-                </a:tc>
-                <a:tc>
-                  <a:txBody>
-                    <a:bodyPr/>
-                    <a:lstStyle/>
-                    <a:p>
-                      <a:r>
-                        <a:rPr lang="en-US" sz="1600">
-                          <a:effectLst/>
-                        </a:rPr>
-                        <a:t>Summary</a:t>
-                      </a:r>
-                    </a:p>
-                  </a:txBody>
-                  <a:tcPr marL="142875" marR="142875" marT="95250" marB="95250" anchor="ctr"/>
-                </a:tc>
-                <a:tc>
-                  <a:txBody>
-                    <a:bodyPr/>
-                    <a:lstStyle/>
-                    <a:p>
-                      <a:r>
-                        <a:rPr lang="en-US" sz="1600">
-                          <a:effectLst/>
-                        </a:rPr>
-                        <a:t>Patricia A. Grubel (LANL)</a:t>
-                      </a:r>
-                    </a:p>
-                  </a:txBody>
-                  <a:tcPr marL="142875" marR="142875" marT="95250" marB="95250" anchor="ctr"/>
-                </a:tc>
-                <a:extLst>
-                  <a:ext uri="{0D108BD9-81ED-4DB2-BD59-A6C34878D82A}">
-                    <a16:rowId xmlns:a16="http://schemas.microsoft.com/office/drawing/2014/main" val="1592907298"/>
-                  </a:ext>
-                </a:extLst>
-              </a:tr>
-              <a:tr h="412004">
-                <a:tc>
-                  <a:txBody>
-                    <a:bodyPr/>
-                    <a:lstStyle/>
-                    <a:p>
-                      <a:pPr algn="r"/>
-                      <a:r>
-                        <a:rPr lang="en-US" sz="1600">
-                          <a:effectLst/>
-                        </a:rPr>
-                        <a:t>2:30 PM</a:t>
-                      </a:r>
-                    </a:p>
-                  </a:txBody>
-                  <a:tcPr marL="142875" marR="142875" marT="95250" marB="95250" anchor="ctr"/>
-                </a:tc>
-                <a:tc>
-                  <a:txBody>
-                    <a:bodyPr/>
-                    <a:lstStyle/>
-                    <a:p>
-                      <a:r>
-                        <a:rPr lang="en-US" sz="1600" i="1">
-                          <a:effectLst/>
-                        </a:rPr>
-                        <a:t>Adjourn</a:t>
-                      </a:r>
-                      <a:endParaRPr lang="en-US" sz="1600">
+                      <a:endParaRPr lang="en-US">
                         <a:effectLst/>
                       </a:endParaRPr>
                     </a:p>
@@ -5154,14 +5010,14 @@
                     <a:bodyPr/>
                     <a:lstStyle/>
                     <a:p>
-                      <a:endParaRPr lang="en-US" sz="1600" dirty="0"/>
+                      <a:endParaRPr lang="en-US" dirty="0"/>
                     </a:p>
                   </a:txBody>
                   <a:tcPr/>
                 </a:tc>
                 <a:extLst>
                   <a:ext uri="{0D108BD9-81ED-4DB2-BD59-A6C34878D82A}">
-                    <a16:rowId xmlns:a16="http://schemas.microsoft.com/office/drawing/2014/main" val="110245607"/>
+                    <a16:rowId xmlns:a16="http://schemas.microsoft.com/office/drawing/2014/main" val="1954771440"/>
                   </a:ext>
                 </a:extLst>
               </a:tr>
@@ -5223,6 +5079,704 @@
     <p:extLst>
       <p:ext uri="{BB962C8B-B14F-4D97-AF65-F5344CB8AC3E}">
         <p14:creationId xmlns:p14="http://schemas.microsoft.com/office/powerpoint/2010/main" val="2448329568"/>
+      </p:ext>
+    </p:extLst>
+  </p:cSld>
+  <p:clrMapOvr>
+    <a:masterClrMapping/>
+  </p:clrMapOvr>
+</p:sld>
+</file>
+
+<file path=ppt/slides/slide12.xml><?xml version="1.0" encoding="utf-8"?>
+<p:sld xmlns:a="http://schemas.openxmlformats.org/drawingml/2006/main" xmlns:r="http://schemas.openxmlformats.org/officeDocument/2006/relationships" xmlns:p="http://schemas.openxmlformats.org/presentationml/2006/main">
+  <p:cSld>
+    <p:spTree>
+      <p:nvGrpSpPr>
+        <p:cNvPr id="1" name=""/>
+        <p:cNvGrpSpPr/>
+        <p:nvPr/>
+      </p:nvGrpSpPr>
+      <p:grpSpPr>
+        <a:xfrm>
+          <a:off x="0" y="0"/>
+          <a:ext cx="0" cy="0"/>
+          <a:chOff x="0" y="0"/>
+          <a:chExt cx="0" cy="0"/>
+        </a:xfrm>
+      </p:grpSpPr>
+      <p:sp>
+        <p:nvSpPr>
+          <p:cNvPr id="2" name="Title 1">
+            <a:extLst>
+              <a:ext uri="{FF2B5EF4-FFF2-40B4-BE49-F238E27FC236}">
+                <a16:creationId xmlns:a16="http://schemas.microsoft.com/office/drawing/2014/main" id="{1D6756EE-C2D9-4E52-B0B6-3C831FD6A565}"/>
+              </a:ext>
+            </a:extLst>
+          </p:cNvPr>
+          <p:cNvSpPr>
+            <a:spLocks noGrp="1"/>
+          </p:cNvSpPr>
+          <p:nvPr>
+            <p:ph type="title"/>
+          </p:nvPr>
+        </p:nvSpPr>
+        <p:spPr>
+          <a:xfrm>
+            <a:off x="408175" y="160020"/>
+            <a:ext cx="11372473" cy="914400"/>
+          </a:xfrm>
+        </p:spPr>
+        <p:txBody>
+          <a:bodyPr/>
+          <a:lstStyle/>
+          <a:p>
+            <a:r>
+              <a:rPr lang="en-US" dirty="0"/>
+              <a:t>Agenda (2/2) </a:t>
+            </a:r>
+          </a:p>
+        </p:txBody>
+      </p:sp>
+      <p:graphicFrame>
+        <p:nvGraphicFramePr>
+          <p:cNvPr id="6" name="Table 6">
+            <a:extLst>
+              <a:ext uri="{FF2B5EF4-FFF2-40B4-BE49-F238E27FC236}">
+                <a16:creationId xmlns:a16="http://schemas.microsoft.com/office/drawing/2014/main" id="{99D13FB2-5BF8-4AC0-A13D-ECB8E230F5BC}"/>
+              </a:ext>
+            </a:extLst>
+          </p:cNvPr>
+          <p:cNvGraphicFramePr>
+            <a:graphicFrameLocks noGrp="1"/>
+          </p:cNvGraphicFramePr>
+          <p:nvPr>
+            <p:ph idx="1"/>
+            <p:extLst>
+              <p:ext uri="{D42A27DB-BD31-4B8C-83A1-F6EECF244321}">
+                <p14:modId xmlns:p14="http://schemas.microsoft.com/office/powerpoint/2010/main" val="3195034602"/>
+              </p:ext>
+            </p:extLst>
+          </p:nvPr>
+        </p:nvGraphicFramePr>
+        <p:xfrm>
+          <a:off x="408175" y="923337"/>
+          <a:ext cx="11372473" cy="5134563"/>
+        </p:xfrm>
+        <a:graphic>
+          <a:graphicData uri="http://schemas.openxmlformats.org/drawingml/2006/table">
+            <a:tbl>
+              <a:tblPr firstRow="1" bandRow="1">
+                <a:tableStyleId>{5C22544A-7EE6-4342-B048-85BDC9FD1C3A}</a:tableStyleId>
+              </a:tblPr>
+              <a:tblGrid>
+                <a:gridCol w="1627245">
+                  <a:extLst>
+                    <a:ext uri="{9D8B030D-6E8A-4147-A177-3AD203B41FA5}">
+                      <a16:colId xmlns:a16="http://schemas.microsoft.com/office/drawing/2014/main" val="41390910"/>
+                    </a:ext>
+                  </a:extLst>
+                </a:gridCol>
+                <a:gridCol w="6567560">
+                  <a:extLst>
+                    <a:ext uri="{9D8B030D-6E8A-4147-A177-3AD203B41FA5}">
+                      <a16:colId xmlns:a16="http://schemas.microsoft.com/office/drawing/2014/main" val="1261297711"/>
+                    </a:ext>
+                  </a:extLst>
+                </a:gridCol>
+                <a:gridCol w="3177668">
+                  <a:extLst>
+                    <a:ext uri="{9D8B030D-6E8A-4147-A177-3AD203B41FA5}">
+                      <a16:colId xmlns:a16="http://schemas.microsoft.com/office/drawing/2014/main" val="3622604584"/>
+                    </a:ext>
+                  </a:extLst>
+                </a:gridCol>
+              </a:tblGrid>
+              <a:tr h="676863">
+                <a:tc>
+                  <a:txBody>
+                    <a:bodyPr/>
+                    <a:lstStyle/>
+                    <a:p>
+                      <a:pPr algn="r"/>
+                      <a:r>
+                        <a:rPr lang="en-US" sz="1600" dirty="0">
+                          <a:effectLst/>
+                        </a:rPr>
+                        <a:t>Time (MST)</a:t>
+                      </a:r>
+                    </a:p>
+                  </a:txBody>
+                  <a:tcPr marL="114300" marR="114300" marT="76200" marB="76200" anchor="ctr"/>
+                </a:tc>
+                <a:tc>
+                  <a:txBody>
+                    <a:bodyPr/>
+                    <a:lstStyle/>
+                    <a:p>
+                      <a:r>
+                        <a:rPr lang="en-US" sz="1600" dirty="0">
+                          <a:effectLst/>
+                        </a:rPr>
+                        <a:t>Title</a:t>
+                      </a:r>
+                    </a:p>
+                  </a:txBody>
+                  <a:tcPr marL="114300" marR="114300" marT="76200" marB="76200" anchor="ctr"/>
+                </a:tc>
+                <a:tc>
+                  <a:txBody>
+                    <a:bodyPr/>
+                    <a:lstStyle/>
+                    <a:p>
+                      <a:r>
+                        <a:rPr lang="en-US" sz="1600" dirty="0">
+                          <a:effectLst/>
+                        </a:rPr>
+                        <a:t>Presenter</a:t>
+                      </a:r>
+                    </a:p>
+                  </a:txBody>
+                  <a:tcPr marL="114300" marR="114300" marT="76200" marB="76200" anchor="ctr"/>
+                </a:tc>
+                <a:extLst>
+                  <a:ext uri="{0D108BD9-81ED-4DB2-BD59-A6C34878D82A}">
+                    <a16:rowId xmlns:a16="http://schemas.microsoft.com/office/drawing/2014/main" val="2098024418"/>
+                  </a:ext>
+                </a:extLst>
+              </a:tr>
+              <a:tr h="254856">
+                <a:tc>
+                  <a:txBody>
+                    <a:bodyPr/>
+                    <a:lstStyle/>
+                    <a:p>
+                      <a:pPr algn="r"/>
+                      <a:r>
+                        <a:rPr lang="en-US">
+                          <a:effectLst/>
+                        </a:rPr>
+                        <a:t>12:00 PM</a:t>
+                      </a:r>
+                    </a:p>
+                  </a:txBody>
+                  <a:tcPr marL="142875" marR="142875" marT="95250" marB="95250" anchor="ctr"/>
+                </a:tc>
+                <a:tc>
+                  <a:txBody>
+                    <a:bodyPr/>
+                    <a:lstStyle/>
+                    <a:p>
+                      <a:r>
+                        <a:rPr lang="en-US" i="1">
+                          <a:effectLst/>
+                        </a:rPr>
+                        <a:t>Lunch break</a:t>
+                      </a:r>
+                      <a:endParaRPr lang="en-US">
+                        <a:effectLst/>
+                      </a:endParaRPr>
+                    </a:p>
+                  </a:txBody>
+                  <a:tcPr marL="142875" marR="142875" marT="95250" marB="95250" anchor="ctr"/>
+                </a:tc>
+                <a:tc>
+                  <a:txBody>
+                    <a:bodyPr/>
+                    <a:lstStyle/>
+                    <a:p>
+                      <a:endParaRPr lang="en-US">
+                        <a:effectLst/>
+                      </a:endParaRPr>
+                    </a:p>
+                  </a:txBody>
+                  <a:tcPr marL="142875" marR="142875" marT="95250" marB="95250" anchor="ctr"/>
+                </a:tc>
+                <a:extLst>
+                  <a:ext uri="{0D108BD9-81ED-4DB2-BD59-A6C34878D82A}">
+                    <a16:rowId xmlns:a16="http://schemas.microsoft.com/office/drawing/2014/main" val="2447348272"/>
+                  </a:ext>
+                </a:extLst>
+              </a:tr>
+              <a:tr h="300576">
+                <a:tc>
+                  <a:txBody>
+                    <a:bodyPr/>
+                    <a:lstStyle/>
+                    <a:p>
+                      <a:pPr algn="r"/>
+                      <a:r>
+                        <a:rPr lang="en-US">
+                          <a:effectLst/>
+                        </a:rPr>
+                        <a:t>1:00 PM</a:t>
+                      </a:r>
+                    </a:p>
+                  </a:txBody>
+                  <a:tcPr marL="142875" marR="142875" marT="95250" marB="95250" anchor="ctr"/>
+                </a:tc>
+                <a:tc>
+                  <a:txBody>
+                    <a:bodyPr/>
+                    <a:lstStyle/>
+                    <a:p>
+                      <a:r>
+                        <a:rPr lang="en-US">
+                          <a:effectLst/>
+                        </a:rPr>
+                        <a:t>Improving Reproducibility Through Better Software Practices</a:t>
+                      </a:r>
+                    </a:p>
+                  </a:txBody>
+                  <a:tcPr marL="142875" marR="142875" marT="95250" marB="95250" anchor="ctr"/>
+                </a:tc>
+                <a:tc>
+                  <a:txBody>
+                    <a:bodyPr/>
+                    <a:lstStyle/>
+                    <a:p>
+                      <a:r>
+                        <a:rPr lang="en-US">
+                          <a:effectLst/>
+                        </a:rPr>
+                        <a:t>Gregory R. Watson (ORNL)</a:t>
+                      </a:r>
+                    </a:p>
+                  </a:txBody>
+                  <a:tcPr marL="142875" marR="142875" marT="95250" marB="95250" anchor="ctr"/>
+                </a:tc>
+                <a:extLst>
+                  <a:ext uri="{0D108BD9-81ED-4DB2-BD59-A6C34878D82A}">
+                    <a16:rowId xmlns:a16="http://schemas.microsoft.com/office/drawing/2014/main" val="3498345095"/>
+                  </a:ext>
+                </a:extLst>
+              </a:tr>
+              <a:tr h="0">
+                <a:tc>
+                  <a:txBody>
+                    <a:bodyPr/>
+                    <a:lstStyle/>
+                    <a:p>
+                      <a:pPr algn="r"/>
+                      <a:r>
+                        <a:rPr lang="en-US">
+                          <a:effectLst/>
+                        </a:rPr>
+                        <a:t>2:15 PM</a:t>
+                      </a:r>
+                    </a:p>
+                  </a:txBody>
+                  <a:tcPr marL="142875" marR="142875" marT="95250" marB="95250" anchor="ctr"/>
+                </a:tc>
+                <a:tc>
+                  <a:txBody>
+                    <a:bodyPr/>
+                    <a:lstStyle/>
+                    <a:p>
+                      <a:r>
+                        <a:rPr lang="en-US" dirty="0">
+                          <a:effectLst/>
+                        </a:rPr>
+                        <a:t>Reproducibility of Workflows</a:t>
+                      </a:r>
+                    </a:p>
+                  </a:txBody>
+                  <a:tcPr marL="142875" marR="142875" marT="95250" marB="95250" anchor="ctr"/>
+                </a:tc>
+                <a:tc>
+                  <a:txBody>
+                    <a:bodyPr/>
+                    <a:lstStyle/>
+                    <a:p>
+                      <a:r>
+                        <a:rPr lang="en-US">
+                          <a:effectLst/>
+                        </a:rPr>
+                        <a:t>Gregory R. Watson (ORNL)</a:t>
+                      </a:r>
+                    </a:p>
+                  </a:txBody>
+                  <a:tcPr marL="142875" marR="142875" marT="95250" marB="95250" anchor="ctr"/>
+                </a:tc>
+                <a:extLst>
+                  <a:ext uri="{0D108BD9-81ED-4DB2-BD59-A6C34878D82A}">
+                    <a16:rowId xmlns:a16="http://schemas.microsoft.com/office/drawing/2014/main" val="1585599665"/>
+                  </a:ext>
+                </a:extLst>
+              </a:tr>
+              <a:tr h="0">
+                <a:tc>
+                  <a:txBody>
+                    <a:bodyPr/>
+                    <a:lstStyle/>
+                    <a:p>
+                      <a:pPr algn="r"/>
+                      <a:r>
+                        <a:rPr lang="en-US">
+                          <a:effectLst/>
+                        </a:rPr>
+                        <a:t>2:45 PM</a:t>
+                      </a:r>
+                    </a:p>
+                  </a:txBody>
+                  <a:tcPr marL="142875" marR="142875" marT="95250" marB="95250" anchor="ctr"/>
+                </a:tc>
+                <a:tc>
+                  <a:txBody>
+                    <a:bodyPr/>
+                    <a:lstStyle/>
+                    <a:p>
+                      <a:r>
+                        <a:rPr lang="en-US">
+                          <a:effectLst/>
+                        </a:rPr>
+                        <a:t>Software Testing and Verification</a:t>
+                      </a:r>
+                    </a:p>
+                  </a:txBody>
+                  <a:tcPr marL="142875" marR="142875" marT="95250" marB="95250" anchor="ctr"/>
+                </a:tc>
+                <a:tc>
+                  <a:txBody>
+                    <a:bodyPr/>
+                    <a:lstStyle/>
+                    <a:p>
+                      <a:r>
+                        <a:rPr lang="en-US">
+                          <a:effectLst/>
+                        </a:rPr>
+                        <a:t>David E. Bernholdt (ORNL)</a:t>
+                      </a:r>
+                    </a:p>
+                  </a:txBody>
+                  <a:tcPr marL="142875" marR="142875" marT="95250" marB="95250" anchor="ctr"/>
+                </a:tc>
+                <a:extLst>
+                  <a:ext uri="{0D108BD9-81ED-4DB2-BD59-A6C34878D82A}">
+                    <a16:rowId xmlns:a16="http://schemas.microsoft.com/office/drawing/2014/main" val="2760338244"/>
+                  </a:ext>
+                </a:extLst>
+              </a:tr>
+              <a:tr h="0">
+                <a:tc>
+                  <a:txBody>
+                    <a:bodyPr/>
+                    <a:lstStyle/>
+                    <a:p>
+                      <a:pPr algn="r"/>
+                      <a:r>
+                        <a:rPr lang="en-US">
+                          <a:effectLst/>
+                        </a:rPr>
+                        <a:t>3:00 PM</a:t>
+                      </a:r>
+                    </a:p>
+                  </a:txBody>
+                  <a:tcPr marL="142875" marR="142875" marT="95250" marB="95250" anchor="ctr"/>
+                </a:tc>
+                <a:tc>
+                  <a:txBody>
+                    <a:bodyPr/>
+                    <a:lstStyle/>
+                    <a:p>
+                      <a:r>
+                        <a:rPr lang="en-US" i="1">
+                          <a:effectLst/>
+                        </a:rPr>
+                        <a:t>Afternoon break</a:t>
+                      </a:r>
+                      <a:endParaRPr lang="en-US">
+                        <a:effectLst/>
+                      </a:endParaRPr>
+                    </a:p>
+                  </a:txBody>
+                  <a:tcPr marL="142875" marR="142875" marT="95250" marB="95250" anchor="ctr"/>
+                </a:tc>
+                <a:tc>
+                  <a:txBody>
+                    <a:bodyPr/>
+                    <a:lstStyle/>
+                    <a:p>
+                      <a:endParaRPr lang="en-US">
+                        <a:effectLst/>
+                      </a:endParaRPr>
+                    </a:p>
+                  </a:txBody>
+                  <a:tcPr marL="142875" marR="142875" marT="95250" marB="95250" anchor="ctr"/>
+                </a:tc>
+                <a:extLst>
+                  <a:ext uri="{0D108BD9-81ED-4DB2-BD59-A6C34878D82A}">
+                    <a16:rowId xmlns:a16="http://schemas.microsoft.com/office/drawing/2014/main" val="3897691477"/>
+                  </a:ext>
+                </a:extLst>
+              </a:tr>
+              <a:tr h="323436">
+                <a:tc>
+                  <a:txBody>
+                    <a:bodyPr/>
+                    <a:lstStyle/>
+                    <a:p>
+                      <a:pPr algn="r"/>
+                      <a:r>
+                        <a:rPr lang="en-US">
+                          <a:effectLst/>
+                        </a:rPr>
+                        <a:t>3:30 PM</a:t>
+                      </a:r>
+                    </a:p>
+                  </a:txBody>
+                  <a:tcPr marL="142875" marR="142875" marT="95250" marB="95250" anchor="ctr"/>
+                </a:tc>
+                <a:tc>
+                  <a:txBody>
+                    <a:bodyPr/>
+                    <a:lstStyle/>
+                    <a:p>
+                      <a:r>
+                        <a:rPr lang="en-US">
+                          <a:effectLst/>
+                        </a:rPr>
+                        <a:t>Software Testing and Verification</a:t>
+                      </a:r>
+                    </a:p>
+                  </a:txBody>
+                  <a:tcPr marL="142875" marR="142875" marT="95250" marB="95250" anchor="ctr"/>
+                </a:tc>
+                <a:tc>
+                  <a:txBody>
+                    <a:bodyPr/>
+                    <a:lstStyle/>
+                    <a:p>
+                      <a:r>
+                        <a:rPr lang="en-US">
+                          <a:effectLst/>
+                        </a:rPr>
+                        <a:t>David E. Bernholdt (ORNL)</a:t>
+                      </a:r>
+                    </a:p>
+                  </a:txBody>
+                  <a:tcPr marL="142875" marR="142875" marT="95250" marB="95250" anchor="ctr"/>
+                </a:tc>
+                <a:extLst>
+                  <a:ext uri="{0D108BD9-81ED-4DB2-BD59-A6C34878D82A}">
+                    <a16:rowId xmlns:a16="http://schemas.microsoft.com/office/drawing/2014/main" val="2967747853"/>
+                  </a:ext>
+                </a:extLst>
+              </a:tr>
+              <a:tr h="0">
+                <a:tc>
+                  <a:txBody>
+                    <a:bodyPr/>
+                    <a:lstStyle/>
+                    <a:p>
+                      <a:pPr algn="r"/>
+                      <a:r>
+                        <a:rPr lang="en-US">
+                          <a:effectLst/>
+                        </a:rPr>
+                        <a:t>3:45 PM</a:t>
+                      </a:r>
+                    </a:p>
+                  </a:txBody>
+                  <a:tcPr marL="142875" marR="142875" marT="95250" marB="95250" anchor="ctr"/>
+                </a:tc>
+                <a:tc>
+                  <a:txBody>
+                    <a:bodyPr/>
+                    <a:lstStyle/>
+                    <a:p>
+                      <a:r>
+                        <a:rPr lang="en-US">
+                          <a:effectLst/>
+                        </a:rPr>
+                        <a:t>Lab Notebooks for Computational Mathematics, Sciences, &amp; Engineering</a:t>
+                      </a:r>
+                    </a:p>
+                  </a:txBody>
+                  <a:tcPr marL="142875" marR="142875" marT="95250" marB="95250" anchor="ctr"/>
+                </a:tc>
+                <a:tc>
+                  <a:txBody>
+                    <a:bodyPr/>
+                    <a:lstStyle/>
+                    <a:p>
+                      <a:r>
+                        <a:rPr lang="en-US">
+                          <a:effectLst/>
+                        </a:rPr>
+                        <a:t>David E. Bernholdt (ORNL)</a:t>
+                      </a:r>
+                    </a:p>
+                  </a:txBody>
+                  <a:tcPr marL="142875" marR="142875" marT="95250" marB="95250" anchor="ctr"/>
+                </a:tc>
+                <a:extLst>
+                  <a:ext uri="{0D108BD9-81ED-4DB2-BD59-A6C34878D82A}">
+                    <a16:rowId xmlns:a16="http://schemas.microsoft.com/office/drawing/2014/main" val="763903436"/>
+                  </a:ext>
+                </a:extLst>
+              </a:tr>
+              <a:tr h="0">
+                <a:tc>
+                  <a:txBody>
+                    <a:bodyPr/>
+                    <a:lstStyle/>
+                    <a:p>
+                      <a:pPr algn="r"/>
+                      <a:r>
+                        <a:rPr lang="en-US">
+                          <a:effectLst/>
+                        </a:rPr>
+                        <a:t>4:45 PM</a:t>
+                      </a:r>
+                    </a:p>
+                  </a:txBody>
+                  <a:tcPr marL="142875" marR="142875" marT="95250" marB="95250" anchor="ctr"/>
+                </a:tc>
+                <a:tc>
+                  <a:txBody>
+                    <a:bodyPr/>
+                    <a:lstStyle/>
+                    <a:p>
+                      <a:r>
+                        <a:rPr lang="en-US" dirty="0">
+                          <a:effectLst/>
+                        </a:rPr>
+                        <a:t>Summary</a:t>
+                      </a:r>
+                    </a:p>
+                  </a:txBody>
+                  <a:tcPr marL="142875" marR="142875" marT="95250" marB="95250" anchor="ctr"/>
+                </a:tc>
+                <a:tc>
+                  <a:txBody>
+                    <a:bodyPr/>
+                    <a:lstStyle/>
+                    <a:p>
+                      <a:r>
+                        <a:rPr lang="en-US" dirty="0">
+                          <a:effectLst/>
+                        </a:rPr>
+                        <a:t>David E. Bernholdt (ORNL)</a:t>
+                      </a:r>
+                    </a:p>
+                  </a:txBody>
+                  <a:tcPr marL="142875" marR="142875" marT="95250" marB="95250" anchor="ctr"/>
+                </a:tc>
+                <a:extLst>
+                  <a:ext uri="{0D108BD9-81ED-4DB2-BD59-A6C34878D82A}">
+                    <a16:rowId xmlns:a16="http://schemas.microsoft.com/office/drawing/2014/main" val="1954771440"/>
+                  </a:ext>
+                </a:extLst>
+              </a:tr>
+              <a:tr h="0">
+                <a:tc>
+                  <a:txBody>
+                    <a:bodyPr/>
+                    <a:lstStyle/>
+                    <a:p>
+                      <a:pPr algn="r"/>
+                      <a:r>
+                        <a:rPr lang="en-US" dirty="0">
+                          <a:effectLst/>
+                        </a:rPr>
+                        <a:t>5:00 PM</a:t>
+                      </a:r>
+                    </a:p>
+                  </a:txBody>
+                  <a:tcPr marL="142875" marR="142875" marT="95250" marB="95250" anchor="ctr"/>
+                </a:tc>
+                <a:tc>
+                  <a:txBody>
+                    <a:bodyPr/>
+                    <a:lstStyle/>
+                    <a:p>
+                      <a:r>
+                        <a:rPr lang="en-US" i="1" dirty="0">
+                          <a:effectLst/>
+                        </a:rPr>
+                        <a:t>Adjourn</a:t>
+                      </a:r>
+                    </a:p>
+                  </a:txBody>
+                  <a:tcPr marL="142875" marR="142875" marT="95250" marB="95250" anchor="ctr"/>
+                </a:tc>
+                <a:tc>
+                  <a:txBody>
+                    <a:bodyPr/>
+                    <a:lstStyle/>
+                    <a:p>
+                      <a:endParaRPr lang="en-US" dirty="0">
+                        <a:effectLst/>
+                      </a:endParaRPr>
+                    </a:p>
+                  </a:txBody>
+                  <a:tcPr marL="142875" marR="142875" marT="95250" marB="95250" anchor="ctr"/>
+                </a:tc>
+                <a:extLst>
+                  <a:ext uri="{0D108BD9-81ED-4DB2-BD59-A6C34878D82A}">
+                    <a16:rowId xmlns:a16="http://schemas.microsoft.com/office/drawing/2014/main" val="2813157479"/>
+                  </a:ext>
+                </a:extLst>
+              </a:tr>
+            </a:tbl>
+          </a:graphicData>
+        </a:graphic>
+      </p:graphicFrame>
+      <p:sp>
+        <p:nvSpPr>
+          <p:cNvPr id="9" name="TextBox 8">
+            <a:extLst>
+              <a:ext uri="{FF2B5EF4-FFF2-40B4-BE49-F238E27FC236}">
+                <a16:creationId xmlns:a16="http://schemas.microsoft.com/office/drawing/2014/main" id="{2C67F121-FA5A-4323-B777-FC3438185944}"/>
+              </a:ext>
+            </a:extLst>
+          </p:cNvPr>
+          <p:cNvSpPr txBox="1"/>
+          <p:nvPr/>
+        </p:nvSpPr>
+        <p:spPr>
+          <a:xfrm>
+            <a:off x="4537710" y="45720"/>
+            <a:ext cx="7651115" cy="646331"/>
+          </a:xfrm>
+          <a:prstGeom prst="rect">
+            <a:avLst/>
+          </a:prstGeom>
+          <a:noFill/>
+        </p:spPr>
+        <p:txBody>
+          <a:bodyPr wrap="square">
+            <a:spAutoFit/>
+          </a:bodyPr>
+          <a:lstStyle/>
+          <a:p>
+            <a:pPr algn="l"/>
+            <a:r>
+              <a:rPr lang="en-US" dirty="0"/>
+              <a:t>The agenda is also available on the tutorial web page.  Visit </a:t>
+            </a:r>
+            <a:r>
+              <a:rPr lang="en-US" b="1" dirty="0">
+                <a:hlinkClick r:id="rId2"/>
+              </a:rPr>
+              <a:t>https://bssw-tutorial.github.io</a:t>
+            </a:r>
+            <a:r>
+              <a:rPr lang="en-US" b="1" dirty="0"/>
+              <a:t> </a:t>
+            </a:r>
+            <a:r>
+              <a:rPr lang="en-US" dirty="0"/>
+              <a:t>and click on the link for today’s tutorial</a:t>
+            </a:r>
+          </a:p>
+        </p:txBody>
+      </p:sp>
+    </p:spTree>
+    <p:extLst>
+      <p:ext uri="{BB962C8B-B14F-4D97-AF65-F5344CB8AC3E}">
+        <p14:creationId xmlns:p14="http://schemas.microsoft.com/office/powerpoint/2010/main" val="824070752"/>
       </p:ext>
     </p:extLst>
   </p:cSld>
@@ -5361,18 +5915,18 @@
                 <a:effectLst/>
                 <a:latin typeface="+mn-lt"/>
               </a:rPr>
-              <a:t>David E. Bernholdt, Patricia A. Grubel, and David M. Rogers, Better Scientific Software tutorial, in Improving Scientific Software, Boulder, Colorado and online, 2023. DOI: </a:t>
-            </a:r>
-            <a:r>
-              <a:rPr lang="en-US" sz="1600" b="0" i="0" dirty="0">
+              <a:t>David E. Bernholdt, Patricia A. Grubel, David M. Rogers, and Gregory R. Watson, Better Software for Reproducible Science tutorial, in The International Conference for High-Performance Computing, Networking, Storage, and Analysis (SC23), Denver, Colorado, 2023. DOI: </a:t>
+            </a:r>
+            <a:r>
+              <a:rPr lang="en-US" sz="1600" b="0" i="0" u="none" strike="noStrike" dirty="0">
                 <a:solidFill>
-                  <a:srgbClr val="111111"/>
+                  <a:srgbClr val="2A7AE2"/>
                 </a:solidFill>
                 <a:effectLst/>
                 <a:latin typeface="+mn-lt"/>
                 <a:hlinkClick r:id="rId4"/>
               </a:rPr>
-              <a:t>10.6084/m9.figshare.22179748</a:t>
+              <a:t>10.6084/m9.figshare.24226105</a:t>
             </a:r>
             <a:r>
               <a:rPr lang="en-US" sz="1600" b="0" i="0" dirty="0">
@@ -5553,7 +6107,7 @@
     </p:spTree>
     <p:extLst>
       <p:ext uri="{BB962C8B-B14F-4D97-AF65-F5344CB8AC3E}">
-        <p14:creationId xmlns:p14="http://schemas.microsoft.com/office/powerpoint/2010/main" val="851745353"/>
+        <p14:creationId xmlns:p14="http://schemas.microsoft.com/office/powerpoint/2010/main" val="978726433"/>
       </p:ext>
     </p:extLst>
   </p:cSld>
@@ -12185,18 +12739,18 @@
 </file>
 
 <file path=customXml/item1.xml><?xml version="1.0" encoding="utf-8"?>
-<p:properties xmlns:p="http://schemas.microsoft.com/office/2006/metadata/properties" xmlns:xsi="http://www.w3.org/2001/XMLSchema-instance" xmlns:pc="http://schemas.microsoft.com/office/infopath/2007/PartnerControls">
-  <documentManagement/>
-</p:properties>
-</file>
-
-<file path=customXml/item2.xml><?xml version="1.0" encoding="utf-8"?>
 <?mso-contentType ?>
 <FormTemplates xmlns="http://schemas.microsoft.com/sharepoint/v3/contenttype/forms">
   <Display>DocumentLibraryForm</Display>
   <Edit>DocumentLibraryForm</Edit>
   <New>DocumentLibraryForm</New>
 </FormTemplates>
+</file>
+
+<file path=customXml/item2.xml><?xml version="1.0" encoding="utf-8"?>
+<p:properties xmlns:p="http://schemas.microsoft.com/office/2006/metadata/properties" xmlns:xsi="http://www.w3.org/2001/XMLSchema-instance" xmlns:pc="http://schemas.microsoft.com/office/infopath/2007/PartnerControls">
+  <documentManagement/>
+</p:properties>
 </file>
 
 <file path=customXml/item3.xml><?xml version="1.0" encoding="utf-8"?>
@@ -12249,6 +12803,14 @@
 </file>
 
 <file path=customXml/itemProps1.xml><?xml version="1.0" encoding="utf-8"?>
+<ds:datastoreItem xmlns:ds="http://schemas.openxmlformats.org/officeDocument/2006/customXml" ds:itemID="{19E20559-B232-4371-8690-E3D8007EDB82}">
+  <ds:schemaRefs>
+    <ds:schemaRef ds:uri="http://schemas.microsoft.com/sharepoint/v3/contenttype/forms"/>
+  </ds:schemaRefs>
+</ds:datastoreItem>
+</file>
+
+<file path=customXml/itemProps2.xml><?xml version="1.0" encoding="utf-8"?>
 <ds:datastoreItem xmlns:ds="http://schemas.openxmlformats.org/officeDocument/2006/customXml" ds:itemID="{A50EC660-24D0-43A0-AE5E-E274115E726B}">
   <ds:schemaRefs>
     <ds:schemaRef ds:uri="http://purl.org/dc/elements/1.1/"/>
@@ -12259,14 +12821,6 @@
     <ds:schemaRef ds:uri="http://www.w3.org/XML/1998/namespace"/>
     <ds:schemaRef ds:uri="http://purl.org/dc/dcmitype/"/>
     <ds:schemaRef ds:uri="http://schemas.microsoft.com/office/infopath/2007/PartnerControls"/>
-  </ds:schemaRefs>
-</ds:datastoreItem>
-</file>
-
-<file path=customXml/itemProps2.xml><?xml version="1.0" encoding="utf-8"?>
-<ds:datastoreItem xmlns:ds="http://schemas.openxmlformats.org/officeDocument/2006/customXml" ds:itemID="{19E20559-B232-4371-8690-E3D8007EDB82}">
-  <ds:schemaRefs>
-    <ds:schemaRef ds:uri="http://schemas.microsoft.com/sharepoint/v3/contenttype/forms"/>
   </ds:schemaRefs>
 </ds:datastoreItem>
 </file>

</xml_diff>